<commit_message>
Anforderung und Umgebungsvariablen redundant?
</commit_message>
<xml_diff>
--- a/Dokumentation/Roboter.pptx
+++ b/Dokumentation/Roboter.pptx
@@ -213,7 +213,7 @@
           <a:p>
             <a:fld id="{667D6E9C-FEFA-4AE6-9196-67D489BCC82C}" type="datetimeFigureOut">
               <a:rPr lang="de-DE" smtClean="0"/>
-              <a:t>21.02.2018</a:t>
+              <a:t>25.02.2018</a:t>
             </a:fld>
             <a:endParaRPr lang="de-DE"/>
           </a:p>
@@ -627,7 +627,7 @@
           <a:p>
             <a:fld id="{23EB666B-F6D4-4DC2-BA2B-5CF0827327F0}" type="datetime1">
               <a:rPr lang="de-DE" smtClean="0"/>
-              <a:t>21.02.2018</a:t>
+              <a:t>25.02.2018</a:t>
             </a:fld>
             <a:endParaRPr lang="de-DE"/>
           </a:p>
@@ -825,7 +825,7 @@
           <a:p>
             <a:fld id="{DDC6096B-34AB-48A6-8B0B-AA3C911221CC}" type="datetime1">
               <a:rPr lang="de-DE" smtClean="0"/>
-              <a:t>21.02.2018</a:t>
+              <a:t>25.02.2018</a:t>
             </a:fld>
             <a:endParaRPr lang="de-DE"/>
           </a:p>
@@ -1033,7 +1033,7 @@
           <a:p>
             <a:fld id="{407FD86E-BFFD-4661-835C-7D0E258F6D22}" type="datetime1">
               <a:rPr lang="de-DE" smtClean="0"/>
-              <a:t>21.02.2018</a:t>
+              <a:t>25.02.2018</a:t>
             </a:fld>
             <a:endParaRPr lang="de-DE"/>
           </a:p>
@@ -1231,7 +1231,7 @@
           <a:p>
             <a:fld id="{0060243F-1866-4F8D-A2B2-76D33461B3CF}" type="datetime1">
               <a:rPr lang="de-DE" smtClean="0"/>
-              <a:t>21.02.2018</a:t>
+              <a:t>25.02.2018</a:t>
             </a:fld>
             <a:endParaRPr lang="de-DE"/>
           </a:p>
@@ -1506,7 +1506,7 @@
           <a:p>
             <a:fld id="{30F3688E-8457-4C6B-8C67-700B1B4DC1E7}" type="datetime1">
               <a:rPr lang="de-DE" smtClean="0"/>
-              <a:t>21.02.2018</a:t>
+              <a:t>25.02.2018</a:t>
             </a:fld>
             <a:endParaRPr lang="de-DE"/>
           </a:p>
@@ -1771,7 +1771,7 @@
           <a:p>
             <a:fld id="{41230D57-A438-4C3F-9F84-4C5C291E5A5F}" type="datetime1">
               <a:rPr lang="de-DE" smtClean="0"/>
-              <a:t>21.02.2018</a:t>
+              <a:t>25.02.2018</a:t>
             </a:fld>
             <a:endParaRPr lang="de-DE"/>
           </a:p>
@@ -2183,7 +2183,7 @@
           <a:p>
             <a:fld id="{AF62F608-86F1-40CF-82FC-1C147C3DD224}" type="datetime1">
               <a:rPr lang="de-DE" smtClean="0"/>
-              <a:t>21.02.2018</a:t>
+              <a:t>25.02.2018</a:t>
             </a:fld>
             <a:endParaRPr lang="de-DE"/>
           </a:p>
@@ -2324,7 +2324,7 @@
           <a:p>
             <a:fld id="{A171A553-3517-40AF-B856-21919B4E6188}" type="datetime1">
               <a:rPr lang="de-DE" smtClean="0"/>
-              <a:t>21.02.2018</a:t>
+              <a:t>25.02.2018</a:t>
             </a:fld>
             <a:endParaRPr lang="de-DE"/>
           </a:p>
@@ -2437,7 +2437,7 @@
           <a:p>
             <a:fld id="{793C024D-9082-4157-A667-CF73921D3E21}" type="datetime1">
               <a:rPr lang="de-DE" smtClean="0"/>
-              <a:t>21.02.2018</a:t>
+              <a:t>25.02.2018</a:t>
             </a:fld>
             <a:endParaRPr lang="de-DE"/>
           </a:p>
@@ -2748,7 +2748,7 @@
           <a:p>
             <a:fld id="{CB9F0996-3986-4BD0-AC2D-F5F802D0DF4C}" type="datetime1">
               <a:rPr lang="de-DE" smtClean="0"/>
-              <a:t>21.02.2018</a:t>
+              <a:t>25.02.2018</a:t>
             </a:fld>
             <a:endParaRPr lang="de-DE"/>
           </a:p>
@@ -3036,7 +3036,7 @@
           <a:p>
             <a:fld id="{B53546CB-57F0-403A-9B11-F28CD8787C4F}" type="datetime1">
               <a:rPr lang="de-DE" smtClean="0"/>
-              <a:t>21.02.2018</a:t>
+              <a:t>25.02.2018</a:t>
             </a:fld>
             <a:endParaRPr lang="de-DE"/>
           </a:p>
@@ -3277,7 +3277,7 @@
           <a:p>
             <a:fld id="{1D3C1B12-7E54-4267-9D51-05EAB2BDC53B}" type="datetime1">
               <a:rPr lang="de-DE" smtClean="0"/>
-              <a:t>21.02.2018</a:t>
+              <a:t>25.02.2018</a:t>
             </a:fld>
             <a:endParaRPr lang="de-DE"/>
           </a:p>

</xml_diff>

<commit_message>
Fix Graph in Presentation
</commit_message>
<xml_diff>
--- a/Dokumentation/Roboter.pptx
+++ b/Dokumentation/Roboter.pptx
@@ -136,7 +136,18 @@
   </p:defaultTextStyle>
   <p:extLst>
     <p:ext uri="{EFAFB233-063F-42B5-8137-9DF3F51BA10A}">
-      <p15:sldGuideLst xmlns:p15="http://schemas.microsoft.com/office/powerpoint/2012/main" xmlns=""/>
+      <p15:sldGuideLst xmlns:p15="http://schemas.microsoft.com/office/powerpoint/2012/main">
+        <p15:guide id="1" orient="horz" pos="2160">
+          <p15:clr>
+            <a:srgbClr val="A4A3A4"/>
+          </p15:clr>
+        </p15:guide>
+        <p15:guide id="2" pos="3840">
+          <p15:clr>
+            <a:srgbClr val="A4A3A4"/>
+          </p15:clr>
+        </p15:guide>
+      </p15:sldGuideLst>
     </p:ext>
   </p:extLst>
 </p:presentation>
@@ -224,7 +235,7 @@
           <a:p>
             <a:fld id="{667D6E9C-FEFA-4AE6-9196-67D489BCC82C}" type="datetimeFigureOut">
               <a:rPr lang="de-DE" smtClean="0"/>
-              <a:t>26.03.18</a:t>
+              <a:t>27.03.2018</a:t>
             </a:fld>
             <a:endParaRPr lang="de-DE"/>
           </a:p>
@@ -513,7 +524,7 @@
           <p:cNvPr id="2" name="Titel 1">
             <a:extLst>
               <a:ext uri="{FF2B5EF4-FFF2-40B4-BE49-F238E27FC236}">
-                <a16:creationId xmlns:a16="http://schemas.microsoft.com/office/drawing/2014/main" xmlns="" id="{8DAA5488-17B1-45FF-81F3-21EFC66F5B3C}"/>
+                <a16:creationId xmlns:a16="http://schemas.microsoft.com/office/drawing/2014/main" id="{8DAA5488-17B1-45FF-81F3-21EFC66F5B3C}"/>
               </a:ext>
             </a:extLst>
           </p:cNvPr>
@@ -550,7 +561,7 @@
           <p:cNvPr id="3" name="Untertitel 2">
             <a:extLst>
               <a:ext uri="{FF2B5EF4-FFF2-40B4-BE49-F238E27FC236}">
-                <a16:creationId xmlns:a16="http://schemas.microsoft.com/office/drawing/2014/main" xmlns="" id="{49EA3FCD-3D43-4ACA-99B4-E4B07D493937}"/>
+                <a16:creationId xmlns:a16="http://schemas.microsoft.com/office/drawing/2014/main" id="{49EA3FCD-3D43-4ACA-99B4-E4B07D493937}"/>
               </a:ext>
             </a:extLst>
           </p:cNvPr>
@@ -620,7 +631,7 @@
           <p:cNvPr id="4" name="Datumsplatzhalter 3">
             <a:extLst>
               <a:ext uri="{FF2B5EF4-FFF2-40B4-BE49-F238E27FC236}">
-                <a16:creationId xmlns:a16="http://schemas.microsoft.com/office/drawing/2014/main" xmlns="" id="{CDADDD12-B82E-4C5A-B3F4-24C4B3B8EC3D}"/>
+                <a16:creationId xmlns:a16="http://schemas.microsoft.com/office/drawing/2014/main" id="{CDADDD12-B82E-4C5A-B3F4-24C4B3B8EC3D}"/>
               </a:ext>
             </a:extLst>
           </p:cNvPr>
@@ -638,7 +649,7 @@
           <a:p>
             <a:fld id="{23EB666B-F6D4-4DC2-BA2B-5CF0827327F0}" type="datetime1">
               <a:rPr lang="de-DE" smtClean="0"/>
-              <a:t>26.03.18</a:t>
+              <a:t>27.03.2018</a:t>
             </a:fld>
             <a:endParaRPr lang="de-DE"/>
           </a:p>
@@ -649,7 +660,7 @@
           <p:cNvPr id="5" name="Fußzeilenplatzhalter 4">
             <a:extLst>
               <a:ext uri="{FF2B5EF4-FFF2-40B4-BE49-F238E27FC236}">
-                <a16:creationId xmlns:a16="http://schemas.microsoft.com/office/drawing/2014/main" xmlns="" id="{002B6804-B339-4589-A7B1-0F2319C47445}"/>
+                <a16:creationId xmlns:a16="http://schemas.microsoft.com/office/drawing/2014/main" id="{002B6804-B339-4589-A7B1-0F2319C47445}"/>
               </a:ext>
             </a:extLst>
           </p:cNvPr>
@@ -674,7 +685,7 @@
           <p:cNvPr id="6" name="Foliennummernplatzhalter 5">
             <a:extLst>
               <a:ext uri="{FF2B5EF4-FFF2-40B4-BE49-F238E27FC236}">
-                <a16:creationId xmlns:a16="http://schemas.microsoft.com/office/drawing/2014/main" xmlns="" id="{74E8F7EA-C9B6-492F-A528-122410219F45}"/>
+                <a16:creationId xmlns:a16="http://schemas.microsoft.com/office/drawing/2014/main" id="{74E8F7EA-C9B6-492F-A528-122410219F45}"/>
               </a:ext>
             </a:extLst>
           </p:cNvPr>
@@ -733,7 +744,7 @@
           <p:cNvPr id="2" name="Titel 1">
             <a:extLst>
               <a:ext uri="{FF2B5EF4-FFF2-40B4-BE49-F238E27FC236}">
-                <a16:creationId xmlns:a16="http://schemas.microsoft.com/office/drawing/2014/main" xmlns="" id="{EC8EB34A-6CA8-4518-B918-0B6FD7FBFD74}"/>
+                <a16:creationId xmlns:a16="http://schemas.microsoft.com/office/drawing/2014/main" id="{EC8EB34A-6CA8-4518-B918-0B6FD7FBFD74}"/>
               </a:ext>
             </a:extLst>
           </p:cNvPr>
@@ -761,7 +772,7 @@
           <p:cNvPr id="3" name="Vertikaler Textplatzhalter 2">
             <a:extLst>
               <a:ext uri="{FF2B5EF4-FFF2-40B4-BE49-F238E27FC236}">
-                <a16:creationId xmlns:a16="http://schemas.microsoft.com/office/drawing/2014/main" xmlns="" id="{09A5460F-5D03-4E09-8AD5-D8FA54A87B9E}"/>
+                <a16:creationId xmlns:a16="http://schemas.microsoft.com/office/drawing/2014/main" id="{09A5460F-5D03-4E09-8AD5-D8FA54A87B9E}"/>
               </a:ext>
             </a:extLst>
           </p:cNvPr>
@@ -818,7 +829,7 @@
           <p:cNvPr id="4" name="Datumsplatzhalter 3">
             <a:extLst>
               <a:ext uri="{FF2B5EF4-FFF2-40B4-BE49-F238E27FC236}">
-                <a16:creationId xmlns:a16="http://schemas.microsoft.com/office/drawing/2014/main" xmlns="" id="{54BF5B18-4CD6-47A7-906B-54B05584FBC3}"/>
+                <a16:creationId xmlns:a16="http://schemas.microsoft.com/office/drawing/2014/main" id="{54BF5B18-4CD6-47A7-906B-54B05584FBC3}"/>
               </a:ext>
             </a:extLst>
           </p:cNvPr>
@@ -836,7 +847,7 @@
           <a:p>
             <a:fld id="{DDC6096B-34AB-48A6-8B0B-AA3C911221CC}" type="datetime1">
               <a:rPr lang="de-DE" smtClean="0"/>
-              <a:t>26.03.18</a:t>
+              <a:t>27.03.2018</a:t>
             </a:fld>
             <a:endParaRPr lang="de-DE"/>
           </a:p>
@@ -847,7 +858,7 @@
           <p:cNvPr id="5" name="Fußzeilenplatzhalter 4">
             <a:extLst>
               <a:ext uri="{FF2B5EF4-FFF2-40B4-BE49-F238E27FC236}">
-                <a16:creationId xmlns:a16="http://schemas.microsoft.com/office/drawing/2014/main" xmlns="" id="{025004E2-97DF-4EF0-88CC-0B9930F3FAC7}"/>
+                <a16:creationId xmlns:a16="http://schemas.microsoft.com/office/drawing/2014/main" id="{025004E2-97DF-4EF0-88CC-0B9930F3FAC7}"/>
               </a:ext>
             </a:extLst>
           </p:cNvPr>
@@ -872,7 +883,7 @@
           <p:cNvPr id="6" name="Foliennummernplatzhalter 5">
             <a:extLst>
               <a:ext uri="{FF2B5EF4-FFF2-40B4-BE49-F238E27FC236}">
-                <a16:creationId xmlns:a16="http://schemas.microsoft.com/office/drawing/2014/main" xmlns="" id="{F78CAB8B-4EE1-4261-9262-994E8D389456}"/>
+                <a16:creationId xmlns:a16="http://schemas.microsoft.com/office/drawing/2014/main" id="{F78CAB8B-4EE1-4261-9262-994E8D389456}"/>
               </a:ext>
             </a:extLst>
           </p:cNvPr>
@@ -931,7 +942,7 @@
           <p:cNvPr id="2" name="Vertikaler Titel 1">
             <a:extLst>
               <a:ext uri="{FF2B5EF4-FFF2-40B4-BE49-F238E27FC236}">
-                <a16:creationId xmlns:a16="http://schemas.microsoft.com/office/drawing/2014/main" xmlns="" id="{B8EF1F10-3DD2-4400-A9ED-FC248A55D9D7}"/>
+                <a16:creationId xmlns:a16="http://schemas.microsoft.com/office/drawing/2014/main" id="{B8EF1F10-3DD2-4400-A9ED-FC248A55D9D7}"/>
               </a:ext>
             </a:extLst>
           </p:cNvPr>
@@ -964,7 +975,7 @@
           <p:cNvPr id="3" name="Vertikaler Textplatzhalter 2">
             <a:extLst>
               <a:ext uri="{FF2B5EF4-FFF2-40B4-BE49-F238E27FC236}">
-                <a16:creationId xmlns:a16="http://schemas.microsoft.com/office/drawing/2014/main" xmlns="" id="{F3444A10-1E2C-4191-B026-84BCCC9D81D4}"/>
+                <a16:creationId xmlns:a16="http://schemas.microsoft.com/office/drawing/2014/main" id="{F3444A10-1E2C-4191-B026-84BCCC9D81D4}"/>
               </a:ext>
             </a:extLst>
           </p:cNvPr>
@@ -1026,7 +1037,7 @@
           <p:cNvPr id="4" name="Datumsplatzhalter 3">
             <a:extLst>
               <a:ext uri="{FF2B5EF4-FFF2-40B4-BE49-F238E27FC236}">
-                <a16:creationId xmlns:a16="http://schemas.microsoft.com/office/drawing/2014/main" xmlns="" id="{1E1E074D-5C0D-48DA-B42D-17BB41F2E87E}"/>
+                <a16:creationId xmlns:a16="http://schemas.microsoft.com/office/drawing/2014/main" id="{1E1E074D-5C0D-48DA-B42D-17BB41F2E87E}"/>
               </a:ext>
             </a:extLst>
           </p:cNvPr>
@@ -1044,7 +1055,7 @@
           <a:p>
             <a:fld id="{407FD86E-BFFD-4661-835C-7D0E258F6D22}" type="datetime1">
               <a:rPr lang="de-DE" smtClean="0"/>
-              <a:t>26.03.18</a:t>
+              <a:t>27.03.2018</a:t>
             </a:fld>
             <a:endParaRPr lang="de-DE"/>
           </a:p>
@@ -1055,7 +1066,7 @@
           <p:cNvPr id="5" name="Fußzeilenplatzhalter 4">
             <a:extLst>
               <a:ext uri="{FF2B5EF4-FFF2-40B4-BE49-F238E27FC236}">
-                <a16:creationId xmlns:a16="http://schemas.microsoft.com/office/drawing/2014/main" xmlns="" id="{A2B4BF41-463C-4311-9EFC-BA708AFAFB0A}"/>
+                <a16:creationId xmlns:a16="http://schemas.microsoft.com/office/drawing/2014/main" id="{A2B4BF41-463C-4311-9EFC-BA708AFAFB0A}"/>
               </a:ext>
             </a:extLst>
           </p:cNvPr>
@@ -1080,7 +1091,7 @@
           <p:cNvPr id="6" name="Foliennummernplatzhalter 5">
             <a:extLst>
               <a:ext uri="{FF2B5EF4-FFF2-40B4-BE49-F238E27FC236}">
-                <a16:creationId xmlns:a16="http://schemas.microsoft.com/office/drawing/2014/main" xmlns="" id="{BBF93051-75E2-4C4C-A973-BD100EC29035}"/>
+                <a16:creationId xmlns:a16="http://schemas.microsoft.com/office/drawing/2014/main" id="{BBF93051-75E2-4C4C-A973-BD100EC29035}"/>
               </a:ext>
             </a:extLst>
           </p:cNvPr>
@@ -1139,7 +1150,7 @@
           <p:cNvPr id="2" name="Titel 1">
             <a:extLst>
               <a:ext uri="{FF2B5EF4-FFF2-40B4-BE49-F238E27FC236}">
-                <a16:creationId xmlns:a16="http://schemas.microsoft.com/office/drawing/2014/main" xmlns="" id="{C4EE41AB-8BD2-4C18-B8AF-7D3A12497695}"/>
+                <a16:creationId xmlns:a16="http://schemas.microsoft.com/office/drawing/2014/main" id="{C4EE41AB-8BD2-4C18-B8AF-7D3A12497695}"/>
               </a:ext>
             </a:extLst>
           </p:cNvPr>
@@ -1167,7 +1178,7 @@
           <p:cNvPr id="3" name="Inhaltsplatzhalter 2">
             <a:extLst>
               <a:ext uri="{FF2B5EF4-FFF2-40B4-BE49-F238E27FC236}">
-                <a16:creationId xmlns:a16="http://schemas.microsoft.com/office/drawing/2014/main" xmlns="" id="{7BB11243-D225-48CD-AFF9-64186D43EC1E}"/>
+                <a16:creationId xmlns:a16="http://schemas.microsoft.com/office/drawing/2014/main" id="{7BB11243-D225-48CD-AFF9-64186D43EC1E}"/>
               </a:ext>
             </a:extLst>
           </p:cNvPr>
@@ -1224,7 +1235,7 @@
           <p:cNvPr id="4" name="Datumsplatzhalter 3">
             <a:extLst>
               <a:ext uri="{FF2B5EF4-FFF2-40B4-BE49-F238E27FC236}">
-                <a16:creationId xmlns:a16="http://schemas.microsoft.com/office/drawing/2014/main" xmlns="" id="{F3CC708E-F96F-425F-867B-53523F205809}"/>
+                <a16:creationId xmlns:a16="http://schemas.microsoft.com/office/drawing/2014/main" id="{F3CC708E-F96F-425F-867B-53523F205809}"/>
               </a:ext>
             </a:extLst>
           </p:cNvPr>
@@ -1242,7 +1253,7 @@
           <a:p>
             <a:fld id="{0060243F-1866-4F8D-A2B2-76D33461B3CF}" type="datetime1">
               <a:rPr lang="de-DE" smtClean="0"/>
-              <a:t>26.03.18</a:t>
+              <a:t>27.03.2018</a:t>
             </a:fld>
             <a:endParaRPr lang="de-DE"/>
           </a:p>
@@ -1253,7 +1264,7 @@
           <p:cNvPr id="5" name="Fußzeilenplatzhalter 4">
             <a:extLst>
               <a:ext uri="{FF2B5EF4-FFF2-40B4-BE49-F238E27FC236}">
-                <a16:creationId xmlns:a16="http://schemas.microsoft.com/office/drawing/2014/main" xmlns="" id="{EC9383E3-AE45-4B1B-9706-67C370C4DE78}"/>
+                <a16:creationId xmlns:a16="http://schemas.microsoft.com/office/drawing/2014/main" id="{EC9383E3-AE45-4B1B-9706-67C370C4DE78}"/>
               </a:ext>
             </a:extLst>
           </p:cNvPr>
@@ -1278,7 +1289,7 @@
           <p:cNvPr id="6" name="Foliennummernplatzhalter 5">
             <a:extLst>
               <a:ext uri="{FF2B5EF4-FFF2-40B4-BE49-F238E27FC236}">
-                <a16:creationId xmlns:a16="http://schemas.microsoft.com/office/drawing/2014/main" xmlns="" id="{82BB7911-EA6D-448A-9055-381FFA87FD15}"/>
+                <a16:creationId xmlns:a16="http://schemas.microsoft.com/office/drawing/2014/main" id="{82BB7911-EA6D-448A-9055-381FFA87FD15}"/>
               </a:ext>
             </a:extLst>
           </p:cNvPr>
@@ -1337,7 +1348,7 @@
           <p:cNvPr id="2" name="Titel 1">
             <a:extLst>
               <a:ext uri="{FF2B5EF4-FFF2-40B4-BE49-F238E27FC236}">
-                <a16:creationId xmlns:a16="http://schemas.microsoft.com/office/drawing/2014/main" xmlns="" id="{F7EB64A0-A73B-4BD6-A5E9-EF5EB171158A}"/>
+                <a16:creationId xmlns:a16="http://schemas.microsoft.com/office/drawing/2014/main" id="{F7EB64A0-A73B-4BD6-A5E9-EF5EB171158A}"/>
               </a:ext>
             </a:extLst>
           </p:cNvPr>
@@ -1374,7 +1385,7 @@
           <p:cNvPr id="3" name="Textplatzhalter 2">
             <a:extLst>
               <a:ext uri="{FF2B5EF4-FFF2-40B4-BE49-F238E27FC236}">
-                <a16:creationId xmlns:a16="http://schemas.microsoft.com/office/drawing/2014/main" xmlns="" id="{6DB1B29C-1182-479E-825E-76F4FF413657}"/>
+                <a16:creationId xmlns:a16="http://schemas.microsoft.com/office/drawing/2014/main" id="{6DB1B29C-1182-479E-825E-76F4FF413657}"/>
               </a:ext>
             </a:extLst>
           </p:cNvPr>
@@ -1499,7 +1510,7 @@
           <p:cNvPr id="4" name="Datumsplatzhalter 3">
             <a:extLst>
               <a:ext uri="{FF2B5EF4-FFF2-40B4-BE49-F238E27FC236}">
-                <a16:creationId xmlns:a16="http://schemas.microsoft.com/office/drawing/2014/main" xmlns="" id="{F6B250BD-425E-4186-B40B-5594FF9C2697}"/>
+                <a16:creationId xmlns:a16="http://schemas.microsoft.com/office/drawing/2014/main" id="{F6B250BD-425E-4186-B40B-5594FF9C2697}"/>
               </a:ext>
             </a:extLst>
           </p:cNvPr>
@@ -1517,7 +1528,7 @@
           <a:p>
             <a:fld id="{30F3688E-8457-4C6B-8C67-700B1B4DC1E7}" type="datetime1">
               <a:rPr lang="de-DE" smtClean="0"/>
-              <a:t>26.03.18</a:t>
+              <a:t>27.03.2018</a:t>
             </a:fld>
             <a:endParaRPr lang="de-DE"/>
           </a:p>
@@ -1528,7 +1539,7 @@
           <p:cNvPr id="5" name="Fußzeilenplatzhalter 4">
             <a:extLst>
               <a:ext uri="{FF2B5EF4-FFF2-40B4-BE49-F238E27FC236}">
-                <a16:creationId xmlns:a16="http://schemas.microsoft.com/office/drawing/2014/main" xmlns="" id="{A64762E0-B1B9-4BCD-8C3D-B6AB09DAFF3E}"/>
+                <a16:creationId xmlns:a16="http://schemas.microsoft.com/office/drawing/2014/main" id="{A64762E0-B1B9-4BCD-8C3D-B6AB09DAFF3E}"/>
               </a:ext>
             </a:extLst>
           </p:cNvPr>
@@ -1553,7 +1564,7 @@
           <p:cNvPr id="6" name="Foliennummernplatzhalter 5">
             <a:extLst>
               <a:ext uri="{FF2B5EF4-FFF2-40B4-BE49-F238E27FC236}">
-                <a16:creationId xmlns:a16="http://schemas.microsoft.com/office/drawing/2014/main" xmlns="" id="{08248617-91F7-4D23-872F-952F226380E4}"/>
+                <a16:creationId xmlns:a16="http://schemas.microsoft.com/office/drawing/2014/main" id="{08248617-91F7-4D23-872F-952F226380E4}"/>
               </a:ext>
             </a:extLst>
           </p:cNvPr>
@@ -1612,7 +1623,7 @@
           <p:cNvPr id="2" name="Titel 1">
             <a:extLst>
               <a:ext uri="{FF2B5EF4-FFF2-40B4-BE49-F238E27FC236}">
-                <a16:creationId xmlns:a16="http://schemas.microsoft.com/office/drawing/2014/main" xmlns="" id="{65A955DD-42A8-4F89-BB48-220A47174945}"/>
+                <a16:creationId xmlns:a16="http://schemas.microsoft.com/office/drawing/2014/main" id="{65A955DD-42A8-4F89-BB48-220A47174945}"/>
               </a:ext>
             </a:extLst>
           </p:cNvPr>
@@ -1640,7 +1651,7 @@
           <p:cNvPr id="3" name="Inhaltsplatzhalter 2">
             <a:extLst>
               <a:ext uri="{FF2B5EF4-FFF2-40B4-BE49-F238E27FC236}">
-                <a16:creationId xmlns:a16="http://schemas.microsoft.com/office/drawing/2014/main" xmlns="" id="{63E73B94-2695-4767-94E6-E546AE2D73A2}"/>
+                <a16:creationId xmlns:a16="http://schemas.microsoft.com/office/drawing/2014/main" id="{63E73B94-2695-4767-94E6-E546AE2D73A2}"/>
               </a:ext>
             </a:extLst>
           </p:cNvPr>
@@ -1702,7 +1713,7 @@
           <p:cNvPr id="4" name="Inhaltsplatzhalter 3">
             <a:extLst>
               <a:ext uri="{FF2B5EF4-FFF2-40B4-BE49-F238E27FC236}">
-                <a16:creationId xmlns:a16="http://schemas.microsoft.com/office/drawing/2014/main" xmlns="" id="{12F70BFE-CDD9-4F3F-95D1-87CD1D696576}"/>
+                <a16:creationId xmlns:a16="http://schemas.microsoft.com/office/drawing/2014/main" id="{12F70BFE-CDD9-4F3F-95D1-87CD1D696576}"/>
               </a:ext>
             </a:extLst>
           </p:cNvPr>
@@ -1764,7 +1775,7 @@
           <p:cNvPr id="5" name="Datumsplatzhalter 4">
             <a:extLst>
               <a:ext uri="{FF2B5EF4-FFF2-40B4-BE49-F238E27FC236}">
-                <a16:creationId xmlns:a16="http://schemas.microsoft.com/office/drawing/2014/main" xmlns="" id="{8A565719-570F-4D90-AB57-9A538F0BDBC6}"/>
+                <a16:creationId xmlns:a16="http://schemas.microsoft.com/office/drawing/2014/main" id="{8A565719-570F-4D90-AB57-9A538F0BDBC6}"/>
               </a:ext>
             </a:extLst>
           </p:cNvPr>
@@ -1782,7 +1793,7 @@
           <a:p>
             <a:fld id="{41230D57-A438-4C3F-9F84-4C5C291E5A5F}" type="datetime1">
               <a:rPr lang="de-DE" smtClean="0"/>
-              <a:t>26.03.18</a:t>
+              <a:t>27.03.2018</a:t>
             </a:fld>
             <a:endParaRPr lang="de-DE"/>
           </a:p>
@@ -1793,7 +1804,7 @@
           <p:cNvPr id="6" name="Fußzeilenplatzhalter 5">
             <a:extLst>
               <a:ext uri="{FF2B5EF4-FFF2-40B4-BE49-F238E27FC236}">
-                <a16:creationId xmlns:a16="http://schemas.microsoft.com/office/drawing/2014/main" xmlns="" id="{72A0590A-8068-4022-B0D6-18311A8E7421}"/>
+                <a16:creationId xmlns:a16="http://schemas.microsoft.com/office/drawing/2014/main" id="{72A0590A-8068-4022-B0D6-18311A8E7421}"/>
               </a:ext>
             </a:extLst>
           </p:cNvPr>
@@ -1818,7 +1829,7 @@
           <p:cNvPr id="7" name="Foliennummernplatzhalter 6">
             <a:extLst>
               <a:ext uri="{FF2B5EF4-FFF2-40B4-BE49-F238E27FC236}">
-                <a16:creationId xmlns:a16="http://schemas.microsoft.com/office/drawing/2014/main" xmlns="" id="{C83166D0-9F64-495C-9E4F-5A65927073B3}"/>
+                <a16:creationId xmlns:a16="http://schemas.microsoft.com/office/drawing/2014/main" id="{C83166D0-9F64-495C-9E4F-5A65927073B3}"/>
               </a:ext>
             </a:extLst>
           </p:cNvPr>
@@ -1877,7 +1888,7 @@
           <p:cNvPr id="2" name="Titel 1">
             <a:extLst>
               <a:ext uri="{FF2B5EF4-FFF2-40B4-BE49-F238E27FC236}">
-                <a16:creationId xmlns:a16="http://schemas.microsoft.com/office/drawing/2014/main" xmlns="" id="{1C417242-0BDC-4FFF-852D-6284D0A90826}"/>
+                <a16:creationId xmlns:a16="http://schemas.microsoft.com/office/drawing/2014/main" id="{1C417242-0BDC-4FFF-852D-6284D0A90826}"/>
               </a:ext>
             </a:extLst>
           </p:cNvPr>
@@ -1910,7 +1921,7 @@
           <p:cNvPr id="3" name="Textplatzhalter 2">
             <a:extLst>
               <a:ext uri="{FF2B5EF4-FFF2-40B4-BE49-F238E27FC236}">
-                <a16:creationId xmlns:a16="http://schemas.microsoft.com/office/drawing/2014/main" xmlns="" id="{1B30064E-271D-47A2-BC0C-925A7546C475}"/>
+                <a16:creationId xmlns:a16="http://schemas.microsoft.com/office/drawing/2014/main" id="{1B30064E-271D-47A2-BC0C-925A7546C475}"/>
               </a:ext>
             </a:extLst>
           </p:cNvPr>
@@ -1981,7 +1992,7 @@
           <p:cNvPr id="4" name="Inhaltsplatzhalter 3">
             <a:extLst>
               <a:ext uri="{FF2B5EF4-FFF2-40B4-BE49-F238E27FC236}">
-                <a16:creationId xmlns:a16="http://schemas.microsoft.com/office/drawing/2014/main" xmlns="" id="{6F27B6C5-5982-4A68-91FD-06F07638CEA6}"/>
+                <a16:creationId xmlns:a16="http://schemas.microsoft.com/office/drawing/2014/main" id="{6F27B6C5-5982-4A68-91FD-06F07638CEA6}"/>
               </a:ext>
             </a:extLst>
           </p:cNvPr>
@@ -2043,7 +2054,7 @@
           <p:cNvPr id="5" name="Textplatzhalter 4">
             <a:extLst>
               <a:ext uri="{FF2B5EF4-FFF2-40B4-BE49-F238E27FC236}">
-                <a16:creationId xmlns:a16="http://schemas.microsoft.com/office/drawing/2014/main" xmlns="" id="{C7604F73-6C89-4198-BB8F-B837C02FC668}"/>
+                <a16:creationId xmlns:a16="http://schemas.microsoft.com/office/drawing/2014/main" id="{C7604F73-6C89-4198-BB8F-B837C02FC668}"/>
               </a:ext>
             </a:extLst>
           </p:cNvPr>
@@ -2114,7 +2125,7 @@
           <p:cNvPr id="6" name="Inhaltsplatzhalter 5">
             <a:extLst>
               <a:ext uri="{FF2B5EF4-FFF2-40B4-BE49-F238E27FC236}">
-                <a16:creationId xmlns:a16="http://schemas.microsoft.com/office/drawing/2014/main" xmlns="" id="{325AA58D-18A1-4DA7-934F-612D75CE806F}"/>
+                <a16:creationId xmlns:a16="http://schemas.microsoft.com/office/drawing/2014/main" id="{325AA58D-18A1-4DA7-934F-612D75CE806F}"/>
               </a:ext>
             </a:extLst>
           </p:cNvPr>
@@ -2176,7 +2187,7 @@
           <p:cNvPr id="7" name="Datumsplatzhalter 6">
             <a:extLst>
               <a:ext uri="{FF2B5EF4-FFF2-40B4-BE49-F238E27FC236}">
-                <a16:creationId xmlns:a16="http://schemas.microsoft.com/office/drawing/2014/main" xmlns="" id="{9F15F3D8-5C2F-417C-B257-549166BA28AE}"/>
+                <a16:creationId xmlns:a16="http://schemas.microsoft.com/office/drawing/2014/main" id="{9F15F3D8-5C2F-417C-B257-549166BA28AE}"/>
               </a:ext>
             </a:extLst>
           </p:cNvPr>
@@ -2194,7 +2205,7 @@
           <a:p>
             <a:fld id="{AF62F608-86F1-40CF-82FC-1C147C3DD224}" type="datetime1">
               <a:rPr lang="de-DE" smtClean="0"/>
-              <a:t>26.03.18</a:t>
+              <a:t>27.03.2018</a:t>
             </a:fld>
             <a:endParaRPr lang="de-DE"/>
           </a:p>
@@ -2205,7 +2216,7 @@
           <p:cNvPr id="8" name="Fußzeilenplatzhalter 7">
             <a:extLst>
               <a:ext uri="{FF2B5EF4-FFF2-40B4-BE49-F238E27FC236}">
-                <a16:creationId xmlns:a16="http://schemas.microsoft.com/office/drawing/2014/main" xmlns="" id="{475FF603-B123-4D53-95C9-BC1941CFEF51}"/>
+                <a16:creationId xmlns:a16="http://schemas.microsoft.com/office/drawing/2014/main" id="{475FF603-B123-4D53-95C9-BC1941CFEF51}"/>
               </a:ext>
             </a:extLst>
           </p:cNvPr>
@@ -2230,7 +2241,7 @@
           <p:cNvPr id="9" name="Foliennummernplatzhalter 8">
             <a:extLst>
               <a:ext uri="{FF2B5EF4-FFF2-40B4-BE49-F238E27FC236}">
-                <a16:creationId xmlns:a16="http://schemas.microsoft.com/office/drawing/2014/main" xmlns="" id="{5DF1DD4F-A8A7-4D67-AD7E-9EF2D2190292}"/>
+                <a16:creationId xmlns:a16="http://schemas.microsoft.com/office/drawing/2014/main" id="{5DF1DD4F-A8A7-4D67-AD7E-9EF2D2190292}"/>
               </a:ext>
             </a:extLst>
           </p:cNvPr>
@@ -2289,7 +2300,7 @@
           <p:cNvPr id="2" name="Titel 1">
             <a:extLst>
               <a:ext uri="{FF2B5EF4-FFF2-40B4-BE49-F238E27FC236}">
-                <a16:creationId xmlns:a16="http://schemas.microsoft.com/office/drawing/2014/main" xmlns="" id="{93F79F45-E779-4E72-89D3-932934929361}"/>
+                <a16:creationId xmlns:a16="http://schemas.microsoft.com/office/drawing/2014/main" id="{93F79F45-E779-4E72-89D3-932934929361}"/>
               </a:ext>
             </a:extLst>
           </p:cNvPr>
@@ -2317,7 +2328,7 @@
           <p:cNvPr id="3" name="Datumsplatzhalter 2">
             <a:extLst>
               <a:ext uri="{FF2B5EF4-FFF2-40B4-BE49-F238E27FC236}">
-                <a16:creationId xmlns:a16="http://schemas.microsoft.com/office/drawing/2014/main" xmlns="" id="{557E0A61-9814-4B3F-ABB5-BA450BD4068D}"/>
+                <a16:creationId xmlns:a16="http://schemas.microsoft.com/office/drawing/2014/main" id="{557E0A61-9814-4B3F-ABB5-BA450BD4068D}"/>
               </a:ext>
             </a:extLst>
           </p:cNvPr>
@@ -2335,7 +2346,7 @@
           <a:p>
             <a:fld id="{A171A553-3517-40AF-B856-21919B4E6188}" type="datetime1">
               <a:rPr lang="de-DE" smtClean="0"/>
-              <a:t>26.03.18</a:t>
+              <a:t>27.03.2018</a:t>
             </a:fld>
             <a:endParaRPr lang="de-DE"/>
           </a:p>
@@ -2346,7 +2357,7 @@
           <p:cNvPr id="4" name="Fußzeilenplatzhalter 3">
             <a:extLst>
               <a:ext uri="{FF2B5EF4-FFF2-40B4-BE49-F238E27FC236}">
-                <a16:creationId xmlns:a16="http://schemas.microsoft.com/office/drawing/2014/main" xmlns="" id="{A87ACCDF-3E97-4BD5-B604-C724D5F158A3}"/>
+                <a16:creationId xmlns:a16="http://schemas.microsoft.com/office/drawing/2014/main" id="{A87ACCDF-3E97-4BD5-B604-C724D5F158A3}"/>
               </a:ext>
             </a:extLst>
           </p:cNvPr>
@@ -2371,7 +2382,7 @@
           <p:cNvPr id="5" name="Foliennummernplatzhalter 4">
             <a:extLst>
               <a:ext uri="{FF2B5EF4-FFF2-40B4-BE49-F238E27FC236}">
-                <a16:creationId xmlns:a16="http://schemas.microsoft.com/office/drawing/2014/main" xmlns="" id="{EF38A0D8-245A-4FB4-AA78-4A88E3E23565}"/>
+                <a16:creationId xmlns:a16="http://schemas.microsoft.com/office/drawing/2014/main" id="{EF38A0D8-245A-4FB4-AA78-4A88E3E23565}"/>
               </a:ext>
             </a:extLst>
           </p:cNvPr>
@@ -2430,7 +2441,7 @@
           <p:cNvPr id="2" name="Datumsplatzhalter 1">
             <a:extLst>
               <a:ext uri="{FF2B5EF4-FFF2-40B4-BE49-F238E27FC236}">
-                <a16:creationId xmlns:a16="http://schemas.microsoft.com/office/drawing/2014/main" xmlns="" id="{F1D8BBAD-C5C8-46E0-9976-5F920E34DD7E}"/>
+                <a16:creationId xmlns:a16="http://schemas.microsoft.com/office/drawing/2014/main" id="{F1D8BBAD-C5C8-46E0-9976-5F920E34DD7E}"/>
               </a:ext>
             </a:extLst>
           </p:cNvPr>
@@ -2448,7 +2459,7 @@
           <a:p>
             <a:fld id="{793C024D-9082-4157-A667-CF73921D3E21}" type="datetime1">
               <a:rPr lang="de-DE" smtClean="0"/>
-              <a:t>26.03.18</a:t>
+              <a:t>27.03.2018</a:t>
             </a:fld>
             <a:endParaRPr lang="de-DE"/>
           </a:p>
@@ -2459,7 +2470,7 @@
           <p:cNvPr id="3" name="Fußzeilenplatzhalter 2">
             <a:extLst>
               <a:ext uri="{FF2B5EF4-FFF2-40B4-BE49-F238E27FC236}">
-                <a16:creationId xmlns:a16="http://schemas.microsoft.com/office/drawing/2014/main" xmlns="" id="{EA926F46-ACF0-410A-8472-6D818E306994}"/>
+                <a16:creationId xmlns:a16="http://schemas.microsoft.com/office/drawing/2014/main" id="{EA926F46-ACF0-410A-8472-6D818E306994}"/>
               </a:ext>
             </a:extLst>
           </p:cNvPr>
@@ -2484,7 +2495,7 @@
           <p:cNvPr id="4" name="Foliennummernplatzhalter 3">
             <a:extLst>
               <a:ext uri="{FF2B5EF4-FFF2-40B4-BE49-F238E27FC236}">
-                <a16:creationId xmlns:a16="http://schemas.microsoft.com/office/drawing/2014/main" xmlns="" id="{E8EE1B76-7EA0-4153-B9B3-C7FAC9E2E38E}"/>
+                <a16:creationId xmlns:a16="http://schemas.microsoft.com/office/drawing/2014/main" id="{E8EE1B76-7EA0-4153-B9B3-C7FAC9E2E38E}"/>
               </a:ext>
             </a:extLst>
           </p:cNvPr>
@@ -2543,7 +2554,7 @@
           <p:cNvPr id="2" name="Titel 1">
             <a:extLst>
               <a:ext uri="{FF2B5EF4-FFF2-40B4-BE49-F238E27FC236}">
-                <a16:creationId xmlns:a16="http://schemas.microsoft.com/office/drawing/2014/main" xmlns="" id="{E7DFF31F-2E58-4CFC-89ED-0CD1719642AB}"/>
+                <a16:creationId xmlns:a16="http://schemas.microsoft.com/office/drawing/2014/main" id="{E7DFF31F-2E58-4CFC-89ED-0CD1719642AB}"/>
               </a:ext>
             </a:extLst>
           </p:cNvPr>
@@ -2580,7 +2591,7 @@
           <p:cNvPr id="3" name="Inhaltsplatzhalter 2">
             <a:extLst>
               <a:ext uri="{FF2B5EF4-FFF2-40B4-BE49-F238E27FC236}">
-                <a16:creationId xmlns:a16="http://schemas.microsoft.com/office/drawing/2014/main" xmlns="" id="{8212DCFE-5A6E-4AB1-B413-7D1A81EC5A5B}"/>
+                <a16:creationId xmlns:a16="http://schemas.microsoft.com/office/drawing/2014/main" id="{8212DCFE-5A6E-4AB1-B413-7D1A81EC5A5B}"/>
               </a:ext>
             </a:extLst>
           </p:cNvPr>
@@ -2670,7 +2681,7 @@
           <p:cNvPr id="4" name="Textplatzhalter 3">
             <a:extLst>
               <a:ext uri="{FF2B5EF4-FFF2-40B4-BE49-F238E27FC236}">
-                <a16:creationId xmlns:a16="http://schemas.microsoft.com/office/drawing/2014/main" xmlns="" id="{D013B7DF-6A86-4B2A-87B0-C088184D3DC9}"/>
+                <a16:creationId xmlns:a16="http://schemas.microsoft.com/office/drawing/2014/main" id="{D013B7DF-6A86-4B2A-87B0-C088184D3DC9}"/>
               </a:ext>
             </a:extLst>
           </p:cNvPr>
@@ -2741,7 +2752,7 @@
           <p:cNvPr id="5" name="Datumsplatzhalter 4">
             <a:extLst>
               <a:ext uri="{FF2B5EF4-FFF2-40B4-BE49-F238E27FC236}">
-                <a16:creationId xmlns:a16="http://schemas.microsoft.com/office/drawing/2014/main" xmlns="" id="{4A933A87-552D-4B49-B6AF-5C3504349897}"/>
+                <a16:creationId xmlns:a16="http://schemas.microsoft.com/office/drawing/2014/main" id="{4A933A87-552D-4B49-B6AF-5C3504349897}"/>
               </a:ext>
             </a:extLst>
           </p:cNvPr>
@@ -2759,7 +2770,7 @@
           <a:p>
             <a:fld id="{CB9F0996-3986-4BD0-AC2D-F5F802D0DF4C}" type="datetime1">
               <a:rPr lang="de-DE" smtClean="0"/>
-              <a:t>26.03.18</a:t>
+              <a:t>27.03.2018</a:t>
             </a:fld>
             <a:endParaRPr lang="de-DE"/>
           </a:p>
@@ -2770,7 +2781,7 @@
           <p:cNvPr id="6" name="Fußzeilenplatzhalter 5">
             <a:extLst>
               <a:ext uri="{FF2B5EF4-FFF2-40B4-BE49-F238E27FC236}">
-                <a16:creationId xmlns:a16="http://schemas.microsoft.com/office/drawing/2014/main" xmlns="" id="{E4837E9A-470C-4E90-B748-2EBC9AF2FBCF}"/>
+                <a16:creationId xmlns:a16="http://schemas.microsoft.com/office/drawing/2014/main" id="{E4837E9A-470C-4E90-B748-2EBC9AF2FBCF}"/>
               </a:ext>
             </a:extLst>
           </p:cNvPr>
@@ -2795,7 +2806,7 @@
           <p:cNvPr id="7" name="Foliennummernplatzhalter 6">
             <a:extLst>
               <a:ext uri="{FF2B5EF4-FFF2-40B4-BE49-F238E27FC236}">
-                <a16:creationId xmlns:a16="http://schemas.microsoft.com/office/drawing/2014/main" xmlns="" id="{1E9F074A-452F-4A0D-9C3C-766560CC2776}"/>
+                <a16:creationId xmlns:a16="http://schemas.microsoft.com/office/drawing/2014/main" id="{1E9F074A-452F-4A0D-9C3C-766560CC2776}"/>
               </a:ext>
             </a:extLst>
           </p:cNvPr>
@@ -2854,7 +2865,7 @@
           <p:cNvPr id="2" name="Titel 1">
             <a:extLst>
               <a:ext uri="{FF2B5EF4-FFF2-40B4-BE49-F238E27FC236}">
-                <a16:creationId xmlns:a16="http://schemas.microsoft.com/office/drawing/2014/main" xmlns="" id="{5759C210-72B7-40E9-BCCE-7F2CD288D111}"/>
+                <a16:creationId xmlns:a16="http://schemas.microsoft.com/office/drawing/2014/main" id="{5759C210-72B7-40E9-BCCE-7F2CD288D111}"/>
               </a:ext>
             </a:extLst>
           </p:cNvPr>
@@ -2891,7 +2902,7 @@
           <p:cNvPr id="3" name="Bildplatzhalter 2">
             <a:extLst>
               <a:ext uri="{FF2B5EF4-FFF2-40B4-BE49-F238E27FC236}">
-                <a16:creationId xmlns:a16="http://schemas.microsoft.com/office/drawing/2014/main" xmlns="" id="{A855A97A-E73E-4799-B44D-4C7542A492D8}"/>
+                <a16:creationId xmlns:a16="http://schemas.microsoft.com/office/drawing/2014/main" id="{A855A97A-E73E-4799-B44D-4C7542A492D8}"/>
               </a:ext>
             </a:extLst>
           </p:cNvPr>
@@ -2958,7 +2969,7 @@
           <p:cNvPr id="4" name="Textplatzhalter 3">
             <a:extLst>
               <a:ext uri="{FF2B5EF4-FFF2-40B4-BE49-F238E27FC236}">
-                <a16:creationId xmlns:a16="http://schemas.microsoft.com/office/drawing/2014/main" xmlns="" id="{7255A853-78E3-4163-B55A-CC8EC226F808}"/>
+                <a16:creationId xmlns:a16="http://schemas.microsoft.com/office/drawing/2014/main" id="{7255A853-78E3-4163-B55A-CC8EC226F808}"/>
               </a:ext>
             </a:extLst>
           </p:cNvPr>
@@ -3029,7 +3040,7 @@
           <p:cNvPr id="5" name="Datumsplatzhalter 4">
             <a:extLst>
               <a:ext uri="{FF2B5EF4-FFF2-40B4-BE49-F238E27FC236}">
-                <a16:creationId xmlns:a16="http://schemas.microsoft.com/office/drawing/2014/main" xmlns="" id="{9D40D17D-F70E-4544-85A0-FCF3746AE954}"/>
+                <a16:creationId xmlns:a16="http://schemas.microsoft.com/office/drawing/2014/main" id="{9D40D17D-F70E-4544-85A0-FCF3746AE954}"/>
               </a:ext>
             </a:extLst>
           </p:cNvPr>
@@ -3047,7 +3058,7 @@
           <a:p>
             <a:fld id="{B53546CB-57F0-403A-9B11-F28CD8787C4F}" type="datetime1">
               <a:rPr lang="de-DE" smtClean="0"/>
-              <a:t>26.03.18</a:t>
+              <a:t>27.03.2018</a:t>
             </a:fld>
             <a:endParaRPr lang="de-DE"/>
           </a:p>
@@ -3058,7 +3069,7 @@
           <p:cNvPr id="6" name="Fußzeilenplatzhalter 5">
             <a:extLst>
               <a:ext uri="{FF2B5EF4-FFF2-40B4-BE49-F238E27FC236}">
-                <a16:creationId xmlns:a16="http://schemas.microsoft.com/office/drawing/2014/main" xmlns="" id="{82D42832-B50B-45A6-BB41-75BA707E4D6D}"/>
+                <a16:creationId xmlns:a16="http://schemas.microsoft.com/office/drawing/2014/main" id="{82D42832-B50B-45A6-BB41-75BA707E4D6D}"/>
               </a:ext>
             </a:extLst>
           </p:cNvPr>
@@ -3083,7 +3094,7 @@
           <p:cNvPr id="7" name="Foliennummernplatzhalter 6">
             <a:extLst>
               <a:ext uri="{FF2B5EF4-FFF2-40B4-BE49-F238E27FC236}">
-                <a16:creationId xmlns:a16="http://schemas.microsoft.com/office/drawing/2014/main" xmlns="" id="{EF370A13-2AD6-42F3-82DD-A8915D68F84F}"/>
+                <a16:creationId xmlns:a16="http://schemas.microsoft.com/office/drawing/2014/main" id="{EF370A13-2AD6-42F3-82DD-A8915D68F84F}"/>
               </a:ext>
             </a:extLst>
           </p:cNvPr>
@@ -3147,7 +3158,7 @@
           <p:cNvPr id="2" name="Titelplatzhalter 1">
             <a:extLst>
               <a:ext uri="{FF2B5EF4-FFF2-40B4-BE49-F238E27FC236}">
-                <a16:creationId xmlns:a16="http://schemas.microsoft.com/office/drawing/2014/main" xmlns="" id="{FF15E65D-7224-4547-A8B7-E018D79D5167}"/>
+                <a16:creationId xmlns:a16="http://schemas.microsoft.com/office/drawing/2014/main" id="{FF15E65D-7224-4547-A8B7-E018D79D5167}"/>
               </a:ext>
             </a:extLst>
           </p:cNvPr>
@@ -3185,7 +3196,7 @@
           <p:cNvPr id="3" name="Textplatzhalter 2">
             <a:extLst>
               <a:ext uri="{FF2B5EF4-FFF2-40B4-BE49-F238E27FC236}">
-                <a16:creationId xmlns:a16="http://schemas.microsoft.com/office/drawing/2014/main" xmlns="" id="{8E2E0B7E-1806-4C10-B430-114E71BCA475}"/>
+                <a16:creationId xmlns:a16="http://schemas.microsoft.com/office/drawing/2014/main" id="{8E2E0B7E-1806-4C10-B430-114E71BCA475}"/>
               </a:ext>
             </a:extLst>
           </p:cNvPr>
@@ -3252,7 +3263,7 @@
           <p:cNvPr id="4" name="Datumsplatzhalter 3">
             <a:extLst>
               <a:ext uri="{FF2B5EF4-FFF2-40B4-BE49-F238E27FC236}">
-                <a16:creationId xmlns:a16="http://schemas.microsoft.com/office/drawing/2014/main" xmlns="" id="{12E9677D-D9AF-4D85-9076-FB6608EF8D05}"/>
+                <a16:creationId xmlns:a16="http://schemas.microsoft.com/office/drawing/2014/main" id="{12E9677D-D9AF-4D85-9076-FB6608EF8D05}"/>
               </a:ext>
             </a:extLst>
           </p:cNvPr>
@@ -3288,7 +3299,7 @@
           <a:p>
             <a:fld id="{1D3C1B12-7E54-4267-9D51-05EAB2BDC53B}" type="datetime1">
               <a:rPr lang="de-DE" smtClean="0"/>
-              <a:t>26.03.18</a:t>
+              <a:t>27.03.2018</a:t>
             </a:fld>
             <a:endParaRPr lang="de-DE"/>
           </a:p>
@@ -3299,7 +3310,7 @@
           <p:cNvPr id="5" name="Fußzeilenplatzhalter 4">
             <a:extLst>
               <a:ext uri="{FF2B5EF4-FFF2-40B4-BE49-F238E27FC236}">
-                <a16:creationId xmlns:a16="http://schemas.microsoft.com/office/drawing/2014/main" xmlns="" id="{DEB9152B-6562-474B-911B-6C7817AC474B}"/>
+                <a16:creationId xmlns:a16="http://schemas.microsoft.com/office/drawing/2014/main" id="{DEB9152B-6562-474B-911B-6C7817AC474B}"/>
               </a:ext>
             </a:extLst>
           </p:cNvPr>
@@ -3342,7 +3353,7 @@
           <p:cNvPr id="6" name="Foliennummernplatzhalter 5">
             <a:extLst>
               <a:ext uri="{FF2B5EF4-FFF2-40B4-BE49-F238E27FC236}">
-                <a16:creationId xmlns:a16="http://schemas.microsoft.com/office/drawing/2014/main" xmlns="" id="{31DE64A8-71CB-4F9B-9C42-378CEF45D891}"/>
+                <a16:creationId xmlns:a16="http://schemas.microsoft.com/office/drawing/2014/main" id="{31DE64A8-71CB-4F9B-9C42-378CEF45D891}"/>
               </a:ext>
             </a:extLst>
           </p:cNvPr>
@@ -3711,7 +3722,7 @@
           <p:cNvPr id="5" name="Title 4">
             <a:extLst>
               <a:ext uri="{FF2B5EF4-FFF2-40B4-BE49-F238E27FC236}">
-                <a16:creationId xmlns:a16="http://schemas.microsoft.com/office/drawing/2014/main" xmlns="" id="{3DB679FE-7AB8-452C-9056-DB9A71D8FBB7}"/>
+                <a16:creationId xmlns:a16="http://schemas.microsoft.com/office/drawing/2014/main" id="{3DB679FE-7AB8-452C-9056-DB9A71D8FBB7}"/>
               </a:ext>
             </a:extLst>
           </p:cNvPr>
@@ -3739,7 +3750,7 @@
           <p:cNvPr id="6" name="Content Placeholder 5">
             <a:extLst>
               <a:ext uri="{FF2B5EF4-FFF2-40B4-BE49-F238E27FC236}">
-                <a16:creationId xmlns:a16="http://schemas.microsoft.com/office/drawing/2014/main" xmlns="" id="{6209D8CB-5E61-484E-9162-79AAB377D1C3}"/>
+                <a16:creationId xmlns:a16="http://schemas.microsoft.com/office/drawing/2014/main" id="{6209D8CB-5E61-484E-9162-79AAB377D1C3}"/>
               </a:ext>
             </a:extLst>
           </p:cNvPr>
@@ -3893,7 +3904,7 @@
           <p:cNvPr id="4" name="Slide Number Placeholder 3">
             <a:extLst>
               <a:ext uri="{FF2B5EF4-FFF2-40B4-BE49-F238E27FC236}">
-                <a16:creationId xmlns:a16="http://schemas.microsoft.com/office/drawing/2014/main" xmlns="" id="{88BB8228-97AC-4492-A356-F36497FBE06E}"/>
+                <a16:creationId xmlns:a16="http://schemas.microsoft.com/office/drawing/2014/main" id="{88BB8228-97AC-4492-A356-F36497FBE06E}"/>
               </a:ext>
             </a:extLst>
           </p:cNvPr>
@@ -3927,14 +3938,6 @@
   <p:clrMapOvr>
     <a:masterClrMapping/>
   </p:clrMapOvr>
-  <mc:AlternateContent xmlns:mc="http://schemas.openxmlformats.org/markup-compatibility/2006">
-    <mc:Choice xmlns:p14="http://schemas.microsoft.com/office/powerpoint/2010/main" Requires="p14">
-      <p:transition spd="slow" p14:dur="2000"/>
-    </mc:Choice>
-    <mc:Fallback>
-      <p:transition xmlns:p14="http://schemas.microsoft.com/office/powerpoint/2010/main" spd="slow"/>
-    </mc:Fallback>
-  </mc:AlternateContent>
 </p:sld>
 </file>
 
@@ -3960,7 +3963,7 @@
           <p:cNvPr id="2" name="Title 1">
             <a:extLst>
               <a:ext uri="{FF2B5EF4-FFF2-40B4-BE49-F238E27FC236}">
-                <a16:creationId xmlns:a16="http://schemas.microsoft.com/office/drawing/2014/main" xmlns="" id="{EC71ED69-ECE5-4FEA-BAAC-2D3FD4AEF4CF}"/>
+                <a16:creationId xmlns:a16="http://schemas.microsoft.com/office/drawing/2014/main" id="{EC71ED69-ECE5-4FEA-BAAC-2D3FD4AEF4CF}"/>
               </a:ext>
             </a:extLst>
           </p:cNvPr>
@@ -3978,10 +3981,9 @@
           <a:p>
             <a:pPr algn="ctr"/>
             <a:r>
-              <a:rPr lang="de-DE" dirty="0" smtClean="0"/>
+              <a:rPr lang="de-DE" dirty="0"/>
               <a:t>Bewegungsmuster</a:t>
             </a:r>
-            <a:endParaRPr lang="de-DE" dirty="0"/>
           </a:p>
         </p:txBody>
       </p:sp>
@@ -3990,7 +3992,7 @@
           <p:cNvPr id="5" name="Content Placeholder 4">
             <a:extLst>
               <a:ext uri="{FF2B5EF4-FFF2-40B4-BE49-F238E27FC236}">
-                <a16:creationId xmlns:a16="http://schemas.microsoft.com/office/drawing/2014/main" xmlns="" id="{556F42A2-DCA4-4B1C-A056-51A3547A9BE0}"/>
+                <a16:creationId xmlns:a16="http://schemas.microsoft.com/office/drawing/2014/main" id="{556F42A2-DCA4-4B1C-A056-51A3547A9BE0}"/>
               </a:ext>
             </a:extLst>
           </p:cNvPr>
@@ -4015,56 +4017,56 @@
                 <a:gridCol w="563946">
                   <a:extLst>
                     <a:ext uri="{9D8B030D-6E8A-4147-A177-3AD203B41FA5}">
-                      <a16:colId xmlns:a16="http://schemas.microsoft.com/office/drawing/2014/main" xmlns="" val="3909669187"/>
+                      <a16:colId xmlns:a16="http://schemas.microsoft.com/office/drawing/2014/main" val="3909669187"/>
                     </a:ext>
                   </a:extLst>
                 </a:gridCol>
                 <a:gridCol w="563946">
                   <a:extLst>
                     <a:ext uri="{9D8B030D-6E8A-4147-A177-3AD203B41FA5}">
-                      <a16:colId xmlns:a16="http://schemas.microsoft.com/office/drawing/2014/main" xmlns="" val="2081033052"/>
+                      <a16:colId xmlns:a16="http://schemas.microsoft.com/office/drawing/2014/main" val="2081033052"/>
                     </a:ext>
                   </a:extLst>
                 </a:gridCol>
                 <a:gridCol w="563946">
                   <a:extLst>
                     <a:ext uri="{9D8B030D-6E8A-4147-A177-3AD203B41FA5}">
-                      <a16:colId xmlns:a16="http://schemas.microsoft.com/office/drawing/2014/main" xmlns="" val="2759415750"/>
+                      <a16:colId xmlns:a16="http://schemas.microsoft.com/office/drawing/2014/main" val="2759415750"/>
                     </a:ext>
                   </a:extLst>
                 </a:gridCol>
                 <a:gridCol w="563946">
                   <a:extLst>
                     <a:ext uri="{9D8B030D-6E8A-4147-A177-3AD203B41FA5}">
-                      <a16:colId xmlns:a16="http://schemas.microsoft.com/office/drawing/2014/main" xmlns="" val="1013666482"/>
+                      <a16:colId xmlns:a16="http://schemas.microsoft.com/office/drawing/2014/main" val="1013666482"/>
                     </a:ext>
                   </a:extLst>
                 </a:gridCol>
                 <a:gridCol w="563946">
                   <a:extLst>
                     <a:ext uri="{9D8B030D-6E8A-4147-A177-3AD203B41FA5}">
-                      <a16:colId xmlns:a16="http://schemas.microsoft.com/office/drawing/2014/main" xmlns="" val="4052377547"/>
+                      <a16:colId xmlns:a16="http://schemas.microsoft.com/office/drawing/2014/main" val="4052377547"/>
                     </a:ext>
                   </a:extLst>
                 </a:gridCol>
                 <a:gridCol w="563946">
                   <a:extLst>
                     <a:ext uri="{9D8B030D-6E8A-4147-A177-3AD203B41FA5}">
-                      <a16:colId xmlns:a16="http://schemas.microsoft.com/office/drawing/2014/main" xmlns="" val="86987426"/>
+                      <a16:colId xmlns:a16="http://schemas.microsoft.com/office/drawing/2014/main" val="86987426"/>
                     </a:ext>
                   </a:extLst>
                 </a:gridCol>
                 <a:gridCol w="563946">
                   <a:extLst>
                     <a:ext uri="{9D8B030D-6E8A-4147-A177-3AD203B41FA5}">
-                      <a16:colId xmlns:a16="http://schemas.microsoft.com/office/drawing/2014/main" xmlns="" val="4112314039"/>
+                      <a16:colId xmlns:a16="http://schemas.microsoft.com/office/drawing/2014/main" val="4112314039"/>
                     </a:ext>
                   </a:extLst>
                 </a:gridCol>
                 <a:gridCol w="563946">
                   <a:extLst>
                     <a:ext uri="{9D8B030D-6E8A-4147-A177-3AD203B41FA5}">
-                      <a16:colId xmlns:a16="http://schemas.microsoft.com/office/drawing/2014/main" xmlns="" val="2352200665"/>
+                      <a16:colId xmlns:a16="http://schemas.microsoft.com/office/drawing/2014/main" val="2352200665"/>
                     </a:ext>
                   </a:extLst>
                 </a:gridCol>
@@ -4152,7 +4154,7 @@
                 </a:tc>
                 <a:extLst>
                   <a:ext uri="{0D108BD9-81ED-4DB2-BD59-A6C34878D82A}">
-                    <a16:rowId xmlns:a16="http://schemas.microsoft.com/office/drawing/2014/main" xmlns="" val="3901103587"/>
+                    <a16:rowId xmlns:a16="http://schemas.microsoft.com/office/drawing/2014/main" val="3901103587"/>
                   </a:ext>
                 </a:extLst>
               </a:tr>
@@ -4239,7 +4241,7 @@
                 </a:tc>
                 <a:extLst>
                   <a:ext uri="{0D108BD9-81ED-4DB2-BD59-A6C34878D82A}">
-                    <a16:rowId xmlns:a16="http://schemas.microsoft.com/office/drawing/2014/main" xmlns="" val="810655840"/>
+                    <a16:rowId xmlns:a16="http://schemas.microsoft.com/office/drawing/2014/main" val="810655840"/>
                   </a:ext>
                 </a:extLst>
               </a:tr>
@@ -4326,7 +4328,7 @@
                 </a:tc>
                 <a:extLst>
                   <a:ext uri="{0D108BD9-81ED-4DB2-BD59-A6C34878D82A}">
-                    <a16:rowId xmlns:a16="http://schemas.microsoft.com/office/drawing/2014/main" xmlns="" val="2107368300"/>
+                    <a16:rowId xmlns:a16="http://schemas.microsoft.com/office/drawing/2014/main" val="2107368300"/>
                   </a:ext>
                 </a:extLst>
               </a:tr>
@@ -4413,7 +4415,7 @@
                 </a:tc>
                 <a:extLst>
                   <a:ext uri="{0D108BD9-81ED-4DB2-BD59-A6C34878D82A}">
-                    <a16:rowId xmlns:a16="http://schemas.microsoft.com/office/drawing/2014/main" xmlns="" val="1259991857"/>
+                    <a16:rowId xmlns:a16="http://schemas.microsoft.com/office/drawing/2014/main" val="1259991857"/>
                   </a:ext>
                 </a:extLst>
               </a:tr>
@@ -4500,7 +4502,7 @@
                 </a:tc>
                 <a:extLst>
                   <a:ext uri="{0D108BD9-81ED-4DB2-BD59-A6C34878D82A}">
-                    <a16:rowId xmlns:a16="http://schemas.microsoft.com/office/drawing/2014/main" xmlns="" val="1705778076"/>
+                    <a16:rowId xmlns:a16="http://schemas.microsoft.com/office/drawing/2014/main" val="1705778076"/>
                   </a:ext>
                 </a:extLst>
               </a:tr>
@@ -4587,7 +4589,7 @@
                 </a:tc>
                 <a:extLst>
                   <a:ext uri="{0D108BD9-81ED-4DB2-BD59-A6C34878D82A}">
-                    <a16:rowId xmlns:a16="http://schemas.microsoft.com/office/drawing/2014/main" xmlns="" val="3593844036"/>
+                    <a16:rowId xmlns:a16="http://schemas.microsoft.com/office/drawing/2014/main" val="3593844036"/>
                   </a:ext>
                 </a:extLst>
               </a:tr>
@@ -4674,7 +4676,7 @@
                 </a:tc>
                 <a:extLst>
                   <a:ext uri="{0D108BD9-81ED-4DB2-BD59-A6C34878D82A}">
-                    <a16:rowId xmlns:a16="http://schemas.microsoft.com/office/drawing/2014/main" xmlns="" val="2725860628"/>
+                    <a16:rowId xmlns:a16="http://schemas.microsoft.com/office/drawing/2014/main" val="2725860628"/>
                   </a:ext>
                 </a:extLst>
               </a:tr>
@@ -4761,7 +4763,7 @@
                 </a:tc>
                 <a:extLst>
                   <a:ext uri="{0D108BD9-81ED-4DB2-BD59-A6C34878D82A}">
-                    <a16:rowId xmlns:a16="http://schemas.microsoft.com/office/drawing/2014/main" xmlns="" val="3598242446"/>
+                    <a16:rowId xmlns:a16="http://schemas.microsoft.com/office/drawing/2014/main" val="3598242446"/>
                   </a:ext>
                 </a:extLst>
               </a:tr>
@@ -4774,7 +4776,7 @@
           <p:cNvPr id="4" name="Slide Number Placeholder 3">
             <a:extLst>
               <a:ext uri="{FF2B5EF4-FFF2-40B4-BE49-F238E27FC236}">
-                <a16:creationId xmlns:a16="http://schemas.microsoft.com/office/drawing/2014/main" xmlns="" id="{97D82D7D-618B-4FC6-9B8D-AF076B248E3B}"/>
+                <a16:creationId xmlns:a16="http://schemas.microsoft.com/office/drawing/2014/main" id="{97D82D7D-618B-4FC6-9B8D-AF076B248E3B}"/>
               </a:ext>
             </a:extLst>
           </p:cNvPr>
@@ -4803,7 +4805,7 @@
           <p:cNvPr id="6" name="Multiplication Sign 5">
             <a:extLst>
               <a:ext uri="{FF2B5EF4-FFF2-40B4-BE49-F238E27FC236}">
-                <a16:creationId xmlns:a16="http://schemas.microsoft.com/office/drawing/2014/main" xmlns="" id="{38108A66-6254-422A-831E-1095BB8DE301}"/>
+                <a16:creationId xmlns:a16="http://schemas.microsoft.com/office/drawing/2014/main" id="{38108A66-6254-422A-831E-1095BB8DE301}"/>
               </a:ext>
             </a:extLst>
           </p:cNvPr>
@@ -4857,7 +4859,7 @@
           <p:cNvPr id="7" name="TextBox 6">
             <a:extLst>
               <a:ext uri="{FF2B5EF4-FFF2-40B4-BE49-F238E27FC236}">
-                <a16:creationId xmlns:a16="http://schemas.microsoft.com/office/drawing/2014/main" xmlns="" id="{AAB138A2-4672-41FA-B1A3-1BCF77A65C1E}"/>
+                <a16:creationId xmlns:a16="http://schemas.microsoft.com/office/drawing/2014/main" id="{AAB138A2-4672-41FA-B1A3-1BCF77A65C1E}"/>
               </a:ext>
             </a:extLst>
           </p:cNvPr>
@@ -4906,7 +4908,7 @@
           <p:cNvPr id="8" name="TextBox 7">
             <a:extLst>
               <a:ext uri="{FF2B5EF4-FFF2-40B4-BE49-F238E27FC236}">
-                <a16:creationId xmlns:a16="http://schemas.microsoft.com/office/drawing/2014/main" xmlns="" id="{834ADA7A-0E97-41A2-AA02-F570FA699361}"/>
+                <a16:creationId xmlns:a16="http://schemas.microsoft.com/office/drawing/2014/main" id="{834ADA7A-0E97-41A2-AA02-F570FA699361}"/>
               </a:ext>
             </a:extLst>
           </p:cNvPr>
@@ -4955,7 +4957,7 @@
           <p:cNvPr id="9" name="Multiplication Sign 8">
             <a:extLst>
               <a:ext uri="{FF2B5EF4-FFF2-40B4-BE49-F238E27FC236}">
-                <a16:creationId xmlns:a16="http://schemas.microsoft.com/office/drawing/2014/main" xmlns="" id="{F7361447-BB27-4ADC-84D0-A4BAC0BC306E}"/>
+                <a16:creationId xmlns:a16="http://schemas.microsoft.com/office/drawing/2014/main" id="{F7361447-BB27-4ADC-84D0-A4BAC0BC306E}"/>
               </a:ext>
             </a:extLst>
           </p:cNvPr>
@@ -5009,7 +5011,7 @@
           <p:cNvPr id="10" name="TextBox 9">
             <a:extLst>
               <a:ext uri="{FF2B5EF4-FFF2-40B4-BE49-F238E27FC236}">
-                <a16:creationId xmlns:a16="http://schemas.microsoft.com/office/drawing/2014/main" xmlns="" id="{641F9E26-7091-49A7-85FD-BE26B7A11674}"/>
+                <a16:creationId xmlns:a16="http://schemas.microsoft.com/office/drawing/2014/main" id="{641F9E26-7091-49A7-85FD-BE26B7A11674}"/>
               </a:ext>
             </a:extLst>
           </p:cNvPr>
@@ -5044,7 +5046,7 @@
           <p:cNvPr id="11" name="Star: 5 Points 10">
             <a:extLst>
               <a:ext uri="{FF2B5EF4-FFF2-40B4-BE49-F238E27FC236}">
-                <a16:creationId xmlns:a16="http://schemas.microsoft.com/office/drawing/2014/main" xmlns="" id="{7A1FC458-B0D5-4718-8044-8530CD4DB6B5}"/>
+                <a16:creationId xmlns:a16="http://schemas.microsoft.com/office/drawing/2014/main" id="{7A1FC458-B0D5-4718-8044-8530CD4DB6B5}"/>
               </a:ext>
             </a:extLst>
           </p:cNvPr>
@@ -5123,7 +5125,7 @@
           <p:cNvPr id="2" name="Title 1">
             <a:extLst>
               <a:ext uri="{FF2B5EF4-FFF2-40B4-BE49-F238E27FC236}">
-                <a16:creationId xmlns:a16="http://schemas.microsoft.com/office/drawing/2014/main" xmlns="" id="{EC71ED69-ECE5-4FEA-BAAC-2D3FD4AEF4CF}"/>
+                <a16:creationId xmlns:a16="http://schemas.microsoft.com/office/drawing/2014/main" id="{EC71ED69-ECE5-4FEA-BAAC-2D3FD4AEF4CF}"/>
               </a:ext>
             </a:extLst>
           </p:cNvPr>
@@ -5141,10 +5143,9 @@
           <a:p>
             <a:pPr algn="ctr"/>
             <a:r>
-              <a:rPr lang="de-DE" dirty="0" smtClean="0"/>
+              <a:rPr lang="de-DE" dirty="0"/>
               <a:t>Bewegungsmuster</a:t>
             </a:r>
-            <a:endParaRPr lang="de-DE" dirty="0"/>
           </a:p>
         </p:txBody>
       </p:sp>
@@ -5153,7 +5154,7 @@
           <p:cNvPr id="5" name="Content Placeholder 4">
             <a:extLst>
               <a:ext uri="{FF2B5EF4-FFF2-40B4-BE49-F238E27FC236}">
-                <a16:creationId xmlns:a16="http://schemas.microsoft.com/office/drawing/2014/main" xmlns="" id="{556F42A2-DCA4-4B1C-A056-51A3547A9BE0}"/>
+                <a16:creationId xmlns:a16="http://schemas.microsoft.com/office/drawing/2014/main" id="{556F42A2-DCA4-4B1C-A056-51A3547A9BE0}"/>
               </a:ext>
             </a:extLst>
           </p:cNvPr>
@@ -5178,56 +5179,56 @@
                 <a:gridCol w="563946">
                   <a:extLst>
                     <a:ext uri="{9D8B030D-6E8A-4147-A177-3AD203B41FA5}">
-                      <a16:colId xmlns:a16="http://schemas.microsoft.com/office/drawing/2014/main" xmlns="" val="3909669187"/>
+                      <a16:colId xmlns:a16="http://schemas.microsoft.com/office/drawing/2014/main" val="3909669187"/>
                     </a:ext>
                   </a:extLst>
                 </a:gridCol>
                 <a:gridCol w="563946">
                   <a:extLst>
                     <a:ext uri="{9D8B030D-6E8A-4147-A177-3AD203B41FA5}">
-                      <a16:colId xmlns:a16="http://schemas.microsoft.com/office/drawing/2014/main" xmlns="" val="2081033052"/>
+                      <a16:colId xmlns:a16="http://schemas.microsoft.com/office/drawing/2014/main" val="2081033052"/>
                     </a:ext>
                   </a:extLst>
                 </a:gridCol>
                 <a:gridCol w="563946">
                   <a:extLst>
                     <a:ext uri="{9D8B030D-6E8A-4147-A177-3AD203B41FA5}">
-                      <a16:colId xmlns:a16="http://schemas.microsoft.com/office/drawing/2014/main" xmlns="" val="2759415750"/>
+                      <a16:colId xmlns:a16="http://schemas.microsoft.com/office/drawing/2014/main" val="2759415750"/>
                     </a:ext>
                   </a:extLst>
                 </a:gridCol>
                 <a:gridCol w="563946">
                   <a:extLst>
                     <a:ext uri="{9D8B030D-6E8A-4147-A177-3AD203B41FA5}">
-                      <a16:colId xmlns:a16="http://schemas.microsoft.com/office/drawing/2014/main" xmlns="" val="1013666482"/>
+                      <a16:colId xmlns:a16="http://schemas.microsoft.com/office/drawing/2014/main" val="1013666482"/>
                     </a:ext>
                   </a:extLst>
                 </a:gridCol>
                 <a:gridCol w="563946">
                   <a:extLst>
                     <a:ext uri="{9D8B030D-6E8A-4147-A177-3AD203B41FA5}">
-                      <a16:colId xmlns:a16="http://schemas.microsoft.com/office/drawing/2014/main" xmlns="" val="4052377547"/>
+                      <a16:colId xmlns:a16="http://schemas.microsoft.com/office/drawing/2014/main" val="4052377547"/>
                     </a:ext>
                   </a:extLst>
                 </a:gridCol>
                 <a:gridCol w="563946">
                   <a:extLst>
                     <a:ext uri="{9D8B030D-6E8A-4147-A177-3AD203B41FA5}">
-                      <a16:colId xmlns:a16="http://schemas.microsoft.com/office/drawing/2014/main" xmlns="" val="86987426"/>
+                      <a16:colId xmlns:a16="http://schemas.microsoft.com/office/drawing/2014/main" val="86987426"/>
                     </a:ext>
                   </a:extLst>
                 </a:gridCol>
                 <a:gridCol w="563946">
                   <a:extLst>
                     <a:ext uri="{9D8B030D-6E8A-4147-A177-3AD203B41FA5}">
-                      <a16:colId xmlns:a16="http://schemas.microsoft.com/office/drawing/2014/main" xmlns="" val="4112314039"/>
+                      <a16:colId xmlns:a16="http://schemas.microsoft.com/office/drawing/2014/main" val="4112314039"/>
                     </a:ext>
                   </a:extLst>
                 </a:gridCol>
                 <a:gridCol w="563946">
                   <a:extLst>
                     <a:ext uri="{9D8B030D-6E8A-4147-A177-3AD203B41FA5}">
-                      <a16:colId xmlns:a16="http://schemas.microsoft.com/office/drawing/2014/main" xmlns="" val="2352200665"/>
+                      <a16:colId xmlns:a16="http://schemas.microsoft.com/office/drawing/2014/main" val="2352200665"/>
                     </a:ext>
                   </a:extLst>
                 </a:gridCol>
@@ -5315,7 +5316,7 @@
                 </a:tc>
                 <a:extLst>
                   <a:ext uri="{0D108BD9-81ED-4DB2-BD59-A6C34878D82A}">
-                    <a16:rowId xmlns:a16="http://schemas.microsoft.com/office/drawing/2014/main" xmlns="" val="3901103587"/>
+                    <a16:rowId xmlns:a16="http://schemas.microsoft.com/office/drawing/2014/main" val="3901103587"/>
                   </a:ext>
                 </a:extLst>
               </a:tr>
@@ -5402,7 +5403,7 @@
                 </a:tc>
                 <a:extLst>
                   <a:ext uri="{0D108BD9-81ED-4DB2-BD59-A6C34878D82A}">
-                    <a16:rowId xmlns:a16="http://schemas.microsoft.com/office/drawing/2014/main" xmlns="" val="810655840"/>
+                    <a16:rowId xmlns:a16="http://schemas.microsoft.com/office/drawing/2014/main" val="810655840"/>
                   </a:ext>
                 </a:extLst>
               </a:tr>
@@ -5489,7 +5490,7 @@
                 </a:tc>
                 <a:extLst>
                   <a:ext uri="{0D108BD9-81ED-4DB2-BD59-A6C34878D82A}">
-                    <a16:rowId xmlns:a16="http://schemas.microsoft.com/office/drawing/2014/main" xmlns="" val="2107368300"/>
+                    <a16:rowId xmlns:a16="http://schemas.microsoft.com/office/drawing/2014/main" val="2107368300"/>
                   </a:ext>
                 </a:extLst>
               </a:tr>
@@ -5576,7 +5577,7 @@
                 </a:tc>
                 <a:extLst>
                   <a:ext uri="{0D108BD9-81ED-4DB2-BD59-A6C34878D82A}">
-                    <a16:rowId xmlns:a16="http://schemas.microsoft.com/office/drawing/2014/main" xmlns="" val="1259991857"/>
+                    <a16:rowId xmlns:a16="http://schemas.microsoft.com/office/drawing/2014/main" val="1259991857"/>
                   </a:ext>
                 </a:extLst>
               </a:tr>
@@ -5663,7 +5664,7 @@
                 </a:tc>
                 <a:extLst>
                   <a:ext uri="{0D108BD9-81ED-4DB2-BD59-A6C34878D82A}">
-                    <a16:rowId xmlns:a16="http://schemas.microsoft.com/office/drawing/2014/main" xmlns="" val="1705778076"/>
+                    <a16:rowId xmlns:a16="http://schemas.microsoft.com/office/drawing/2014/main" val="1705778076"/>
                   </a:ext>
                 </a:extLst>
               </a:tr>
@@ -5750,7 +5751,7 @@
                 </a:tc>
                 <a:extLst>
                   <a:ext uri="{0D108BD9-81ED-4DB2-BD59-A6C34878D82A}">
-                    <a16:rowId xmlns:a16="http://schemas.microsoft.com/office/drawing/2014/main" xmlns="" val="3593844036"/>
+                    <a16:rowId xmlns:a16="http://schemas.microsoft.com/office/drawing/2014/main" val="3593844036"/>
                   </a:ext>
                 </a:extLst>
               </a:tr>
@@ -5837,7 +5838,7 @@
                 </a:tc>
                 <a:extLst>
                   <a:ext uri="{0D108BD9-81ED-4DB2-BD59-A6C34878D82A}">
-                    <a16:rowId xmlns:a16="http://schemas.microsoft.com/office/drawing/2014/main" xmlns="" val="2725860628"/>
+                    <a16:rowId xmlns:a16="http://schemas.microsoft.com/office/drawing/2014/main" val="2725860628"/>
                   </a:ext>
                 </a:extLst>
               </a:tr>
@@ -5924,7 +5925,7 @@
                 </a:tc>
                 <a:extLst>
                   <a:ext uri="{0D108BD9-81ED-4DB2-BD59-A6C34878D82A}">
-                    <a16:rowId xmlns:a16="http://schemas.microsoft.com/office/drawing/2014/main" xmlns="" val="3598242446"/>
+                    <a16:rowId xmlns:a16="http://schemas.microsoft.com/office/drawing/2014/main" val="3598242446"/>
                   </a:ext>
                 </a:extLst>
               </a:tr>
@@ -5937,7 +5938,7 @@
           <p:cNvPr id="4" name="Slide Number Placeholder 3">
             <a:extLst>
               <a:ext uri="{FF2B5EF4-FFF2-40B4-BE49-F238E27FC236}">
-                <a16:creationId xmlns:a16="http://schemas.microsoft.com/office/drawing/2014/main" xmlns="" id="{97D82D7D-618B-4FC6-9B8D-AF076B248E3B}"/>
+                <a16:creationId xmlns:a16="http://schemas.microsoft.com/office/drawing/2014/main" id="{97D82D7D-618B-4FC6-9B8D-AF076B248E3B}"/>
               </a:ext>
             </a:extLst>
           </p:cNvPr>
@@ -5966,7 +5967,7 @@
           <p:cNvPr id="6" name="Multiplication Sign 5">
             <a:extLst>
               <a:ext uri="{FF2B5EF4-FFF2-40B4-BE49-F238E27FC236}">
-                <a16:creationId xmlns:a16="http://schemas.microsoft.com/office/drawing/2014/main" xmlns="" id="{38108A66-6254-422A-831E-1095BB8DE301}"/>
+                <a16:creationId xmlns:a16="http://schemas.microsoft.com/office/drawing/2014/main" id="{38108A66-6254-422A-831E-1095BB8DE301}"/>
               </a:ext>
             </a:extLst>
           </p:cNvPr>
@@ -6020,7 +6021,7 @@
           <p:cNvPr id="7" name="TextBox 6">
             <a:extLst>
               <a:ext uri="{FF2B5EF4-FFF2-40B4-BE49-F238E27FC236}">
-                <a16:creationId xmlns:a16="http://schemas.microsoft.com/office/drawing/2014/main" xmlns="" id="{AAB138A2-4672-41FA-B1A3-1BCF77A65C1E}"/>
+                <a16:creationId xmlns:a16="http://schemas.microsoft.com/office/drawing/2014/main" id="{AAB138A2-4672-41FA-B1A3-1BCF77A65C1E}"/>
               </a:ext>
             </a:extLst>
           </p:cNvPr>
@@ -6077,7 +6078,7 @@
           <p:cNvPr id="8" name="TextBox 7">
             <a:extLst>
               <a:ext uri="{FF2B5EF4-FFF2-40B4-BE49-F238E27FC236}">
-                <a16:creationId xmlns:a16="http://schemas.microsoft.com/office/drawing/2014/main" xmlns="" id="{834ADA7A-0E97-41A2-AA02-F570FA699361}"/>
+                <a16:creationId xmlns:a16="http://schemas.microsoft.com/office/drawing/2014/main" id="{834ADA7A-0E97-41A2-AA02-F570FA699361}"/>
               </a:ext>
             </a:extLst>
           </p:cNvPr>
@@ -6126,7 +6127,7 @@
           <p:cNvPr id="9" name="Multiplication Sign 8">
             <a:extLst>
               <a:ext uri="{FF2B5EF4-FFF2-40B4-BE49-F238E27FC236}">
-                <a16:creationId xmlns:a16="http://schemas.microsoft.com/office/drawing/2014/main" xmlns="" id="{F7361447-BB27-4ADC-84D0-A4BAC0BC306E}"/>
+                <a16:creationId xmlns:a16="http://schemas.microsoft.com/office/drawing/2014/main" id="{F7361447-BB27-4ADC-84D0-A4BAC0BC306E}"/>
               </a:ext>
             </a:extLst>
           </p:cNvPr>
@@ -6180,7 +6181,7 @@
           <p:cNvPr id="10" name="TextBox 9">
             <a:extLst>
               <a:ext uri="{FF2B5EF4-FFF2-40B4-BE49-F238E27FC236}">
-                <a16:creationId xmlns:a16="http://schemas.microsoft.com/office/drawing/2014/main" xmlns="" id="{641F9E26-7091-49A7-85FD-BE26B7A11674}"/>
+                <a16:creationId xmlns:a16="http://schemas.microsoft.com/office/drawing/2014/main" id="{641F9E26-7091-49A7-85FD-BE26B7A11674}"/>
               </a:ext>
             </a:extLst>
           </p:cNvPr>
@@ -6215,7 +6216,7 @@
           <p:cNvPr id="11" name="Star: 5 Points 10">
             <a:extLst>
               <a:ext uri="{FF2B5EF4-FFF2-40B4-BE49-F238E27FC236}">
-                <a16:creationId xmlns:a16="http://schemas.microsoft.com/office/drawing/2014/main" xmlns="" id="{7A1FC458-B0D5-4718-8044-8530CD4DB6B5}"/>
+                <a16:creationId xmlns:a16="http://schemas.microsoft.com/office/drawing/2014/main" id="{7A1FC458-B0D5-4718-8044-8530CD4DB6B5}"/>
               </a:ext>
             </a:extLst>
           </p:cNvPr>
@@ -6264,7 +6265,7 @@
           <p:cNvPr id="12" name="Arrow: Right 11">
             <a:extLst>
               <a:ext uri="{FF2B5EF4-FFF2-40B4-BE49-F238E27FC236}">
-                <a16:creationId xmlns:a16="http://schemas.microsoft.com/office/drawing/2014/main" xmlns="" id="{2756CF90-4297-4F7C-A804-310CEDEE4385}"/>
+                <a16:creationId xmlns:a16="http://schemas.microsoft.com/office/drawing/2014/main" id="{2756CF90-4297-4F7C-A804-310CEDEE4385}"/>
               </a:ext>
             </a:extLst>
           </p:cNvPr>
@@ -6313,7 +6314,7 @@
           <p:cNvPr id="13" name="Arrow: Right 12">
             <a:extLst>
               <a:ext uri="{FF2B5EF4-FFF2-40B4-BE49-F238E27FC236}">
-                <a16:creationId xmlns:a16="http://schemas.microsoft.com/office/drawing/2014/main" xmlns="" id="{45D601F1-0253-471D-A018-983C3D763EB7}"/>
+                <a16:creationId xmlns:a16="http://schemas.microsoft.com/office/drawing/2014/main" id="{45D601F1-0253-471D-A018-983C3D763EB7}"/>
               </a:ext>
             </a:extLst>
           </p:cNvPr>
@@ -6362,7 +6363,7 @@
           <p:cNvPr id="14" name="Arrow: Right 13">
             <a:extLst>
               <a:ext uri="{FF2B5EF4-FFF2-40B4-BE49-F238E27FC236}">
-                <a16:creationId xmlns:a16="http://schemas.microsoft.com/office/drawing/2014/main" xmlns="" id="{D5B7F4CD-F355-4A4C-9FCB-6C9195FEAE6A}"/>
+                <a16:creationId xmlns:a16="http://schemas.microsoft.com/office/drawing/2014/main" id="{D5B7F4CD-F355-4A4C-9FCB-6C9195FEAE6A}"/>
               </a:ext>
             </a:extLst>
           </p:cNvPr>
@@ -6411,7 +6412,7 @@
           <p:cNvPr id="15" name="Arrow: Right 14">
             <a:extLst>
               <a:ext uri="{FF2B5EF4-FFF2-40B4-BE49-F238E27FC236}">
-                <a16:creationId xmlns:a16="http://schemas.microsoft.com/office/drawing/2014/main" xmlns="" id="{50377EFF-BCCA-41AA-8A31-7E840817C265}"/>
+                <a16:creationId xmlns:a16="http://schemas.microsoft.com/office/drawing/2014/main" id="{50377EFF-BCCA-41AA-8A31-7E840817C265}"/>
               </a:ext>
             </a:extLst>
           </p:cNvPr>
@@ -6490,7 +6491,7 @@
           <p:cNvPr id="2" name="Title 1">
             <a:extLst>
               <a:ext uri="{FF2B5EF4-FFF2-40B4-BE49-F238E27FC236}">
-                <a16:creationId xmlns:a16="http://schemas.microsoft.com/office/drawing/2014/main" xmlns="" id="{EC71ED69-ECE5-4FEA-BAAC-2D3FD4AEF4CF}"/>
+                <a16:creationId xmlns:a16="http://schemas.microsoft.com/office/drawing/2014/main" id="{EC71ED69-ECE5-4FEA-BAAC-2D3FD4AEF4CF}"/>
               </a:ext>
             </a:extLst>
           </p:cNvPr>
@@ -6508,10 +6509,9 @@
           <a:p>
             <a:pPr algn="ctr"/>
             <a:r>
-              <a:rPr lang="de-DE" dirty="0" smtClean="0"/>
+              <a:rPr lang="de-DE" dirty="0"/>
               <a:t>Bewegungsmuster</a:t>
             </a:r>
-            <a:endParaRPr lang="de-DE" dirty="0"/>
           </a:p>
         </p:txBody>
       </p:sp>
@@ -6520,7 +6520,7 @@
           <p:cNvPr id="5" name="Content Placeholder 4">
             <a:extLst>
               <a:ext uri="{FF2B5EF4-FFF2-40B4-BE49-F238E27FC236}">
-                <a16:creationId xmlns:a16="http://schemas.microsoft.com/office/drawing/2014/main" xmlns="" id="{556F42A2-DCA4-4B1C-A056-51A3547A9BE0}"/>
+                <a16:creationId xmlns:a16="http://schemas.microsoft.com/office/drawing/2014/main" id="{556F42A2-DCA4-4B1C-A056-51A3547A9BE0}"/>
               </a:ext>
             </a:extLst>
           </p:cNvPr>
@@ -6545,56 +6545,56 @@
                 <a:gridCol w="563946">
                   <a:extLst>
                     <a:ext uri="{9D8B030D-6E8A-4147-A177-3AD203B41FA5}">
-                      <a16:colId xmlns:a16="http://schemas.microsoft.com/office/drawing/2014/main" xmlns="" val="3909669187"/>
+                      <a16:colId xmlns:a16="http://schemas.microsoft.com/office/drawing/2014/main" val="3909669187"/>
                     </a:ext>
                   </a:extLst>
                 </a:gridCol>
                 <a:gridCol w="563946">
                   <a:extLst>
                     <a:ext uri="{9D8B030D-6E8A-4147-A177-3AD203B41FA5}">
-                      <a16:colId xmlns:a16="http://schemas.microsoft.com/office/drawing/2014/main" xmlns="" val="2081033052"/>
+                      <a16:colId xmlns:a16="http://schemas.microsoft.com/office/drawing/2014/main" val="2081033052"/>
                     </a:ext>
                   </a:extLst>
                 </a:gridCol>
                 <a:gridCol w="563946">
                   <a:extLst>
                     <a:ext uri="{9D8B030D-6E8A-4147-A177-3AD203B41FA5}">
-                      <a16:colId xmlns:a16="http://schemas.microsoft.com/office/drawing/2014/main" xmlns="" val="2759415750"/>
+                      <a16:colId xmlns:a16="http://schemas.microsoft.com/office/drawing/2014/main" val="2759415750"/>
                     </a:ext>
                   </a:extLst>
                 </a:gridCol>
                 <a:gridCol w="563946">
                   <a:extLst>
                     <a:ext uri="{9D8B030D-6E8A-4147-A177-3AD203B41FA5}">
-                      <a16:colId xmlns:a16="http://schemas.microsoft.com/office/drawing/2014/main" xmlns="" val="1013666482"/>
+                      <a16:colId xmlns:a16="http://schemas.microsoft.com/office/drawing/2014/main" val="1013666482"/>
                     </a:ext>
                   </a:extLst>
                 </a:gridCol>
                 <a:gridCol w="563946">
                   <a:extLst>
                     <a:ext uri="{9D8B030D-6E8A-4147-A177-3AD203B41FA5}">
-                      <a16:colId xmlns:a16="http://schemas.microsoft.com/office/drawing/2014/main" xmlns="" val="4052377547"/>
+                      <a16:colId xmlns:a16="http://schemas.microsoft.com/office/drawing/2014/main" val="4052377547"/>
                     </a:ext>
                   </a:extLst>
                 </a:gridCol>
                 <a:gridCol w="563946">
                   <a:extLst>
                     <a:ext uri="{9D8B030D-6E8A-4147-A177-3AD203B41FA5}">
-                      <a16:colId xmlns:a16="http://schemas.microsoft.com/office/drawing/2014/main" xmlns="" val="86987426"/>
+                      <a16:colId xmlns:a16="http://schemas.microsoft.com/office/drawing/2014/main" val="86987426"/>
                     </a:ext>
                   </a:extLst>
                 </a:gridCol>
                 <a:gridCol w="563946">
                   <a:extLst>
                     <a:ext uri="{9D8B030D-6E8A-4147-A177-3AD203B41FA5}">
-                      <a16:colId xmlns:a16="http://schemas.microsoft.com/office/drawing/2014/main" xmlns="" val="4112314039"/>
+                      <a16:colId xmlns:a16="http://schemas.microsoft.com/office/drawing/2014/main" val="4112314039"/>
                     </a:ext>
                   </a:extLst>
                 </a:gridCol>
                 <a:gridCol w="563946">
                   <a:extLst>
                     <a:ext uri="{9D8B030D-6E8A-4147-A177-3AD203B41FA5}">
-                      <a16:colId xmlns:a16="http://schemas.microsoft.com/office/drawing/2014/main" xmlns="" val="2352200665"/>
+                      <a16:colId xmlns:a16="http://schemas.microsoft.com/office/drawing/2014/main" val="2352200665"/>
                     </a:ext>
                   </a:extLst>
                 </a:gridCol>
@@ -6682,7 +6682,7 @@
                 </a:tc>
                 <a:extLst>
                   <a:ext uri="{0D108BD9-81ED-4DB2-BD59-A6C34878D82A}">
-                    <a16:rowId xmlns:a16="http://schemas.microsoft.com/office/drawing/2014/main" xmlns="" val="3901103587"/>
+                    <a16:rowId xmlns:a16="http://schemas.microsoft.com/office/drawing/2014/main" val="3901103587"/>
                   </a:ext>
                 </a:extLst>
               </a:tr>
@@ -6769,7 +6769,7 @@
                 </a:tc>
                 <a:extLst>
                   <a:ext uri="{0D108BD9-81ED-4DB2-BD59-A6C34878D82A}">
-                    <a16:rowId xmlns:a16="http://schemas.microsoft.com/office/drawing/2014/main" xmlns="" val="810655840"/>
+                    <a16:rowId xmlns:a16="http://schemas.microsoft.com/office/drawing/2014/main" val="810655840"/>
                   </a:ext>
                 </a:extLst>
               </a:tr>
@@ -6856,7 +6856,7 @@
                 </a:tc>
                 <a:extLst>
                   <a:ext uri="{0D108BD9-81ED-4DB2-BD59-A6C34878D82A}">
-                    <a16:rowId xmlns:a16="http://schemas.microsoft.com/office/drawing/2014/main" xmlns="" val="2107368300"/>
+                    <a16:rowId xmlns:a16="http://schemas.microsoft.com/office/drawing/2014/main" val="2107368300"/>
                   </a:ext>
                 </a:extLst>
               </a:tr>
@@ -6943,7 +6943,7 @@
                 </a:tc>
                 <a:extLst>
                   <a:ext uri="{0D108BD9-81ED-4DB2-BD59-A6C34878D82A}">
-                    <a16:rowId xmlns:a16="http://schemas.microsoft.com/office/drawing/2014/main" xmlns="" val="1259991857"/>
+                    <a16:rowId xmlns:a16="http://schemas.microsoft.com/office/drawing/2014/main" val="1259991857"/>
                   </a:ext>
                 </a:extLst>
               </a:tr>
@@ -7030,7 +7030,7 @@
                 </a:tc>
                 <a:extLst>
                   <a:ext uri="{0D108BD9-81ED-4DB2-BD59-A6C34878D82A}">
-                    <a16:rowId xmlns:a16="http://schemas.microsoft.com/office/drawing/2014/main" xmlns="" val="1705778076"/>
+                    <a16:rowId xmlns:a16="http://schemas.microsoft.com/office/drawing/2014/main" val="1705778076"/>
                   </a:ext>
                 </a:extLst>
               </a:tr>
@@ -7117,7 +7117,7 @@
                 </a:tc>
                 <a:extLst>
                   <a:ext uri="{0D108BD9-81ED-4DB2-BD59-A6C34878D82A}">
-                    <a16:rowId xmlns:a16="http://schemas.microsoft.com/office/drawing/2014/main" xmlns="" val="3593844036"/>
+                    <a16:rowId xmlns:a16="http://schemas.microsoft.com/office/drawing/2014/main" val="3593844036"/>
                   </a:ext>
                 </a:extLst>
               </a:tr>
@@ -7204,7 +7204,7 @@
                 </a:tc>
                 <a:extLst>
                   <a:ext uri="{0D108BD9-81ED-4DB2-BD59-A6C34878D82A}">
-                    <a16:rowId xmlns:a16="http://schemas.microsoft.com/office/drawing/2014/main" xmlns="" val="2725860628"/>
+                    <a16:rowId xmlns:a16="http://schemas.microsoft.com/office/drawing/2014/main" val="2725860628"/>
                   </a:ext>
                 </a:extLst>
               </a:tr>
@@ -7291,7 +7291,7 @@
                 </a:tc>
                 <a:extLst>
                   <a:ext uri="{0D108BD9-81ED-4DB2-BD59-A6C34878D82A}">
-                    <a16:rowId xmlns:a16="http://schemas.microsoft.com/office/drawing/2014/main" xmlns="" val="3598242446"/>
+                    <a16:rowId xmlns:a16="http://schemas.microsoft.com/office/drawing/2014/main" val="3598242446"/>
                   </a:ext>
                 </a:extLst>
               </a:tr>
@@ -7304,7 +7304,7 @@
           <p:cNvPr id="4" name="Slide Number Placeholder 3">
             <a:extLst>
               <a:ext uri="{FF2B5EF4-FFF2-40B4-BE49-F238E27FC236}">
-                <a16:creationId xmlns:a16="http://schemas.microsoft.com/office/drawing/2014/main" xmlns="" id="{97D82D7D-618B-4FC6-9B8D-AF076B248E3B}"/>
+                <a16:creationId xmlns:a16="http://schemas.microsoft.com/office/drawing/2014/main" id="{97D82D7D-618B-4FC6-9B8D-AF076B248E3B}"/>
               </a:ext>
             </a:extLst>
           </p:cNvPr>
@@ -7333,7 +7333,7 @@
           <p:cNvPr id="6" name="Multiplication Sign 5">
             <a:extLst>
               <a:ext uri="{FF2B5EF4-FFF2-40B4-BE49-F238E27FC236}">
-                <a16:creationId xmlns:a16="http://schemas.microsoft.com/office/drawing/2014/main" xmlns="" id="{38108A66-6254-422A-831E-1095BB8DE301}"/>
+                <a16:creationId xmlns:a16="http://schemas.microsoft.com/office/drawing/2014/main" id="{38108A66-6254-422A-831E-1095BB8DE301}"/>
               </a:ext>
             </a:extLst>
           </p:cNvPr>
@@ -7387,7 +7387,7 @@
           <p:cNvPr id="7" name="TextBox 6">
             <a:extLst>
               <a:ext uri="{FF2B5EF4-FFF2-40B4-BE49-F238E27FC236}">
-                <a16:creationId xmlns:a16="http://schemas.microsoft.com/office/drawing/2014/main" xmlns="" id="{AAB138A2-4672-41FA-B1A3-1BCF77A65C1E}"/>
+                <a16:creationId xmlns:a16="http://schemas.microsoft.com/office/drawing/2014/main" id="{AAB138A2-4672-41FA-B1A3-1BCF77A65C1E}"/>
               </a:ext>
             </a:extLst>
           </p:cNvPr>
@@ -7436,7 +7436,7 @@
           <p:cNvPr id="8" name="TextBox 7">
             <a:extLst>
               <a:ext uri="{FF2B5EF4-FFF2-40B4-BE49-F238E27FC236}">
-                <a16:creationId xmlns:a16="http://schemas.microsoft.com/office/drawing/2014/main" xmlns="" id="{834ADA7A-0E97-41A2-AA02-F570FA699361}"/>
+                <a16:creationId xmlns:a16="http://schemas.microsoft.com/office/drawing/2014/main" id="{834ADA7A-0E97-41A2-AA02-F570FA699361}"/>
               </a:ext>
             </a:extLst>
           </p:cNvPr>
@@ -7485,7 +7485,7 @@
           <p:cNvPr id="9" name="Multiplication Sign 8">
             <a:extLst>
               <a:ext uri="{FF2B5EF4-FFF2-40B4-BE49-F238E27FC236}">
-                <a16:creationId xmlns:a16="http://schemas.microsoft.com/office/drawing/2014/main" xmlns="" id="{F7361447-BB27-4ADC-84D0-A4BAC0BC306E}"/>
+                <a16:creationId xmlns:a16="http://schemas.microsoft.com/office/drawing/2014/main" id="{F7361447-BB27-4ADC-84D0-A4BAC0BC306E}"/>
               </a:ext>
             </a:extLst>
           </p:cNvPr>
@@ -7539,7 +7539,7 @@
           <p:cNvPr id="10" name="TextBox 9">
             <a:extLst>
               <a:ext uri="{FF2B5EF4-FFF2-40B4-BE49-F238E27FC236}">
-                <a16:creationId xmlns:a16="http://schemas.microsoft.com/office/drawing/2014/main" xmlns="" id="{641F9E26-7091-49A7-85FD-BE26B7A11674}"/>
+                <a16:creationId xmlns:a16="http://schemas.microsoft.com/office/drawing/2014/main" id="{641F9E26-7091-49A7-85FD-BE26B7A11674}"/>
               </a:ext>
             </a:extLst>
           </p:cNvPr>
@@ -7574,7 +7574,7 @@
           <p:cNvPr id="11" name="Star: 5 Points 10">
             <a:extLst>
               <a:ext uri="{FF2B5EF4-FFF2-40B4-BE49-F238E27FC236}">
-                <a16:creationId xmlns:a16="http://schemas.microsoft.com/office/drawing/2014/main" xmlns="" id="{7A1FC458-B0D5-4718-8044-8530CD4DB6B5}"/>
+                <a16:creationId xmlns:a16="http://schemas.microsoft.com/office/drawing/2014/main" id="{7A1FC458-B0D5-4718-8044-8530CD4DB6B5}"/>
               </a:ext>
             </a:extLst>
           </p:cNvPr>
@@ -7653,7 +7653,7 @@
           <p:cNvPr id="2" name="Title 1">
             <a:extLst>
               <a:ext uri="{FF2B5EF4-FFF2-40B4-BE49-F238E27FC236}">
-                <a16:creationId xmlns:a16="http://schemas.microsoft.com/office/drawing/2014/main" xmlns="" id="{EC71ED69-ECE5-4FEA-BAAC-2D3FD4AEF4CF}"/>
+                <a16:creationId xmlns:a16="http://schemas.microsoft.com/office/drawing/2014/main" id="{EC71ED69-ECE5-4FEA-BAAC-2D3FD4AEF4CF}"/>
               </a:ext>
             </a:extLst>
           </p:cNvPr>
@@ -7671,10 +7671,9 @@
           <a:p>
             <a:pPr algn="ctr"/>
             <a:r>
-              <a:rPr lang="de-DE" dirty="0" smtClean="0"/>
+              <a:rPr lang="de-DE" dirty="0"/>
               <a:t>Bewegungsmuster</a:t>
             </a:r>
-            <a:endParaRPr lang="de-DE" dirty="0"/>
           </a:p>
         </p:txBody>
       </p:sp>
@@ -7683,7 +7682,7 @@
           <p:cNvPr id="5" name="Content Placeholder 4">
             <a:extLst>
               <a:ext uri="{FF2B5EF4-FFF2-40B4-BE49-F238E27FC236}">
-                <a16:creationId xmlns:a16="http://schemas.microsoft.com/office/drawing/2014/main" xmlns="" id="{556F42A2-DCA4-4B1C-A056-51A3547A9BE0}"/>
+                <a16:creationId xmlns:a16="http://schemas.microsoft.com/office/drawing/2014/main" id="{556F42A2-DCA4-4B1C-A056-51A3547A9BE0}"/>
               </a:ext>
             </a:extLst>
           </p:cNvPr>
@@ -7708,56 +7707,56 @@
                 <a:gridCol w="563946">
                   <a:extLst>
                     <a:ext uri="{9D8B030D-6E8A-4147-A177-3AD203B41FA5}">
-                      <a16:colId xmlns:a16="http://schemas.microsoft.com/office/drawing/2014/main" xmlns="" val="3909669187"/>
+                      <a16:colId xmlns:a16="http://schemas.microsoft.com/office/drawing/2014/main" val="3909669187"/>
                     </a:ext>
                   </a:extLst>
                 </a:gridCol>
                 <a:gridCol w="563946">
                   <a:extLst>
                     <a:ext uri="{9D8B030D-6E8A-4147-A177-3AD203B41FA5}">
-                      <a16:colId xmlns:a16="http://schemas.microsoft.com/office/drawing/2014/main" xmlns="" val="2081033052"/>
+                      <a16:colId xmlns:a16="http://schemas.microsoft.com/office/drawing/2014/main" val="2081033052"/>
                     </a:ext>
                   </a:extLst>
                 </a:gridCol>
                 <a:gridCol w="563946">
                   <a:extLst>
                     <a:ext uri="{9D8B030D-6E8A-4147-A177-3AD203B41FA5}">
-                      <a16:colId xmlns:a16="http://schemas.microsoft.com/office/drawing/2014/main" xmlns="" val="2759415750"/>
+                      <a16:colId xmlns:a16="http://schemas.microsoft.com/office/drawing/2014/main" val="2759415750"/>
                     </a:ext>
                   </a:extLst>
                 </a:gridCol>
                 <a:gridCol w="563946">
                   <a:extLst>
                     <a:ext uri="{9D8B030D-6E8A-4147-A177-3AD203B41FA5}">
-                      <a16:colId xmlns:a16="http://schemas.microsoft.com/office/drawing/2014/main" xmlns="" val="1013666482"/>
+                      <a16:colId xmlns:a16="http://schemas.microsoft.com/office/drawing/2014/main" val="1013666482"/>
                     </a:ext>
                   </a:extLst>
                 </a:gridCol>
                 <a:gridCol w="563946">
                   <a:extLst>
                     <a:ext uri="{9D8B030D-6E8A-4147-A177-3AD203B41FA5}">
-                      <a16:colId xmlns:a16="http://schemas.microsoft.com/office/drawing/2014/main" xmlns="" val="4052377547"/>
+                      <a16:colId xmlns:a16="http://schemas.microsoft.com/office/drawing/2014/main" val="4052377547"/>
                     </a:ext>
                   </a:extLst>
                 </a:gridCol>
                 <a:gridCol w="563946">
                   <a:extLst>
                     <a:ext uri="{9D8B030D-6E8A-4147-A177-3AD203B41FA5}">
-                      <a16:colId xmlns:a16="http://schemas.microsoft.com/office/drawing/2014/main" xmlns="" val="86987426"/>
+                      <a16:colId xmlns:a16="http://schemas.microsoft.com/office/drawing/2014/main" val="86987426"/>
                     </a:ext>
                   </a:extLst>
                 </a:gridCol>
                 <a:gridCol w="563946">
                   <a:extLst>
                     <a:ext uri="{9D8B030D-6E8A-4147-A177-3AD203B41FA5}">
-                      <a16:colId xmlns:a16="http://schemas.microsoft.com/office/drawing/2014/main" xmlns="" val="4112314039"/>
+                      <a16:colId xmlns:a16="http://schemas.microsoft.com/office/drawing/2014/main" val="4112314039"/>
                     </a:ext>
                   </a:extLst>
                 </a:gridCol>
                 <a:gridCol w="563946">
                   <a:extLst>
                     <a:ext uri="{9D8B030D-6E8A-4147-A177-3AD203B41FA5}">
-                      <a16:colId xmlns:a16="http://schemas.microsoft.com/office/drawing/2014/main" xmlns="" val="2352200665"/>
+                      <a16:colId xmlns:a16="http://schemas.microsoft.com/office/drawing/2014/main" val="2352200665"/>
                     </a:ext>
                   </a:extLst>
                 </a:gridCol>
@@ -7845,7 +7844,7 @@
                 </a:tc>
                 <a:extLst>
                   <a:ext uri="{0D108BD9-81ED-4DB2-BD59-A6C34878D82A}">
-                    <a16:rowId xmlns:a16="http://schemas.microsoft.com/office/drawing/2014/main" xmlns="" val="3901103587"/>
+                    <a16:rowId xmlns:a16="http://schemas.microsoft.com/office/drawing/2014/main" val="3901103587"/>
                   </a:ext>
                 </a:extLst>
               </a:tr>
@@ -7932,7 +7931,7 @@
                 </a:tc>
                 <a:extLst>
                   <a:ext uri="{0D108BD9-81ED-4DB2-BD59-A6C34878D82A}">
-                    <a16:rowId xmlns:a16="http://schemas.microsoft.com/office/drawing/2014/main" xmlns="" val="810655840"/>
+                    <a16:rowId xmlns:a16="http://schemas.microsoft.com/office/drawing/2014/main" val="810655840"/>
                   </a:ext>
                 </a:extLst>
               </a:tr>
@@ -8019,7 +8018,7 @@
                 </a:tc>
                 <a:extLst>
                   <a:ext uri="{0D108BD9-81ED-4DB2-BD59-A6C34878D82A}">
-                    <a16:rowId xmlns:a16="http://schemas.microsoft.com/office/drawing/2014/main" xmlns="" val="2107368300"/>
+                    <a16:rowId xmlns:a16="http://schemas.microsoft.com/office/drawing/2014/main" val="2107368300"/>
                   </a:ext>
                 </a:extLst>
               </a:tr>
@@ -8106,7 +8105,7 @@
                 </a:tc>
                 <a:extLst>
                   <a:ext uri="{0D108BD9-81ED-4DB2-BD59-A6C34878D82A}">
-                    <a16:rowId xmlns:a16="http://schemas.microsoft.com/office/drawing/2014/main" xmlns="" val="1259991857"/>
+                    <a16:rowId xmlns:a16="http://schemas.microsoft.com/office/drawing/2014/main" val="1259991857"/>
                   </a:ext>
                 </a:extLst>
               </a:tr>
@@ -8193,7 +8192,7 @@
                 </a:tc>
                 <a:extLst>
                   <a:ext uri="{0D108BD9-81ED-4DB2-BD59-A6C34878D82A}">
-                    <a16:rowId xmlns:a16="http://schemas.microsoft.com/office/drawing/2014/main" xmlns="" val="1705778076"/>
+                    <a16:rowId xmlns:a16="http://schemas.microsoft.com/office/drawing/2014/main" val="1705778076"/>
                   </a:ext>
                 </a:extLst>
               </a:tr>
@@ -8280,7 +8279,7 @@
                 </a:tc>
                 <a:extLst>
                   <a:ext uri="{0D108BD9-81ED-4DB2-BD59-A6C34878D82A}">
-                    <a16:rowId xmlns:a16="http://schemas.microsoft.com/office/drawing/2014/main" xmlns="" val="3593844036"/>
+                    <a16:rowId xmlns:a16="http://schemas.microsoft.com/office/drawing/2014/main" val="3593844036"/>
                   </a:ext>
                 </a:extLst>
               </a:tr>
@@ -8367,7 +8366,7 @@
                 </a:tc>
                 <a:extLst>
                   <a:ext uri="{0D108BD9-81ED-4DB2-BD59-A6C34878D82A}">
-                    <a16:rowId xmlns:a16="http://schemas.microsoft.com/office/drawing/2014/main" xmlns="" val="2725860628"/>
+                    <a16:rowId xmlns:a16="http://schemas.microsoft.com/office/drawing/2014/main" val="2725860628"/>
                   </a:ext>
                 </a:extLst>
               </a:tr>
@@ -8454,7 +8453,7 @@
                 </a:tc>
                 <a:extLst>
                   <a:ext uri="{0D108BD9-81ED-4DB2-BD59-A6C34878D82A}">
-                    <a16:rowId xmlns:a16="http://schemas.microsoft.com/office/drawing/2014/main" xmlns="" val="3598242446"/>
+                    <a16:rowId xmlns:a16="http://schemas.microsoft.com/office/drawing/2014/main" val="3598242446"/>
                   </a:ext>
                 </a:extLst>
               </a:tr>
@@ -8467,7 +8466,7 @@
           <p:cNvPr id="4" name="Slide Number Placeholder 3">
             <a:extLst>
               <a:ext uri="{FF2B5EF4-FFF2-40B4-BE49-F238E27FC236}">
-                <a16:creationId xmlns:a16="http://schemas.microsoft.com/office/drawing/2014/main" xmlns="" id="{97D82D7D-618B-4FC6-9B8D-AF076B248E3B}"/>
+                <a16:creationId xmlns:a16="http://schemas.microsoft.com/office/drawing/2014/main" id="{97D82D7D-618B-4FC6-9B8D-AF076B248E3B}"/>
               </a:ext>
             </a:extLst>
           </p:cNvPr>
@@ -8496,7 +8495,7 @@
           <p:cNvPr id="6" name="Multiplication Sign 5">
             <a:extLst>
               <a:ext uri="{FF2B5EF4-FFF2-40B4-BE49-F238E27FC236}">
-                <a16:creationId xmlns:a16="http://schemas.microsoft.com/office/drawing/2014/main" xmlns="" id="{38108A66-6254-422A-831E-1095BB8DE301}"/>
+                <a16:creationId xmlns:a16="http://schemas.microsoft.com/office/drawing/2014/main" id="{38108A66-6254-422A-831E-1095BB8DE301}"/>
               </a:ext>
             </a:extLst>
           </p:cNvPr>
@@ -8550,7 +8549,7 @@
           <p:cNvPr id="7" name="TextBox 6">
             <a:extLst>
               <a:ext uri="{FF2B5EF4-FFF2-40B4-BE49-F238E27FC236}">
-                <a16:creationId xmlns:a16="http://schemas.microsoft.com/office/drawing/2014/main" xmlns="" id="{AAB138A2-4672-41FA-B1A3-1BCF77A65C1E}"/>
+                <a16:creationId xmlns:a16="http://schemas.microsoft.com/office/drawing/2014/main" id="{AAB138A2-4672-41FA-B1A3-1BCF77A65C1E}"/>
               </a:ext>
             </a:extLst>
           </p:cNvPr>
@@ -8599,7 +8598,7 @@
           <p:cNvPr id="8" name="TextBox 7">
             <a:extLst>
               <a:ext uri="{FF2B5EF4-FFF2-40B4-BE49-F238E27FC236}">
-                <a16:creationId xmlns:a16="http://schemas.microsoft.com/office/drawing/2014/main" xmlns="" id="{834ADA7A-0E97-41A2-AA02-F570FA699361}"/>
+                <a16:creationId xmlns:a16="http://schemas.microsoft.com/office/drawing/2014/main" id="{834ADA7A-0E97-41A2-AA02-F570FA699361}"/>
               </a:ext>
             </a:extLst>
           </p:cNvPr>
@@ -8656,7 +8655,7 @@
           <p:cNvPr id="9" name="Multiplication Sign 8">
             <a:extLst>
               <a:ext uri="{FF2B5EF4-FFF2-40B4-BE49-F238E27FC236}">
-                <a16:creationId xmlns:a16="http://schemas.microsoft.com/office/drawing/2014/main" xmlns="" id="{F7361447-BB27-4ADC-84D0-A4BAC0BC306E}"/>
+                <a16:creationId xmlns:a16="http://schemas.microsoft.com/office/drawing/2014/main" id="{F7361447-BB27-4ADC-84D0-A4BAC0BC306E}"/>
               </a:ext>
             </a:extLst>
           </p:cNvPr>
@@ -8710,7 +8709,7 @@
           <p:cNvPr id="10" name="TextBox 9">
             <a:extLst>
               <a:ext uri="{FF2B5EF4-FFF2-40B4-BE49-F238E27FC236}">
-                <a16:creationId xmlns:a16="http://schemas.microsoft.com/office/drawing/2014/main" xmlns="" id="{641F9E26-7091-49A7-85FD-BE26B7A11674}"/>
+                <a16:creationId xmlns:a16="http://schemas.microsoft.com/office/drawing/2014/main" id="{641F9E26-7091-49A7-85FD-BE26B7A11674}"/>
               </a:ext>
             </a:extLst>
           </p:cNvPr>
@@ -8745,7 +8744,7 @@
           <p:cNvPr id="11" name="Star: 5 Points 10">
             <a:extLst>
               <a:ext uri="{FF2B5EF4-FFF2-40B4-BE49-F238E27FC236}">
-                <a16:creationId xmlns:a16="http://schemas.microsoft.com/office/drawing/2014/main" xmlns="" id="{7A1FC458-B0D5-4718-8044-8530CD4DB6B5}"/>
+                <a16:creationId xmlns:a16="http://schemas.microsoft.com/office/drawing/2014/main" id="{7A1FC458-B0D5-4718-8044-8530CD4DB6B5}"/>
               </a:ext>
             </a:extLst>
           </p:cNvPr>
@@ -8794,7 +8793,7 @@
           <p:cNvPr id="12" name="Arrow: Right 11">
             <a:extLst>
               <a:ext uri="{FF2B5EF4-FFF2-40B4-BE49-F238E27FC236}">
-                <a16:creationId xmlns:a16="http://schemas.microsoft.com/office/drawing/2014/main" xmlns="" id="{613088F8-9901-4703-92B1-605E382D41A0}"/>
+                <a16:creationId xmlns:a16="http://schemas.microsoft.com/office/drawing/2014/main" id="{613088F8-9901-4703-92B1-605E382D41A0}"/>
               </a:ext>
             </a:extLst>
           </p:cNvPr>
@@ -8843,7 +8842,7 @@
           <p:cNvPr id="13" name="Arrow: Right 12">
             <a:extLst>
               <a:ext uri="{FF2B5EF4-FFF2-40B4-BE49-F238E27FC236}">
-                <a16:creationId xmlns:a16="http://schemas.microsoft.com/office/drawing/2014/main" xmlns="" id="{DA921B65-C924-4394-964E-0F6CDA3052B6}"/>
+                <a16:creationId xmlns:a16="http://schemas.microsoft.com/office/drawing/2014/main" id="{DA921B65-C924-4394-964E-0F6CDA3052B6}"/>
               </a:ext>
             </a:extLst>
           </p:cNvPr>
@@ -8892,7 +8891,7 @@
           <p:cNvPr id="14" name="Arrow: Right 13">
             <a:extLst>
               <a:ext uri="{FF2B5EF4-FFF2-40B4-BE49-F238E27FC236}">
-                <a16:creationId xmlns:a16="http://schemas.microsoft.com/office/drawing/2014/main" xmlns="" id="{A3769C37-5722-4B99-AAEA-B6E4EFB15057}"/>
+                <a16:creationId xmlns:a16="http://schemas.microsoft.com/office/drawing/2014/main" id="{A3769C37-5722-4B99-AAEA-B6E4EFB15057}"/>
               </a:ext>
             </a:extLst>
           </p:cNvPr>
@@ -8971,7 +8970,7 @@
           <p:cNvPr id="2" name="Titel 1">
             <a:extLst>
               <a:ext uri="{FF2B5EF4-FFF2-40B4-BE49-F238E27FC236}">
-                <a16:creationId xmlns:a16="http://schemas.microsoft.com/office/drawing/2014/main" xmlns="" id="{D830302C-DA89-453C-9E9D-624506AE6BA3}"/>
+                <a16:creationId xmlns:a16="http://schemas.microsoft.com/office/drawing/2014/main" id="{D830302C-DA89-453C-9E9D-624506AE6BA3}"/>
               </a:ext>
             </a:extLst>
           </p:cNvPr>
@@ -8989,10 +8988,9 @@
           <a:p>
             <a:pPr algn="ctr"/>
             <a:r>
-              <a:rPr lang="de-DE" dirty="0" smtClean="0"/>
+              <a:rPr lang="de-DE" dirty="0"/>
               <a:t>EVA</a:t>
             </a:r>
-            <a:endParaRPr lang="de-DE" dirty="0"/>
           </a:p>
         </p:txBody>
       </p:sp>
@@ -9001,7 +8999,7 @@
           <p:cNvPr id="4" name="Foliennummernplatzhalter 3">
             <a:extLst>
               <a:ext uri="{FF2B5EF4-FFF2-40B4-BE49-F238E27FC236}">
-                <a16:creationId xmlns:a16="http://schemas.microsoft.com/office/drawing/2014/main" xmlns="" id="{6318C5D9-92EB-47E6-BBFE-6FA653933C38}"/>
+                <a16:creationId xmlns:a16="http://schemas.microsoft.com/office/drawing/2014/main" id="{6318C5D9-92EB-47E6-BBFE-6FA653933C38}"/>
               </a:ext>
             </a:extLst>
           </p:cNvPr>
@@ -9030,7 +9028,7 @@
           <p:cNvPr id="7" name="Bild 4">
             <a:extLst>
               <a:ext uri="{FF2B5EF4-FFF2-40B4-BE49-F238E27FC236}">
-                <a16:creationId xmlns:a16="http://schemas.microsoft.com/office/drawing/2014/main" xmlns="" id="{E0FAF2E6-9064-48B8-8F4E-D1CFCBBDAECE}"/>
+                <a16:creationId xmlns:a16="http://schemas.microsoft.com/office/drawing/2014/main" id="{E0FAF2E6-9064-48B8-8F4E-D1CFCBBDAECE}"/>
               </a:ext>
             </a:extLst>
           </p:cNvPr>
@@ -9098,7 +9096,7 @@
           <p:cNvPr id="2" name="Title 1">
             <a:extLst>
               <a:ext uri="{FF2B5EF4-FFF2-40B4-BE49-F238E27FC236}">
-                <a16:creationId xmlns:a16="http://schemas.microsoft.com/office/drawing/2014/main" xmlns="" id="{132A757A-169E-4DF2-B061-2F78EA10A643}"/>
+                <a16:creationId xmlns:a16="http://schemas.microsoft.com/office/drawing/2014/main" id="{132A757A-169E-4DF2-B061-2F78EA10A643}"/>
               </a:ext>
             </a:extLst>
           </p:cNvPr>
@@ -9127,7 +9125,7 @@
           <p:cNvPr id="3" name="Content Placeholder 2">
             <a:extLst>
               <a:ext uri="{FF2B5EF4-FFF2-40B4-BE49-F238E27FC236}">
-                <a16:creationId xmlns:a16="http://schemas.microsoft.com/office/drawing/2014/main" xmlns="" id="{2801F26C-FB81-4294-B60C-5467A60EBFF5}"/>
+                <a16:creationId xmlns:a16="http://schemas.microsoft.com/office/drawing/2014/main" id="{2801F26C-FB81-4294-B60C-5467A60EBFF5}"/>
               </a:ext>
             </a:extLst>
           </p:cNvPr>
@@ -9175,7 +9173,7 @@
           <p:cNvPr id="4" name="Slide Number Placeholder 3">
             <a:extLst>
               <a:ext uri="{FF2B5EF4-FFF2-40B4-BE49-F238E27FC236}">
-                <a16:creationId xmlns:a16="http://schemas.microsoft.com/office/drawing/2014/main" xmlns="" id="{D0D74A05-15E2-4D32-B99A-14F9102497F5}"/>
+                <a16:creationId xmlns:a16="http://schemas.microsoft.com/office/drawing/2014/main" id="{D0D74A05-15E2-4D32-B99A-14F9102497F5}"/>
               </a:ext>
             </a:extLst>
           </p:cNvPr>
@@ -9209,14 +9207,6 @@
   <p:clrMapOvr>
     <a:masterClrMapping/>
   </p:clrMapOvr>
-  <mc:AlternateContent xmlns:mc="http://schemas.openxmlformats.org/markup-compatibility/2006">
-    <mc:Choice xmlns:p14="http://schemas.microsoft.com/office/powerpoint/2010/main" Requires="p14">
-      <p:transition spd="slow" p14:dur="2000"/>
-    </mc:Choice>
-    <mc:Fallback>
-      <p:transition xmlns:p14="http://schemas.microsoft.com/office/powerpoint/2010/main" spd="slow"/>
-    </mc:Fallback>
-  </mc:AlternateContent>
 </p:sld>
 </file>
 
@@ -9242,7 +9232,7 @@
           <p:cNvPr id="2" name="Title 1">
             <a:extLst>
               <a:ext uri="{FF2B5EF4-FFF2-40B4-BE49-F238E27FC236}">
-                <a16:creationId xmlns:a16="http://schemas.microsoft.com/office/drawing/2014/main" xmlns="" id="{132A757A-169E-4DF2-B061-2F78EA10A643}"/>
+                <a16:creationId xmlns:a16="http://schemas.microsoft.com/office/drawing/2014/main" id="{132A757A-169E-4DF2-B061-2F78EA10A643}"/>
               </a:ext>
             </a:extLst>
           </p:cNvPr>
@@ -9271,7 +9261,7 @@
           <p:cNvPr id="4" name="Slide Number Placeholder 3">
             <a:extLst>
               <a:ext uri="{FF2B5EF4-FFF2-40B4-BE49-F238E27FC236}">
-                <a16:creationId xmlns:a16="http://schemas.microsoft.com/office/drawing/2014/main" xmlns="" id="{D0D74A05-15E2-4D32-B99A-14F9102497F5}"/>
+                <a16:creationId xmlns:a16="http://schemas.microsoft.com/office/drawing/2014/main" id="{D0D74A05-15E2-4D32-B99A-14F9102497F5}"/>
               </a:ext>
             </a:extLst>
           </p:cNvPr>
@@ -9300,7 +9290,7 @@
           <p:cNvPr id="6" name="Rectangle: Rounded Corners 5">
             <a:extLst>
               <a:ext uri="{FF2B5EF4-FFF2-40B4-BE49-F238E27FC236}">
-                <a16:creationId xmlns:a16="http://schemas.microsoft.com/office/drawing/2014/main" xmlns="" id="{7C70509A-789A-4162-9451-DBAD31EF31EF}"/>
+                <a16:creationId xmlns:a16="http://schemas.microsoft.com/office/drawing/2014/main" id="{7C70509A-789A-4162-9451-DBAD31EF31EF}"/>
               </a:ext>
             </a:extLst>
           </p:cNvPr>
@@ -9361,7 +9351,7 @@
           <p:cNvPr id="7" name="Rectangle: Rounded Corners 6">
             <a:extLst>
               <a:ext uri="{FF2B5EF4-FFF2-40B4-BE49-F238E27FC236}">
-                <a16:creationId xmlns:a16="http://schemas.microsoft.com/office/drawing/2014/main" xmlns="" id="{B13430B5-839B-4BD3-9483-0EEAC9F030F8}"/>
+                <a16:creationId xmlns:a16="http://schemas.microsoft.com/office/drawing/2014/main" id="{B13430B5-839B-4BD3-9483-0EEAC9F030F8}"/>
               </a:ext>
             </a:extLst>
           </p:cNvPr>
@@ -9422,7 +9412,7 @@
           <p:cNvPr id="8" name="TextBox 7">
             <a:extLst>
               <a:ext uri="{FF2B5EF4-FFF2-40B4-BE49-F238E27FC236}">
-                <a16:creationId xmlns:a16="http://schemas.microsoft.com/office/drawing/2014/main" xmlns="" id="{04F897F3-567B-4871-96B4-AE7D59EE860A}"/>
+                <a16:creationId xmlns:a16="http://schemas.microsoft.com/office/drawing/2014/main" id="{04F897F3-567B-4871-96B4-AE7D59EE860A}"/>
               </a:ext>
             </a:extLst>
           </p:cNvPr>
@@ -9458,12 +9448,8 @@
           </a:p>
           <a:p>
             <a:r>
-              <a:rPr lang="de-DE" sz="2800" dirty="0" smtClean="0"/>
-              <a:t>Reihenfolge </a:t>
-            </a:r>
-            <a:r>
               <a:rPr lang="de-DE" sz="2800" dirty="0"/>
-              <a:t>durchlaufen</a:t>
+              <a:t>Reihenfolge durchlaufen</a:t>
             </a:r>
           </a:p>
         </p:txBody>
@@ -9473,7 +9459,7 @@
           <p:cNvPr id="9" name="Arrow: Down 8">
             <a:extLst>
               <a:ext uri="{FF2B5EF4-FFF2-40B4-BE49-F238E27FC236}">
-                <a16:creationId xmlns:a16="http://schemas.microsoft.com/office/drawing/2014/main" xmlns="" id="{1898FDFC-5D86-4051-87C5-8397E6F89BEB}"/>
+                <a16:creationId xmlns:a16="http://schemas.microsoft.com/office/drawing/2014/main" id="{1898FDFC-5D86-4051-87C5-8397E6F89BEB}"/>
               </a:ext>
             </a:extLst>
           </p:cNvPr>
@@ -9527,7 +9513,7 @@
           <p:cNvPr id="11" name="Straight Connector 10">
             <a:extLst>
               <a:ext uri="{FF2B5EF4-FFF2-40B4-BE49-F238E27FC236}">
-                <a16:creationId xmlns:a16="http://schemas.microsoft.com/office/drawing/2014/main" xmlns="" id="{EAD10B8C-23E0-4173-ABA9-2656558830E4}"/>
+                <a16:creationId xmlns:a16="http://schemas.microsoft.com/office/drawing/2014/main" id="{EAD10B8C-23E0-4173-ABA9-2656558830E4}"/>
               </a:ext>
             </a:extLst>
           </p:cNvPr>
@@ -9567,7 +9553,7 @@
           <p:cNvPr id="12" name="TextBox 11">
             <a:extLst>
               <a:ext uri="{FF2B5EF4-FFF2-40B4-BE49-F238E27FC236}">
-                <a16:creationId xmlns:a16="http://schemas.microsoft.com/office/drawing/2014/main" xmlns="" id="{022E76B3-201D-407D-8BCA-BA1A5C48EF71}"/>
+                <a16:creationId xmlns:a16="http://schemas.microsoft.com/office/drawing/2014/main" id="{022E76B3-201D-407D-8BCA-BA1A5C48EF71}"/>
               </a:ext>
             </a:extLst>
           </p:cNvPr>
@@ -9614,7 +9600,7 @@
           <p:cNvPr id="13" name="Straight Connector 12">
             <a:extLst>
               <a:ext uri="{FF2B5EF4-FFF2-40B4-BE49-F238E27FC236}">
-                <a16:creationId xmlns:a16="http://schemas.microsoft.com/office/drawing/2014/main" xmlns="" id="{F6C24DE6-D0C9-4DB6-AA8C-1DA6DCB18C9F}"/>
+                <a16:creationId xmlns:a16="http://schemas.microsoft.com/office/drawing/2014/main" id="{F6C24DE6-D0C9-4DB6-AA8C-1DA6DCB18C9F}"/>
               </a:ext>
             </a:extLst>
           </p:cNvPr>
@@ -9681,7 +9667,7 @@
           <p:cNvPr id="2" name="Title 1">
             <a:extLst>
               <a:ext uri="{FF2B5EF4-FFF2-40B4-BE49-F238E27FC236}">
-                <a16:creationId xmlns:a16="http://schemas.microsoft.com/office/drawing/2014/main" xmlns="" id="{BBFD2BFE-57E4-4A51-B59D-1A6DD4DAF801}"/>
+                <a16:creationId xmlns:a16="http://schemas.microsoft.com/office/drawing/2014/main" id="{BBFD2BFE-57E4-4A51-B59D-1A6DD4DAF801}"/>
               </a:ext>
             </a:extLst>
           </p:cNvPr>
@@ -9704,7 +9690,7 @@
           <a:p>
             <a:pPr algn="ctr"/>
             <a:r>
-              <a:rPr lang="de-DE" dirty="0" err="1" smtClean="0"/>
+              <a:rPr lang="de-DE" dirty="0" err="1"/>
               <a:t>Graphenaufbau</a:t>
             </a:r>
             <a:endParaRPr lang="de-DE" dirty="0"/>
@@ -9716,7 +9702,7 @@
           <p:cNvPr id="3" name="Content Placeholder 2">
             <a:extLst>
               <a:ext uri="{FF2B5EF4-FFF2-40B4-BE49-F238E27FC236}">
-                <a16:creationId xmlns:a16="http://schemas.microsoft.com/office/drawing/2014/main" xmlns="" id="{B992D437-2AD8-4E4B-AA6B-03A5A0A0E9DB}"/>
+                <a16:creationId xmlns:a16="http://schemas.microsoft.com/office/drawing/2014/main" id="{B992D437-2AD8-4E4B-AA6B-03A5A0A0E9DB}"/>
               </a:ext>
             </a:extLst>
           </p:cNvPr>
@@ -9767,13 +9753,8 @@
           <a:p>
             <a:r>
               <a:rPr lang="de-DE" dirty="0"/>
-              <a:t>Übergänge: Spielzüge Roboter/</a:t>
-            </a:r>
-            <a:r>
-              <a:rPr lang="de-DE" dirty="0" smtClean="0"/>
-              <a:t>Kind</a:t>
-            </a:r>
-            <a:endParaRPr lang="de-DE" dirty="0"/>
+              <a:t>Übergänge: Spielzüge Roboter/Kind</a:t>
+            </a:r>
           </a:p>
         </p:txBody>
       </p:sp>
@@ -9782,7 +9763,7 @@
           <p:cNvPr id="4" name="Slide Number Placeholder 3">
             <a:extLst>
               <a:ext uri="{FF2B5EF4-FFF2-40B4-BE49-F238E27FC236}">
-                <a16:creationId xmlns:a16="http://schemas.microsoft.com/office/drawing/2014/main" xmlns="" id="{5E77F37A-6998-484B-B08C-6AF3769D347B}"/>
+                <a16:creationId xmlns:a16="http://schemas.microsoft.com/office/drawing/2014/main" id="{5E77F37A-6998-484B-B08C-6AF3769D347B}"/>
               </a:ext>
             </a:extLst>
           </p:cNvPr>
@@ -9853,7 +9834,7 @@
           <a:p>
             <a:pPr algn="ctr"/>
             <a:r>
-              <a:rPr lang="de-DE" dirty="0" err="1" smtClean="0"/>
+              <a:rPr lang="de-DE" dirty="0" err="1"/>
               <a:t>Graphengenerierung</a:t>
             </a:r>
             <a:endParaRPr lang="de-DE" dirty="0"/>
@@ -9880,15 +9861,15 @@
               <a:buAutoNum type="arabicPeriod"/>
             </a:pPr>
             <a:r>
-              <a:rPr lang="de-DE" dirty="0" smtClean="0"/>
+              <a:rPr lang="de-DE" dirty="0"/>
               <a:t>Startzustand aus </a:t>
             </a:r>
             <a:r>
-              <a:rPr lang="de-DE" dirty="0" err="1" smtClean="0"/>
+              <a:rPr lang="de-DE" dirty="0" err="1"/>
               <a:t>initialen</a:t>
             </a:r>
             <a:r>
-              <a:rPr lang="de-DE" dirty="0" smtClean="0"/>
+              <a:rPr lang="de-DE" dirty="0"/>
               <a:t> Positionen</a:t>
             </a:r>
           </a:p>
@@ -9898,7 +9879,7 @@
               <a:buAutoNum type="arabicPeriod"/>
             </a:pPr>
             <a:r>
-              <a:rPr lang="de-DE" dirty="0" smtClean="0"/>
+              <a:rPr lang="de-DE" dirty="0"/>
               <a:t>Roboterzüge berechnen</a:t>
             </a:r>
           </a:p>
@@ -9908,15 +9889,15 @@
               <a:buAutoNum type="arabicPeriod"/>
             </a:pPr>
             <a:r>
-              <a:rPr lang="de-DE" dirty="0" smtClean="0"/>
+              <a:rPr lang="de-DE" dirty="0"/>
               <a:t>Darauffolgende </a:t>
             </a:r>
             <a:r>
-              <a:rPr lang="de-DE" dirty="0" err="1" smtClean="0"/>
+              <a:rPr lang="de-DE" dirty="0" err="1"/>
               <a:t>Kindzüge</a:t>
             </a:r>
             <a:r>
-              <a:rPr lang="de-DE" dirty="0" smtClean="0"/>
+              <a:rPr lang="de-DE" dirty="0"/>
               <a:t> für alle berechneten Zustände berechnen und schauen ob mindestens ein ungültiger dabei ist</a:t>
             </a:r>
           </a:p>
@@ -9926,7 +9907,7 @@
               <a:buAutoNum type="arabicPeriod"/>
             </a:pPr>
             <a:r>
-              <a:rPr lang="de-DE" dirty="0" smtClean="0"/>
+              <a:rPr lang="de-DE" dirty="0"/>
               <a:t>Wenn ja: Zustand verwerfen</a:t>
             </a:r>
           </a:p>
@@ -9936,7 +9917,7 @@
               <a:buAutoNum type="arabicPeriod"/>
             </a:pPr>
             <a:r>
-              <a:rPr lang="de-DE" dirty="0" smtClean="0"/>
+              <a:rPr lang="de-DE" dirty="0"/>
               <a:t>Alle nicht vorhandenen in Warteschlange einreihen</a:t>
             </a:r>
           </a:p>
@@ -9946,11 +9927,11 @@
               <a:buAutoNum type="arabicPeriod"/>
             </a:pPr>
             <a:r>
-              <a:rPr lang="de-DE" dirty="0" err="1" smtClean="0"/>
+              <a:rPr lang="de-DE" dirty="0" err="1"/>
               <a:t>Kindzüge</a:t>
             </a:r>
             <a:r>
-              <a:rPr lang="de-DE" dirty="0" smtClean="0"/>
+              <a:rPr lang="de-DE" dirty="0"/>
               <a:t> berechnen</a:t>
             </a:r>
           </a:p>
@@ -9961,11 +9942,7 @@
             </a:pPr>
             <a:r>
               <a:rPr lang="de-DE" dirty="0"/>
-              <a:t>Alle nicht vorhandenen in Warteschlange </a:t>
-            </a:r>
-            <a:r>
-              <a:rPr lang="de-DE" dirty="0" smtClean="0"/>
-              <a:t>einreihen</a:t>
+              <a:t>Alle nicht vorhandenen in Warteschlange einreihen</a:t>
             </a:r>
           </a:p>
           <a:p>
@@ -9974,11 +9951,11 @@
               <a:buAutoNum type="arabicPeriod"/>
             </a:pPr>
             <a:r>
-              <a:rPr lang="de-DE" dirty="0" err="1" smtClean="0"/>
+              <a:rPr lang="de-DE" dirty="0" err="1"/>
               <a:t>goto</a:t>
             </a:r>
             <a:r>
-              <a:rPr lang="de-DE" dirty="0" smtClean="0"/>
+              <a:rPr lang="de-DE" dirty="0"/>
               <a:t> 2 bis Warteschlange leer</a:t>
             </a:r>
           </a:p>
@@ -10045,7 +10022,7 @@
           <p:cNvPr id="2" name="Titel 1">
             <a:extLst>
               <a:ext uri="{FF2B5EF4-FFF2-40B4-BE49-F238E27FC236}">
-                <a16:creationId xmlns:a16="http://schemas.microsoft.com/office/drawing/2014/main" xmlns="" id="{270E6DA7-7E9F-416C-8BF7-49DA3B46A7E3}"/>
+                <a16:creationId xmlns:a16="http://schemas.microsoft.com/office/drawing/2014/main" id="{270E6DA7-7E9F-416C-8BF7-49DA3B46A7E3}"/>
               </a:ext>
             </a:extLst>
           </p:cNvPr>
@@ -10074,7 +10051,7 @@
           <p:cNvPr id="3" name="Inhaltsplatzhalter 2">
             <a:extLst>
               <a:ext uri="{FF2B5EF4-FFF2-40B4-BE49-F238E27FC236}">
-                <a16:creationId xmlns:a16="http://schemas.microsoft.com/office/drawing/2014/main" xmlns="" id="{D2EEAE80-11B6-4B94-8FA4-EECF75905D99}"/>
+                <a16:creationId xmlns:a16="http://schemas.microsoft.com/office/drawing/2014/main" id="{D2EEAE80-11B6-4B94-8FA4-EECF75905D99}"/>
               </a:ext>
             </a:extLst>
           </p:cNvPr>
@@ -10107,7 +10084,7 @@
           <p:cNvPr id="4" name="Foliennummernplatzhalter 3">
             <a:extLst>
               <a:ext uri="{FF2B5EF4-FFF2-40B4-BE49-F238E27FC236}">
-                <a16:creationId xmlns:a16="http://schemas.microsoft.com/office/drawing/2014/main" xmlns="" id="{7F69AB07-BCC7-4E3F-8A9E-FE017903336B}"/>
+                <a16:creationId xmlns:a16="http://schemas.microsoft.com/office/drawing/2014/main" id="{7F69AB07-BCC7-4E3F-8A9E-FE017903336B}"/>
               </a:ext>
             </a:extLst>
           </p:cNvPr>
@@ -10133,7 +10110,13 @@
       </p:sp>
       <p:pic>
         <p:nvPicPr>
-          <p:cNvPr id="6" name="Bild 5"/>
+          <p:cNvPr id="8" name="Grafik 7">
+            <a:extLst>
+              <a:ext uri="{FF2B5EF4-FFF2-40B4-BE49-F238E27FC236}">
+                <a16:creationId xmlns:a16="http://schemas.microsoft.com/office/drawing/2014/main" id="{8FF90E1C-542C-4981-ABD3-EB8B50AD31D6}"/>
+              </a:ext>
+            </a:extLst>
+          </p:cNvPr>
           <p:cNvPicPr>
             <a:picLocks noChangeAspect="1"/>
           </p:cNvPicPr>
@@ -10153,8 +10136,8 @@
         </p:blipFill>
         <p:spPr>
           <a:xfrm rot="16200000">
-            <a:off x="2671832" y="-2649637"/>
-            <a:ext cx="6870532" cy="12169803"/>
+            <a:off x="3032126" y="-2562701"/>
+            <a:ext cx="6127751" cy="11983400"/>
           </a:xfrm>
           <a:prstGeom prst="rect">
             <a:avLst/>
@@ -10196,7 +10179,7 @@
           <p:cNvPr id="2" name="Titel 1">
             <a:extLst>
               <a:ext uri="{FF2B5EF4-FFF2-40B4-BE49-F238E27FC236}">
-                <a16:creationId xmlns:a16="http://schemas.microsoft.com/office/drawing/2014/main" xmlns="" id="{AB797468-C3B3-4625-A645-4FF1498D3D36}"/>
+                <a16:creationId xmlns:a16="http://schemas.microsoft.com/office/drawing/2014/main" id="{AB797468-C3B3-4625-A645-4FF1498D3D36}"/>
               </a:ext>
             </a:extLst>
           </p:cNvPr>
@@ -10214,7 +10197,7 @@
           <a:p>
             <a:r>
               <a:rPr lang="de-DE" dirty="0"/>
-              <a:t>Formale Methoden</a:t>
+              <a:t>Formale Methoden Eingebetter Systeme</a:t>
             </a:r>
           </a:p>
         </p:txBody>
@@ -10224,7 +10207,7 @@
           <p:cNvPr id="3" name="Untertitel 2">
             <a:extLst>
               <a:ext uri="{FF2B5EF4-FFF2-40B4-BE49-F238E27FC236}">
-                <a16:creationId xmlns:a16="http://schemas.microsoft.com/office/drawing/2014/main" xmlns="" id="{90F58143-0024-47BA-B87F-224EB2258D41}"/>
+                <a16:creationId xmlns:a16="http://schemas.microsoft.com/office/drawing/2014/main" id="{90F58143-0024-47BA-B87F-224EB2258D41}"/>
               </a:ext>
             </a:extLst>
           </p:cNvPr>
@@ -10266,7 +10249,7 @@
           <p:cNvPr id="4" name="Foliennummernplatzhalter 3">
             <a:extLst>
               <a:ext uri="{FF2B5EF4-FFF2-40B4-BE49-F238E27FC236}">
-                <a16:creationId xmlns:a16="http://schemas.microsoft.com/office/drawing/2014/main" xmlns="" id="{DE1C29E7-48F7-44B2-9F58-68C8DB0777C2}"/>
+                <a16:creationId xmlns:a16="http://schemas.microsoft.com/office/drawing/2014/main" id="{DE1C29E7-48F7-44B2-9F58-68C8DB0777C2}"/>
               </a:ext>
             </a:extLst>
           </p:cNvPr>
@@ -10325,7 +10308,7 @@
           <p:cNvPr id="2" name="Titel 1">
             <a:extLst>
               <a:ext uri="{FF2B5EF4-FFF2-40B4-BE49-F238E27FC236}">
-                <a16:creationId xmlns:a16="http://schemas.microsoft.com/office/drawing/2014/main" xmlns="" id="{95A3FC0A-3806-4A6C-8BAF-49105356BDEB}"/>
+                <a16:creationId xmlns:a16="http://schemas.microsoft.com/office/drawing/2014/main" id="{95A3FC0A-3806-4A6C-8BAF-49105356BDEB}"/>
               </a:ext>
             </a:extLst>
           </p:cNvPr>
@@ -10354,7 +10337,7 @@
           <p:cNvPr id="3" name="Inhaltsplatzhalter 2">
             <a:extLst>
               <a:ext uri="{FF2B5EF4-FFF2-40B4-BE49-F238E27FC236}">
-                <a16:creationId xmlns:a16="http://schemas.microsoft.com/office/drawing/2014/main" xmlns="" id="{ED8FBAF4-21B7-41F9-87E3-AA4F613F4B28}"/>
+                <a16:creationId xmlns:a16="http://schemas.microsoft.com/office/drawing/2014/main" id="{ED8FBAF4-21B7-41F9-87E3-AA4F613F4B28}"/>
               </a:ext>
             </a:extLst>
           </p:cNvPr>
@@ -10415,7 +10398,7 @@
           <p:cNvPr id="4" name="Foliennummernplatzhalter 3">
             <a:extLst>
               <a:ext uri="{FF2B5EF4-FFF2-40B4-BE49-F238E27FC236}">
-                <a16:creationId xmlns:a16="http://schemas.microsoft.com/office/drawing/2014/main" xmlns="" id="{0DD1B6F9-E57D-4F76-917B-E6637BFB2A8E}"/>
+                <a16:creationId xmlns:a16="http://schemas.microsoft.com/office/drawing/2014/main" id="{0DD1B6F9-E57D-4F76-917B-E6637BFB2A8E}"/>
               </a:ext>
             </a:extLst>
           </p:cNvPr>
@@ -10498,7 +10481,7 @@
           <p:cNvPr id="2" name="Title 1">
             <a:extLst>
               <a:ext uri="{FF2B5EF4-FFF2-40B4-BE49-F238E27FC236}">
-                <a16:creationId xmlns:a16="http://schemas.microsoft.com/office/drawing/2014/main" xmlns="" id="{3C939BD4-D9D8-457A-B76C-E3D1F62B16C2}"/>
+                <a16:creationId xmlns:a16="http://schemas.microsoft.com/office/drawing/2014/main" id="{3C939BD4-D9D8-457A-B76C-E3D1F62B16C2}"/>
               </a:ext>
             </a:extLst>
           </p:cNvPr>
@@ -10527,7 +10510,7 @@
           <p:cNvPr id="3" name="Content Placeholder 2">
             <a:extLst>
               <a:ext uri="{FF2B5EF4-FFF2-40B4-BE49-F238E27FC236}">
-                <a16:creationId xmlns:a16="http://schemas.microsoft.com/office/drawing/2014/main" xmlns="" id="{59B6EF6F-C517-4C0C-A4C6-478E82E22FA9}"/>
+                <a16:creationId xmlns:a16="http://schemas.microsoft.com/office/drawing/2014/main" id="{59B6EF6F-C517-4C0C-A4C6-478E82E22FA9}"/>
               </a:ext>
             </a:extLst>
           </p:cNvPr>
@@ -10565,7 +10548,7 @@
           <p:cNvPr id="4" name="Slide Number Placeholder 3">
             <a:extLst>
               <a:ext uri="{FF2B5EF4-FFF2-40B4-BE49-F238E27FC236}">
-                <a16:creationId xmlns:a16="http://schemas.microsoft.com/office/drawing/2014/main" xmlns="" id="{08BF1626-F459-4C91-A2D9-0E0413559529}"/>
+                <a16:creationId xmlns:a16="http://schemas.microsoft.com/office/drawing/2014/main" id="{08BF1626-F459-4C91-A2D9-0E0413559529}"/>
               </a:ext>
             </a:extLst>
           </p:cNvPr>
@@ -10599,14 +10582,6 @@
   <p:clrMapOvr>
     <a:masterClrMapping/>
   </p:clrMapOvr>
-  <mc:AlternateContent xmlns:mc="http://schemas.openxmlformats.org/markup-compatibility/2006">
-    <mc:Choice xmlns:p14="http://schemas.microsoft.com/office/powerpoint/2010/main" Requires="p14">
-      <p:transition spd="slow" p14:dur="2000"/>
-    </mc:Choice>
-    <mc:Fallback>
-      <p:transition xmlns:p14="http://schemas.microsoft.com/office/powerpoint/2010/main" spd="slow"/>
-    </mc:Fallback>
-  </mc:AlternateContent>
 </p:sld>
 </file>
 
@@ -10632,7 +10607,7 @@
           <p:cNvPr id="2" name="Title 1">
             <a:extLst>
               <a:ext uri="{FF2B5EF4-FFF2-40B4-BE49-F238E27FC236}">
-                <a16:creationId xmlns:a16="http://schemas.microsoft.com/office/drawing/2014/main" xmlns="" id="{3C939BD4-D9D8-457A-B76C-E3D1F62B16C2}"/>
+                <a16:creationId xmlns:a16="http://schemas.microsoft.com/office/drawing/2014/main" id="{3C939BD4-D9D8-457A-B76C-E3D1F62B16C2}"/>
               </a:ext>
             </a:extLst>
           </p:cNvPr>
@@ -10661,7 +10636,7 @@
           <p:cNvPr id="4" name="Slide Number Placeholder 3">
             <a:extLst>
               <a:ext uri="{FF2B5EF4-FFF2-40B4-BE49-F238E27FC236}">
-                <a16:creationId xmlns:a16="http://schemas.microsoft.com/office/drawing/2014/main" xmlns="" id="{08BF1626-F459-4C91-A2D9-0E0413559529}"/>
+                <a16:creationId xmlns:a16="http://schemas.microsoft.com/office/drawing/2014/main" id="{08BF1626-F459-4C91-A2D9-0E0413559529}"/>
               </a:ext>
             </a:extLst>
           </p:cNvPr>
@@ -10690,7 +10665,7 @@
           <p:cNvPr id="6" name="Content Placeholder 5">
             <a:extLst>
               <a:ext uri="{FF2B5EF4-FFF2-40B4-BE49-F238E27FC236}">
-                <a16:creationId xmlns:a16="http://schemas.microsoft.com/office/drawing/2014/main" xmlns="" id="{8ABBAD17-D195-4A08-896B-9DCA682344EE}"/>
+                <a16:creationId xmlns:a16="http://schemas.microsoft.com/office/drawing/2014/main" id="{8ABBAD17-D195-4A08-896B-9DCA682344EE}"/>
               </a:ext>
             </a:extLst>
           </p:cNvPr>
@@ -10762,7 +10737,7 @@
           <p:cNvPr id="2" name="Title 1">
             <a:extLst>
               <a:ext uri="{FF2B5EF4-FFF2-40B4-BE49-F238E27FC236}">
-                <a16:creationId xmlns:a16="http://schemas.microsoft.com/office/drawing/2014/main" xmlns="" id="{06BEDA57-7B6A-423A-A767-68DE43BD4B63}"/>
+                <a16:creationId xmlns:a16="http://schemas.microsoft.com/office/drawing/2014/main" id="{06BEDA57-7B6A-423A-A767-68DE43BD4B63}"/>
               </a:ext>
             </a:extLst>
           </p:cNvPr>
@@ -10791,7 +10766,7 @@
           <p:cNvPr id="3" name="Content Placeholder 2">
             <a:extLst>
               <a:ext uri="{FF2B5EF4-FFF2-40B4-BE49-F238E27FC236}">
-                <a16:creationId xmlns:a16="http://schemas.microsoft.com/office/drawing/2014/main" xmlns="" id="{1B228557-58FE-4B16-943F-3E3A18656556}"/>
+                <a16:creationId xmlns:a16="http://schemas.microsoft.com/office/drawing/2014/main" id="{1B228557-58FE-4B16-943F-3E3A18656556}"/>
               </a:ext>
             </a:extLst>
           </p:cNvPr>
@@ -10821,27 +10796,22 @@
           <a:p>
             <a:r>
               <a:rPr lang="de-DE" dirty="0"/>
-              <a:t>Batterie </a:t>
-            </a:r>
-            <a:r>
-              <a:rPr lang="de-DE" dirty="0" smtClean="0"/>
-              <a:t>Lösung</a:t>
-            </a:r>
-          </a:p>
-          <a:p>
-            <a:r>
-              <a:rPr lang="de-DE" dirty="0" smtClean="0"/>
+              <a:t>Batterie Lösung</a:t>
+            </a:r>
+          </a:p>
+          <a:p>
+            <a:r>
+              <a:rPr lang="de-DE" dirty="0"/>
               <a:t>Codeschnipsel einzeln </a:t>
             </a:r>
             <a:r>
-              <a:rPr lang="de-DE" dirty="0" err="1" smtClean="0"/>
+              <a:rPr lang="de-DE" dirty="0" err="1"/>
               <a:t>splitscreen</a:t>
             </a:r>
             <a:r>
-              <a:rPr lang="de-DE" dirty="0" smtClean="0"/>
+              <a:rPr lang="de-DE" dirty="0"/>
               <a:t>.</a:t>
             </a:r>
-            <a:endParaRPr lang="de-DE" dirty="0"/>
           </a:p>
         </p:txBody>
       </p:sp>
@@ -10850,7 +10820,7 @@
           <p:cNvPr id="4" name="Slide Number Placeholder 3">
             <a:extLst>
               <a:ext uri="{FF2B5EF4-FFF2-40B4-BE49-F238E27FC236}">
-                <a16:creationId xmlns:a16="http://schemas.microsoft.com/office/drawing/2014/main" xmlns="" id="{9E4F3BBA-350F-4622-BAC1-BFCAADEF46F0}"/>
+                <a16:creationId xmlns:a16="http://schemas.microsoft.com/office/drawing/2014/main" id="{9E4F3BBA-350F-4622-BAC1-BFCAADEF46F0}"/>
               </a:ext>
             </a:extLst>
           </p:cNvPr>
@@ -10884,14 +10854,6 @@
   <p:clrMapOvr>
     <a:masterClrMapping/>
   </p:clrMapOvr>
-  <mc:AlternateContent xmlns:mc="http://schemas.openxmlformats.org/markup-compatibility/2006">
-    <mc:Choice xmlns:p14="http://schemas.microsoft.com/office/powerpoint/2010/main" Requires="p14">
-      <p:transition spd="slow" p14:dur="2000"/>
-    </mc:Choice>
-    <mc:Fallback>
-      <p:transition xmlns:p14="http://schemas.microsoft.com/office/powerpoint/2010/main" spd="slow"/>
-    </mc:Fallback>
-  </mc:AlternateContent>
 </p:sld>
 </file>
 
@@ -10917,7 +10879,7 @@
           <p:cNvPr id="2" name="Title 1">
             <a:extLst>
               <a:ext uri="{FF2B5EF4-FFF2-40B4-BE49-F238E27FC236}">
-                <a16:creationId xmlns:a16="http://schemas.microsoft.com/office/drawing/2014/main" xmlns="" id="{06BEDA57-7B6A-423A-A767-68DE43BD4B63}"/>
+                <a16:creationId xmlns:a16="http://schemas.microsoft.com/office/drawing/2014/main" id="{06BEDA57-7B6A-423A-A767-68DE43BD4B63}"/>
               </a:ext>
             </a:extLst>
           </p:cNvPr>
@@ -10946,7 +10908,7 @@
           <p:cNvPr id="4" name="Slide Number Placeholder 3">
             <a:extLst>
               <a:ext uri="{FF2B5EF4-FFF2-40B4-BE49-F238E27FC236}">
-                <a16:creationId xmlns:a16="http://schemas.microsoft.com/office/drawing/2014/main" xmlns="" id="{9E4F3BBA-350F-4622-BAC1-BFCAADEF46F0}"/>
+                <a16:creationId xmlns:a16="http://schemas.microsoft.com/office/drawing/2014/main" id="{9E4F3BBA-350F-4622-BAC1-BFCAADEF46F0}"/>
               </a:ext>
             </a:extLst>
           </p:cNvPr>
@@ -10975,7 +10937,7 @@
           <p:cNvPr id="6" name="Content Placeholder 5">
             <a:extLst>
               <a:ext uri="{FF2B5EF4-FFF2-40B4-BE49-F238E27FC236}">
-                <a16:creationId xmlns:a16="http://schemas.microsoft.com/office/drawing/2014/main" xmlns="" id="{F3AAA2AA-570A-42F5-AD34-74BDEA51AD02}"/>
+                <a16:creationId xmlns:a16="http://schemas.microsoft.com/office/drawing/2014/main" id="{F3AAA2AA-570A-42F5-AD34-74BDEA51AD02}"/>
               </a:ext>
             </a:extLst>
           </p:cNvPr>
@@ -11000,7 +10962,7 @@
           <p:cNvPr id="7" name="Picture 6">
             <a:extLst>
               <a:ext uri="{FF2B5EF4-FFF2-40B4-BE49-F238E27FC236}">
-                <a16:creationId xmlns:a16="http://schemas.microsoft.com/office/drawing/2014/main" xmlns="" id="{78208436-60CA-416D-BE2D-4E100756D999}"/>
+                <a16:creationId xmlns:a16="http://schemas.microsoft.com/office/drawing/2014/main" id="{78208436-60CA-416D-BE2D-4E100756D999}"/>
               </a:ext>
             </a:extLst>
           </p:cNvPr>
@@ -11060,7 +11022,7 @@
           <p:cNvPr id="2" name="Titel 1">
             <a:extLst>
               <a:ext uri="{FF2B5EF4-FFF2-40B4-BE49-F238E27FC236}">
-                <a16:creationId xmlns:a16="http://schemas.microsoft.com/office/drawing/2014/main" xmlns="" id="{5D10B3B2-98CE-4A76-8F3B-AC87D7970181}"/>
+                <a16:creationId xmlns:a16="http://schemas.microsoft.com/office/drawing/2014/main" id="{5D10B3B2-98CE-4A76-8F3B-AC87D7970181}"/>
               </a:ext>
             </a:extLst>
           </p:cNvPr>
@@ -11089,7 +11051,7 @@
           <p:cNvPr id="3" name="Inhaltsplatzhalter 2">
             <a:extLst>
               <a:ext uri="{FF2B5EF4-FFF2-40B4-BE49-F238E27FC236}">
-                <a16:creationId xmlns:a16="http://schemas.microsoft.com/office/drawing/2014/main" xmlns="" id="{DF549B9E-E429-455E-9CCB-4C382D186DA1}"/>
+                <a16:creationId xmlns:a16="http://schemas.microsoft.com/office/drawing/2014/main" id="{DF549B9E-E429-455E-9CCB-4C382D186DA1}"/>
               </a:ext>
             </a:extLst>
           </p:cNvPr>
@@ -11151,10 +11113,9 @@
           </a:p>
           <a:p>
             <a:r>
-              <a:rPr lang="de-DE" dirty="0" smtClean="0"/>
+              <a:rPr lang="de-DE" dirty="0"/>
               <a:t>Noch vorhanden: Wenn Batterieladung nicht betrachtet werden soll muss Startladung auf hohen Wert gesetzt werden</a:t>
             </a:r>
-            <a:endParaRPr lang="de-DE" dirty="0"/>
           </a:p>
         </p:txBody>
       </p:sp>
@@ -11163,7 +11124,7 @@
           <p:cNvPr id="4" name="Foliennummernplatzhalter 3">
             <a:extLst>
               <a:ext uri="{FF2B5EF4-FFF2-40B4-BE49-F238E27FC236}">
-                <a16:creationId xmlns:a16="http://schemas.microsoft.com/office/drawing/2014/main" xmlns="" id="{10CA8FA4-8DBF-4853-9008-56DB49403505}"/>
+                <a16:creationId xmlns:a16="http://schemas.microsoft.com/office/drawing/2014/main" id="{10CA8FA4-8DBF-4853-9008-56DB49403505}"/>
               </a:ext>
             </a:extLst>
           </p:cNvPr>
@@ -11222,7 +11183,7 @@
           <p:cNvPr id="2" name="Titel 1">
             <a:extLst>
               <a:ext uri="{FF2B5EF4-FFF2-40B4-BE49-F238E27FC236}">
-                <a16:creationId xmlns:a16="http://schemas.microsoft.com/office/drawing/2014/main" xmlns="" id="{3A7BB2F4-FCC1-4DE5-B708-3CFD0CD6AE2E}"/>
+                <a16:creationId xmlns:a16="http://schemas.microsoft.com/office/drawing/2014/main" id="{3A7BB2F4-FCC1-4DE5-B708-3CFD0CD6AE2E}"/>
               </a:ext>
             </a:extLst>
           </p:cNvPr>
@@ -11251,7 +11212,7 @@
           <p:cNvPr id="3" name="Inhaltsplatzhalter 2">
             <a:extLst>
               <a:ext uri="{FF2B5EF4-FFF2-40B4-BE49-F238E27FC236}">
-                <a16:creationId xmlns:a16="http://schemas.microsoft.com/office/drawing/2014/main" xmlns="" id="{A44C6831-89D7-4EA9-AA4D-054654C37D3B}"/>
+                <a16:creationId xmlns:a16="http://schemas.microsoft.com/office/drawing/2014/main" id="{A44C6831-89D7-4EA9-AA4D-054654C37D3B}"/>
               </a:ext>
             </a:extLst>
           </p:cNvPr>
@@ -11360,7 +11321,7 @@
           <p:cNvPr id="4" name="Foliennummernplatzhalter 3">
             <a:extLst>
               <a:ext uri="{FF2B5EF4-FFF2-40B4-BE49-F238E27FC236}">
-                <a16:creationId xmlns:a16="http://schemas.microsoft.com/office/drawing/2014/main" xmlns="" id="{256B3083-294C-4EB3-A324-509DB8EA66E4}"/>
+                <a16:creationId xmlns:a16="http://schemas.microsoft.com/office/drawing/2014/main" id="{256B3083-294C-4EB3-A324-509DB8EA66E4}"/>
               </a:ext>
             </a:extLst>
           </p:cNvPr>
@@ -11419,7 +11380,7 @@
           <p:cNvPr id="4" name="Rechteck 3">
             <a:extLst>
               <a:ext uri="{FF2B5EF4-FFF2-40B4-BE49-F238E27FC236}">
-                <a16:creationId xmlns:a16="http://schemas.microsoft.com/office/drawing/2014/main" xmlns="" id="{D73FED10-72DC-481B-B3B2-828AF37ADFF7}"/>
+                <a16:creationId xmlns:a16="http://schemas.microsoft.com/office/drawing/2014/main" id="{D73FED10-72DC-481B-B3B2-828AF37ADFF7}"/>
               </a:ext>
             </a:extLst>
           </p:cNvPr>
@@ -11468,7 +11429,7 @@
           <p:cNvPr id="5" name="Rechteck 4">
             <a:extLst>
               <a:ext uri="{FF2B5EF4-FFF2-40B4-BE49-F238E27FC236}">
-                <a16:creationId xmlns:a16="http://schemas.microsoft.com/office/drawing/2014/main" xmlns="" id="{C34D8871-8351-4853-9007-BAF79871654E}"/>
+                <a16:creationId xmlns:a16="http://schemas.microsoft.com/office/drawing/2014/main" id="{C34D8871-8351-4853-9007-BAF79871654E}"/>
               </a:ext>
             </a:extLst>
           </p:cNvPr>
@@ -11517,7 +11478,7 @@
           <p:cNvPr id="9" name="Rechteck 8">
             <a:extLst>
               <a:ext uri="{FF2B5EF4-FFF2-40B4-BE49-F238E27FC236}">
-                <a16:creationId xmlns:a16="http://schemas.microsoft.com/office/drawing/2014/main" xmlns="" id="{D74FEB83-FA0A-4617-994A-6A1964C05A73}"/>
+                <a16:creationId xmlns:a16="http://schemas.microsoft.com/office/drawing/2014/main" id="{D74FEB83-FA0A-4617-994A-6A1964C05A73}"/>
               </a:ext>
             </a:extLst>
           </p:cNvPr>
@@ -11566,7 +11527,7 @@
           <p:cNvPr id="10" name="Ellipse 9">
             <a:extLst>
               <a:ext uri="{FF2B5EF4-FFF2-40B4-BE49-F238E27FC236}">
-                <a16:creationId xmlns:a16="http://schemas.microsoft.com/office/drawing/2014/main" xmlns="" id="{82AE9F3B-D926-41F5-8792-63E9941B6182}"/>
+                <a16:creationId xmlns:a16="http://schemas.microsoft.com/office/drawing/2014/main" id="{82AE9F3B-D926-41F5-8792-63E9941B6182}"/>
               </a:ext>
             </a:extLst>
           </p:cNvPr>
@@ -11615,7 +11576,7 @@
           <p:cNvPr id="11" name="Sechseck 10">
             <a:extLst>
               <a:ext uri="{FF2B5EF4-FFF2-40B4-BE49-F238E27FC236}">
-                <a16:creationId xmlns:a16="http://schemas.microsoft.com/office/drawing/2014/main" xmlns="" id="{99E638A5-59E2-495D-979A-EADA77656E43}"/>
+                <a16:creationId xmlns:a16="http://schemas.microsoft.com/office/drawing/2014/main" id="{99E638A5-59E2-495D-979A-EADA77656E43}"/>
               </a:ext>
             </a:extLst>
           </p:cNvPr>
@@ -11664,7 +11625,7 @@
           <p:cNvPr id="13" name="Gerade Verbindung mit Pfeil 12">
             <a:extLst>
               <a:ext uri="{FF2B5EF4-FFF2-40B4-BE49-F238E27FC236}">
-                <a16:creationId xmlns:a16="http://schemas.microsoft.com/office/drawing/2014/main" xmlns="" id="{160BD4FC-BC5D-48AF-BD55-A0C482D25F5F}"/>
+                <a16:creationId xmlns:a16="http://schemas.microsoft.com/office/drawing/2014/main" id="{160BD4FC-BC5D-48AF-BD55-A0C482D25F5F}"/>
               </a:ext>
             </a:extLst>
           </p:cNvPr>
@@ -11708,7 +11669,7 @@
           <p:cNvPr id="14" name="Gerade Verbindung mit Pfeil 13">
             <a:extLst>
               <a:ext uri="{FF2B5EF4-FFF2-40B4-BE49-F238E27FC236}">
-                <a16:creationId xmlns:a16="http://schemas.microsoft.com/office/drawing/2014/main" xmlns="" id="{0F744E52-1CFC-437A-AEB4-8E3A2DF8EBB7}"/>
+                <a16:creationId xmlns:a16="http://schemas.microsoft.com/office/drawing/2014/main" id="{0F744E52-1CFC-437A-AEB4-8E3A2DF8EBB7}"/>
               </a:ext>
             </a:extLst>
           </p:cNvPr>
@@ -11752,7 +11713,7 @@
           <p:cNvPr id="21" name="Gerade Verbindung mit Pfeil 20">
             <a:extLst>
               <a:ext uri="{FF2B5EF4-FFF2-40B4-BE49-F238E27FC236}">
-                <a16:creationId xmlns:a16="http://schemas.microsoft.com/office/drawing/2014/main" xmlns="" id="{76990AF8-2E77-4B37-B0CA-2B7395D82A9D}"/>
+                <a16:creationId xmlns:a16="http://schemas.microsoft.com/office/drawing/2014/main" id="{76990AF8-2E77-4B37-B0CA-2B7395D82A9D}"/>
               </a:ext>
             </a:extLst>
           </p:cNvPr>
@@ -11796,7 +11757,7 @@
           <p:cNvPr id="24" name="Gerade Verbindung mit Pfeil 23">
             <a:extLst>
               <a:ext uri="{FF2B5EF4-FFF2-40B4-BE49-F238E27FC236}">
-                <a16:creationId xmlns:a16="http://schemas.microsoft.com/office/drawing/2014/main" xmlns="" id="{C22EE68F-968D-4481-82EF-73BE7DEFA2A4}"/>
+                <a16:creationId xmlns:a16="http://schemas.microsoft.com/office/drawing/2014/main" id="{C22EE68F-968D-4481-82EF-73BE7DEFA2A4}"/>
               </a:ext>
             </a:extLst>
           </p:cNvPr>
@@ -11840,7 +11801,7 @@
           <p:cNvPr id="27" name="Gerade Verbindung mit Pfeil 26">
             <a:extLst>
               <a:ext uri="{FF2B5EF4-FFF2-40B4-BE49-F238E27FC236}">
-                <a16:creationId xmlns:a16="http://schemas.microsoft.com/office/drawing/2014/main" xmlns="" id="{B74F0518-0D5B-4835-9FE0-6C05FA3E9AD5}"/>
+                <a16:creationId xmlns:a16="http://schemas.microsoft.com/office/drawing/2014/main" id="{B74F0518-0D5B-4835-9FE0-6C05FA3E9AD5}"/>
               </a:ext>
             </a:extLst>
           </p:cNvPr>
@@ -11884,7 +11845,7 @@
           <p:cNvPr id="30" name="Gerade Verbindung mit Pfeil 29">
             <a:extLst>
               <a:ext uri="{FF2B5EF4-FFF2-40B4-BE49-F238E27FC236}">
-                <a16:creationId xmlns:a16="http://schemas.microsoft.com/office/drawing/2014/main" xmlns="" id="{DB4807CA-CE35-4073-8BB7-645ECE5E9BC3}"/>
+                <a16:creationId xmlns:a16="http://schemas.microsoft.com/office/drawing/2014/main" id="{DB4807CA-CE35-4073-8BB7-645ECE5E9BC3}"/>
               </a:ext>
             </a:extLst>
           </p:cNvPr>
@@ -11928,7 +11889,7 @@
           <p:cNvPr id="33" name="Gerade Verbindung mit Pfeil 32">
             <a:extLst>
               <a:ext uri="{FF2B5EF4-FFF2-40B4-BE49-F238E27FC236}">
-                <a16:creationId xmlns:a16="http://schemas.microsoft.com/office/drawing/2014/main" xmlns="" id="{C6DC9FE2-BD85-40A7-85CD-FAFADF0446F8}"/>
+                <a16:creationId xmlns:a16="http://schemas.microsoft.com/office/drawing/2014/main" id="{C6DC9FE2-BD85-40A7-85CD-FAFADF0446F8}"/>
               </a:ext>
             </a:extLst>
           </p:cNvPr>
@@ -11972,7 +11933,7 @@
           <p:cNvPr id="36" name="Textfeld 35">
             <a:extLst>
               <a:ext uri="{FF2B5EF4-FFF2-40B4-BE49-F238E27FC236}">
-                <a16:creationId xmlns:a16="http://schemas.microsoft.com/office/drawing/2014/main" xmlns="" id="{7DA9A3AE-402A-4836-8EA9-5CF57E1B1A96}"/>
+                <a16:creationId xmlns:a16="http://schemas.microsoft.com/office/drawing/2014/main" id="{7DA9A3AE-402A-4836-8EA9-5CF57E1B1A96}"/>
               </a:ext>
             </a:extLst>
           </p:cNvPr>
@@ -12007,7 +11968,7 @@
           <p:cNvPr id="37" name="Textfeld 36">
             <a:extLst>
               <a:ext uri="{FF2B5EF4-FFF2-40B4-BE49-F238E27FC236}">
-                <a16:creationId xmlns:a16="http://schemas.microsoft.com/office/drawing/2014/main" xmlns="" id="{0570975D-06BD-4403-A5D8-90D29EE44D90}"/>
+                <a16:creationId xmlns:a16="http://schemas.microsoft.com/office/drawing/2014/main" id="{0570975D-06BD-4403-A5D8-90D29EE44D90}"/>
               </a:ext>
             </a:extLst>
           </p:cNvPr>
@@ -12042,7 +12003,7 @@
           <p:cNvPr id="38" name="Textfeld 37">
             <a:extLst>
               <a:ext uri="{FF2B5EF4-FFF2-40B4-BE49-F238E27FC236}">
-                <a16:creationId xmlns:a16="http://schemas.microsoft.com/office/drawing/2014/main" xmlns="" id="{03CDC848-6357-4E1B-A3E8-49F619B9F93C}"/>
+                <a16:creationId xmlns:a16="http://schemas.microsoft.com/office/drawing/2014/main" id="{03CDC848-6357-4E1B-A3E8-49F619B9F93C}"/>
               </a:ext>
             </a:extLst>
           </p:cNvPr>
@@ -12077,7 +12038,7 @@
           <p:cNvPr id="39" name="Textfeld 38">
             <a:extLst>
               <a:ext uri="{FF2B5EF4-FFF2-40B4-BE49-F238E27FC236}">
-                <a16:creationId xmlns:a16="http://schemas.microsoft.com/office/drawing/2014/main" xmlns="" id="{85DE17B8-CA60-4EC9-A6AC-AC080DDE1281}"/>
+                <a16:creationId xmlns:a16="http://schemas.microsoft.com/office/drawing/2014/main" id="{85DE17B8-CA60-4EC9-A6AC-AC080DDE1281}"/>
               </a:ext>
             </a:extLst>
           </p:cNvPr>
@@ -12112,7 +12073,7 @@
           <p:cNvPr id="40" name="Textfeld 39">
             <a:extLst>
               <a:ext uri="{FF2B5EF4-FFF2-40B4-BE49-F238E27FC236}">
-                <a16:creationId xmlns:a16="http://schemas.microsoft.com/office/drawing/2014/main" xmlns="" id="{B5FC16D5-842E-4352-8D37-4752AC951703}"/>
+                <a16:creationId xmlns:a16="http://schemas.microsoft.com/office/drawing/2014/main" id="{B5FC16D5-842E-4352-8D37-4752AC951703}"/>
               </a:ext>
             </a:extLst>
           </p:cNvPr>
@@ -12147,7 +12108,7 @@
           <p:cNvPr id="41" name="Textfeld 40">
             <a:extLst>
               <a:ext uri="{FF2B5EF4-FFF2-40B4-BE49-F238E27FC236}">
-                <a16:creationId xmlns:a16="http://schemas.microsoft.com/office/drawing/2014/main" xmlns="" id="{3B7CF91D-ADC1-4182-9EEA-97DAF86D5624}"/>
+                <a16:creationId xmlns:a16="http://schemas.microsoft.com/office/drawing/2014/main" id="{3B7CF91D-ADC1-4182-9EEA-97DAF86D5624}"/>
               </a:ext>
             </a:extLst>
           </p:cNvPr>
@@ -12182,7 +12143,7 @@
           <p:cNvPr id="42" name="Textfeld 41">
             <a:extLst>
               <a:ext uri="{FF2B5EF4-FFF2-40B4-BE49-F238E27FC236}">
-                <a16:creationId xmlns:a16="http://schemas.microsoft.com/office/drawing/2014/main" xmlns="" id="{1C500370-3E59-476C-9411-543770E261D6}"/>
+                <a16:creationId xmlns:a16="http://schemas.microsoft.com/office/drawing/2014/main" id="{1C500370-3E59-476C-9411-543770E261D6}"/>
               </a:ext>
             </a:extLst>
           </p:cNvPr>
@@ -12217,7 +12178,7 @@
           <p:cNvPr id="43" name="Textfeld 42">
             <a:extLst>
               <a:ext uri="{FF2B5EF4-FFF2-40B4-BE49-F238E27FC236}">
-                <a16:creationId xmlns:a16="http://schemas.microsoft.com/office/drawing/2014/main" xmlns="" id="{BD6B08D4-7E4A-4309-9848-A7A423DE4529}"/>
+                <a16:creationId xmlns:a16="http://schemas.microsoft.com/office/drawing/2014/main" id="{BD6B08D4-7E4A-4309-9848-A7A423DE4529}"/>
               </a:ext>
             </a:extLst>
           </p:cNvPr>
@@ -12252,7 +12213,7 @@
           <p:cNvPr id="44" name="Textfeld 43">
             <a:extLst>
               <a:ext uri="{FF2B5EF4-FFF2-40B4-BE49-F238E27FC236}">
-                <a16:creationId xmlns:a16="http://schemas.microsoft.com/office/drawing/2014/main" xmlns="" id="{56F7D731-EFF7-4318-A1BB-4C228AD80E10}"/>
+                <a16:creationId xmlns:a16="http://schemas.microsoft.com/office/drawing/2014/main" id="{56F7D731-EFF7-4318-A1BB-4C228AD80E10}"/>
               </a:ext>
             </a:extLst>
           </p:cNvPr>
@@ -12287,7 +12248,7 @@
           <p:cNvPr id="45" name="Textfeld 44">
             <a:extLst>
               <a:ext uri="{FF2B5EF4-FFF2-40B4-BE49-F238E27FC236}">
-                <a16:creationId xmlns:a16="http://schemas.microsoft.com/office/drawing/2014/main" xmlns="" id="{78161AAE-EBF4-458C-AF63-F56DE7E40683}"/>
+                <a16:creationId xmlns:a16="http://schemas.microsoft.com/office/drawing/2014/main" id="{78161AAE-EBF4-458C-AF63-F56DE7E40683}"/>
               </a:ext>
             </a:extLst>
           </p:cNvPr>
@@ -12322,7 +12283,7 @@
           <p:cNvPr id="46" name="Foliennummernplatzhalter 45">
             <a:extLst>
               <a:ext uri="{FF2B5EF4-FFF2-40B4-BE49-F238E27FC236}">
-                <a16:creationId xmlns:a16="http://schemas.microsoft.com/office/drawing/2014/main" xmlns="" id="{C8736086-FF43-4F11-B163-935F1CA54CB9}"/>
+                <a16:creationId xmlns:a16="http://schemas.microsoft.com/office/drawing/2014/main" id="{C8736086-FF43-4F11-B163-935F1CA54CB9}"/>
               </a:ext>
             </a:extLst>
           </p:cNvPr>
@@ -12381,7 +12342,7 @@
           <p:cNvPr id="2" name="Titel 1">
             <a:extLst>
               <a:ext uri="{FF2B5EF4-FFF2-40B4-BE49-F238E27FC236}">
-                <a16:creationId xmlns:a16="http://schemas.microsoft.com/office/drawing/2014/main" xmlns="" id="{BC5612AC-6411-4142-AED7-C162557AFFAD}"/>
+                <a16:creationId xmlns:a16="http://schemas.microsoft.com/office/drawing/2014/main" id="{BC5612AC-6411-4142-AED7-C162557AFFAD}"/>
               </a:ext>
             </a:extLst>
           </p:cNvPr>
@@ -12410,7 +12371,7 @@
           <p:cNvPr id="3" name="Inhaltsplatzhalter 2">
             <a:extLst>
               <a:ext uri="{FF2B5EF4-FFF2-40B4-BE49-F238E27FC236}">
-                <a16:creationId xmlns:a16="http://schemas.microsoft.com/office/drawing/2014/main" xmlns="" id="{50710A65-BC45-4F3B-ABA3-CBBBFBBA6513}"/>
+                <a16:creationId xmlns:a16="http://schemas.microsoft.com/office/drawing/2014/main" id="{50710A65-BC45-4F3B-ABA3-CBBBFBBA6513}"/>
               </a:ext>
             </a:extLst>
           </p:cNvPr>
@@ -12427,34 +12388,28 @@
           <a:lstStyle/>
           <a:p>
             <a:r>
-              <a:rPr lang="de-DE" dirty="0" smtClean="0"/>
-              <a:t>Spieltheoretische Ma</a:t>
-            </a:r>
-            <a:r>
-              <a:rPr lang="de-DE" dirty="0" smtClean="0"/>
-              <a:t>ßnahmen praktisch für Eingebettete Systeme</a:t>
+              <a:rPr lang="de-DE" dirty="0"/>
+              <a:t>Spieltheoretische Maßnahmen praktisch für Eingebettete Systeme</a:t>
             </a:r>
           </a:p>
           <a:p>
             <a:pPr lvl="1"/>
             <a:r>
-              <a:rPr lang="de-DE" dirty="0" smtClean="0"/>
+              <a:rPr lang="de-DE" dirty="0"/>
               <a:t>Effiziente Berechnung, da alle Szenarien offline im Speicher liegen</a:t>
             </a:r>
-            <a:endParaRPr lang="de-DE" dirty="0"/>
-          </a:p>
-          <a:p>
-            <a:r>
-              <a:rPr lang="de-DE" dirty="0" smtClean="0"/>
+          </a:p>
+          <a:p>
+            <a:r>
+              <a:rPr lang="de-DE" dirty="0"/>
               <a:t>Graphen werden ab ~6x6 sehr groß</a:t>
             </a:r>
           </a:p>
           <a:p>
             <a:r>
-              <a:rPr lang="de-DE" dirty="0" smtClean="0"/>
+              <a:rPr lang="de-DE" dirty="0"/>
               <a:t>Demo.</a:t>
             </a:r>
-            <a:endParaRPr lang="de-DE" dirty="0"/>
           </a:p>
         </p:txBody>
       </p:sp>
@@ -12463,7 +12418,7 @@
           <p:cNvPr id="4" name="Foliennummernplatzhalter 3">
             <a:extLst>
               <a:ext uri="{FF2B5EF4-FFF2-40B4-BE49-F238E27FC236}">
-                <a16:creationId xmlns:a16="http://schemas.microsoft.com/office/drawing/2014/main" xmlns="" id="{19788284-BBE6-4885-96DA-A705A3D1CEE9}"/>
+                <a16:creationId xmlns:a16="http://schemas.microsoft.com/office/drawing/2014/main" id="{19788284-BBE6-4885-96DA-A705A3D1CEE9}"/>
               </a:ext>
             </a:extLst>
           </p:cNvPr>
@@ -12522,7 +12477,7 @@
           <p:cNvPr id="2" name="Titel 1">
             <a:extLst>
               <a:ext uri="{FF2B5EF4-FFF2-40B4-BE49-F238E27FC236}">
-                <a16:creationId xmlns:a16="http://schemas.microsoft.com/office/drawing/2014/main" xmlns="" id="{26825D3A-6CEE-4F9F-81E5-3E804EAA612A}"/>
+                <a16:creationId xmlns:a16="http://schemas.microsoft.com/office/drawing/2014/main" id="{26825D3A-6CEE-4F9F-81E5-3E804EAA612A}"/>
               </a:ext>
             </a:extLst>
           </p:cNvPr>
@@ -12551,7 +12506,7 @@
           <p:cNvPr id="3" name="Inhaltsplatzhalter 2">
             <a:extLst>
               <a:ext uri="{FF2B5EF4-FFF2-40B4-BE49-F238E27FC236}">
-                <a16:creationId xmlns:a16="http://schemas.microsoft.com/office/drawing/2014/main" xmlns="" id="{B8B215CE-79DD-4E8A-9F51-760A69740D50}"/>
+                <a16:creationId xmlns:a16="http://schemas.microsoft.com/office/drawing/2014/main" id="{B8B215CE-79DD-4E8A-9F51-760A69740D50}"/>
               </a:ext>
             </a:extLst>
           </p:cNvPr>
@@ -12638,7 +12593,7 @@
           <p:cNvPr id="4" name="Foliennummernplatzhalter 3">
             <a:extLst>
               <a:ext uri="{FF2B5EF4-FFF2-40B4-BE49-F238E27FC236}">
-                <a16:creationId xmlns:a16="http://schemas.microsoft.com/office/drawing/2014/main" xmlns="" id="{93BF2E14-94DF-403B-969C-E3660F2321D1}"/>
+                <a16:creationId xmlns:a16="http://schemas.microsoft.com/office/drawing/2014/main" id="{93BF2E14-94DF-403B-969C-E3660F2321D1}"/>
               </a:ext>
             </a:extLst>
           </p:cNvPr>
@@ -12697,7 +12652,7 @@
           <p:cNvPr id="2" name="Titel 1">
             <a:extLst>
               <a:ext uri="{FF2B5EF4-FFF2-40B4-BE49-F238E27FC236}">
-                <a16:creationId xmlns:a16="http://schemas.microsoft.com/office/drawing/2014/main" xmlns="" id="{A1F365B5-A939-445F-958E-D0579E7008B7}"/>
+                <a16:creationId xmlns:a16="http://schemas.microsoft.com/office/drawing/2014/main" id="{A1F365B5-A939-445F-958E-D0579E7008B7}"/>
               </a:ext>
             </a:extLst>
           </p:cNvPr>
@@ -12726,7 +12681,7 @@
           <p:cNvPr id="3" name="Inhaltsplatzhalter 2">
             <a:extLst>
               <a:ext uri="{FF2B5EF4-FFF2-40B4-BE49-F238E27FC236}">
-                <a16:creationId xmlns:a16="http://schemas.microsoft.com/office/drawing/2014/main" xmlns="" id="{4664686B-E363-454D-ABAA-3DB2FB5F692D}"/>
+                <a16:creationId xmlns:a16="http://schemas.microsoft.com/office/drawing/2014/main" id="{4664686B-E363-454D-ABAA-3DB2FB5F692D}"/>
               </a:ext>
             </a:extLst>
           </p:cNvPr>
@@ -12789,7 +12744,7 @@
           <p:cNvPr id="4" name="Foliennummernplatzhalter 3">
             <a:extLst>
               <a:ext uri="{FF2B5EF4-FFF2-40B4-BE49-F238E27FC236}">
-                <a16:creationId xmlns:a16="http://schemas.microsoft.com/office/drawing/2014/main" xmlns="" id="{5264A6CD-BC9E-4F42-BBFA-4192D47D444D}"/>
+                <a16:creationId xmlns:a16="http://schemas.microsoft.com/office/drawing/2014/main" id="{5264A6CD-BC9E-4F42-BBFA-4192D47D444D}"/>
               </a:ext>
             </a:extLst>
           </p:cNvPr>
@@ -12848,7 +12803,7 @@
           <p:cNvPr id="2" name="Titel 1">
             <a:extLst>
               <a:ext uri="{FF2B5EF4-FFF2-40B4-BE49-F238E27FC236}">
-                <a16:creationId xmlns:a16="http://schemas.microsoft.com/office/drawing/2014/main" xmlns="" id="{D830302C-DA89-453C-9E9D-624506AE6BA3}"/>
+                <a16:creationId xmlns:a16="http://schemas.microsoft.com/office/drawing/2014/main" id="{D830302C-DA89-453C-9E9D-624506AE6BA3}"/>
               </a:ext>
             </a:extLst>
           </p:cNvPr>
@@ -12877,7 +12832,7 @@
           <p:cNvPr id="3" name="Inhaltsplatzhalter 2">
             <a:extLst>
               <a:ext uri="{FF2B5EF4-FFF2-40B4-BE49-F238E27FC236}">
-                <a16:creationId xmlns:a16="http://schemas.microsoft.com/office/drawing/2014/main" xmlns="" id="{A3E9EB45-91E9-45FF-B312-A8E7636840FB}"/>
+                <a16:creationId xmlns:a16="http://schemas.microsoft.com/office/drawing/2014/main" id="{A3E9EB45-91E9-45FF-B312-A8E7636840FB}"/>
               </a:ext>
             </a:extLst>
           </p:cNvPr>
@@ -12901,22 +12856,18 @@
           <a:p>
             <a:r>
               <a:rPr lang="de-DE" dirty="0"/>
-              <a:t>Roboter und Kind Bewegungsmuster Beispiel Tafel oder Backup </a:t>
-            </a:r>
-            <a:r>
-              <a:rPr lang="de-DE" dirty="0" smtClean="0"/>
-              <a:t>Folie</a:t>
-            </a:r>
-          </a:p>
-          <a:p>
-            <a:r>
-              <a:rPr lang="de-DE" dirty="0" smtClean="0"/>
+              <a:t>Roboter und Kind Bewegungsmuster Beispiel Tafel oder Backup Folie</a:t>
+            </a:r>
+          </a:p>
+          <a:p>
+            <a:r>
+              <a:rPr lang="de-DE" dirty="0"/>
               <a:t>Roboter fängt an</a:t>
             </a:r>
           </a:p>
           <a:p>
             <a:r>
-              <a:rPr lang="de-DE" dirty="0" smtClean="0"/>
+              <a:rPr lang="de-DE" dirty="0"/>
               <a:t>In Bild: Kind am Zug.</a:t>
             </a:r>
           </a:p>
@@ -12927,7 +12878,7 @@
           <p:cNvPr id="4" name="Foliennummernplatzhalter 3">
             <a:extLst>
               <a:ext uri="{FF2B5EF4-FFF2-40B4-BE49-F238E27FC236}">
-                <a16:creationId xmlns:a16="http://schemas.microsoft.com/office/drawing/2014/main" xmlns="" id="{6318C5D9-92EB-47E6-BBFE-6FA653933C38}"/>
+                <a16:creationId xmlns:a16="http://schemas.microsoft.com/office/drawing/2014/main" id="{6318C5D9-92EB-47E6-BBFE-6FA653933C38}"/>
               </a:ext>
             </a:extLst>
           </p:cNvPr>
@@ -12961,14 +12912,6 @@
   <p:clrMapOvr>
     <a:masterClrMapping/>
   </p:clrMapOvr>
-  <mc:AlternateContent xmlns:mc="http://schemas.openxmlformats.org/markup-compatibility/2006">
-    <mc:Choice xmlns:p14="http://schemas.microsoft.com/office/powerpoint/2010/main" Requires="p14">
-      <p:transition spd="slow" p14:dur="2000"/>
-    </mc:Choice>
-    <mc:Fallback>
-      <p:transition xmlns:p14="http://schemas.microsoft.com/office/powerpoint/2010/main" spd="slow"/>
-    </mc:Fallback>
-  </mc:AlternateContent>
 </p:sld>
 </file>
 
@@ -13006,10 +12949,9 @@
           <a:p>
             <a:pPr algn="ctr"/>
             <a:r>
-              <a:rPr lang="de-DE" dirty="0" smtClean="0"/>
+              <a:rPr lang="de-DE" dirty="0"/>
               <a:t>Spielfeld</a:t>
             </a:r>
-            <a:endParaRPr lang="de-DE" dirty="0"/>
           </a:p>
         </p:txBody>
       </p:sp>
@@ -13084,10 +13026,9 @@
           <a:lstStyle/>
           <a:p>
             <a:r>
-              <a:rPr lang="de-DE" sz="1100" dirty="0" smtClean="0"/>
+              <a:rPr lang="de-DE" sz="1100" dirty="0"/>
               <a:t>Bildquelle: Aufgabenstellung</a:t>
             </a:r>
-            <a:endParaRPr lang="de-DE" sz="1100" dirty="0"/>
           </a:p>
         </p:txBody>
       </p:sp>
@@ -13126,7 +13067,7 @@
           <p:cNvPr id="2" name="Title 1">
             <a:extLst>
               <a:ext uri="{FF2B5EF4-FFF2-40B4-BE49-F238E27FC236}">
-                <a16:creationId xmlns:a16="http://schemas.microsoft.com/office/drawing/2014/main" xmlns="" id="{EC71ED69-ECE5-4FEA-BAAC-2D3FD4AEF4CF}"/>
+                <a16:creationId xmlns:a16="http://schemas.microsoft.com/office/drawing/2014/main" id="{EC71ED69-ECE5-4FEA-BAAC-2D3FD4AEF4CF}"/>
               </a:ext>
             </a:extLst>
           </p:cNvPr>
@@ -13144,10 +13085,9 @@
           <a:p>
             <a:pPr algn="ctr"/>
             <a:r>
-              <a:rPr lang="de-DE" dirty="0" smtClean="0"/>
+              <a:rPr lang="de-DE" dirty="0"/>
               <a:t>Batterie</a:t>
             </a:r>
-            <a:endParaRPr lang="de-DE" dirty="0"/>
           </a:p>
         </p:txBody>
       </p:sp>
@@ -13156,7 +13096,7 @@
           <p:cNvPr id="5" name="Content Placeholder 4">
             <a:extLst>
               <a:ext uri="{FF2B5EF4-FFF2-40B4-BE49-F238E27FC236}">
-                <a16:creationId xmlns:a16="http://schemas.microsoft.com/office/drawing/2014/main" xmlns="" id="{556F42A2-DCA4-4B1C-A056-51A3547A9BE0}"/>
+                <a16:creationId xmlns:a16="http://schemas.microsoft.com/office/drawing/2014/main" id="{556F42A2-DCA4-4B1C-A056-51A3547A9BE0}"/>
               </a:ext>
             </a:extLst>
           </p:cNvPr>
@@ -13186,56 +13126,56 @@
                 <a:gridCol w="563946">
                   <a:extLst>
                     <a:ext uri="{9D8B030D-6E8A-4147-A177-3AD203B41FA5}">
-                      <a16:colId xmlns:a16="http://schemas.microsoft.com/office/drawing/2014/main" xmlns="" val="3909669187"/>
+                      <a16:colId xmlns:a16="http://schemas.microsoft.com/office/drawing/2014/main" val="3909669187"/>
                     </a:ext>
                   </a:extLst>
                 </a:gridCol>
                 <a:gridCol w="563946">
                   <a:extLst>
                     <a:ext uri="{9D8B030D-6E8A-4147-A177-3AD203B41FA5}">
-                      <a16:colId xmlns:a16="http://schemas.microsoft.com/office/drawing/2014/main" xmlns="" val="2081033052"/>
+                      <a16:colId xmlns:a16="http://schemas.microsoft.com/office/drawing/2014/main" val="2081033052"/>
                     </a:ext>
                   </a:extLst>
                 </a:gridCol>
                 <a:gridCol w="563946">
                   <a:extLst>
                     <a:ext uri="{9D8B030D-6E8A-4147-A177-3AD203B41FA5}">
-                      <a16:colId xmlns:a16="http://schemas.microsoft.com/office/drawing/2014/main" xmlns="" val="2759415750"/>
+                      <a16:colId xmlns:a16="http://schemas.microsoft.com/office/drawing/2014/main" val="2759415750"/>
                     </a:ext>
                   </a:extLst>
                 </a:gridCol>
                 <a:gridCol w="563946">
                   <a:extLst>
                     <a:ext uri="{9D8B030D-6E8A-4147-A177-3AD203B41FA5}">
-                      <a16:colId xmlns:a16="http://schemas.microsoft.com/office/drawing/2014/main" xmlns="" val="1013666482"/>
+                      <a16:colId xmlns:a16="http://schemas.microsoft.com/office/drawing/2014/main" val="1013666482"/>
                     </a:ext>
                   </a:extLst>
                 </a:gridCol>
                 <a:gridCol w="563946">
                   <a:extLst>
                     <a:ext uri="{9D8B030D-6E8A-4147-A177-3AD203B41FA5}">
-                      <a16:colId xmlns:a16="http://schemas.microsoft.com/office/drawing/2014/main" xmlns="" val="4052377547"/>
+                      <a16:colId xmlns:a16="http://schemas.microsoft.com/office/drawing/2014/main" val="4052377547"/>
                     </a:ext>
                   </a:extLst>
                 </a:gridCol>
                 <a:gridCol w="563946">
                   <a:extLst>
                     <a:ext uri="{9D8B030D-6E8A-4147-A177-3AD203B41FA5}">
-                      <a16:colId xmlns:a16="http://schemas.microsoft.com/office/drawing/2014/main" xmlns="" val="86987426"/>
+                      <a16:colId xmlns:a16="http://schemas.microsoft.com/office/drawing/2014/main" val="86987426"/>
                     </a:ext>
                   </a:extLst>
                 </a:gridCol>
                 <a:gridCol w="563946">
                   <a:extLst>
                     <a:ext uri="{9D8B030D-6E8A-4147-A177-3AD203B41FA5}">
-                      <a16:colId xmlns:a16="http://schemas.microsoft.com/office/drawing/2014/main" xmlns="" val="4112314039"/>
+                      <a16:colId xmlns:a16="http://schemas.microsoft.com/office/drawing/2014/main" val="4112314039"/>
                     </a:ext>
                   </a:extLst>
                 </a:gridCol>
                 <a:gridCol w="563946">
                   <a:extLst>
                     <a:ext uri="{9D8B030D-6E8A-4147-A177-3AD203B41FA5}">
-                      <a16:colId xmlns:a16="http://schemas.microsoft.com/office/drawing/2014/main" xmlns="" val="2352200665"/>
+                      <a16:colId xmlns:a16="http://schemas.microsoft.com/office/drawing/2014/main" val="2352200665"/>
                     </a:ext>
                   </a:extLst>
                 </a:gridCol>
@@ -13323,7 +13263,7 @@
                 </a:tc>
                 <a:extLst>
                   <a:ext uri="{0D108BD9-81ED-4DB2-BD59-A6C34878D82A}">
-                    <a16:rowId xmlns:a16="http://schemas.microsoft.com/office/drawing/2014/main" xmlns="" val="3901103587"/>
+                    <a16:rowId xmlns:a16="http://schemas.microsoft.com/office/drawing/2014/main" val="3901103587"/>
                   </a:ext>
                 </a:extLst>
               </a:tr>
@@ -13410,7 +13350,7 @@
                 </a:tc>
                 <a:extLst>
                   <a:ext uri="{0D108BD9-81ED-4DB2-BD59-A6C34878D82A}">
-                    <a16:rowId xmlns:a16="http://schemas.microsoft.com/office/drawing/2014/main" xmlns="" val="810655840"/>
+                    <a16:rowId xmlns:a16="http://schemas.microsoft.com/office/drawing/2014/main" val="810655840"/>
                   </a:ext>
                 </a:extLst>
               </a:tr>
@@ -13497,7 +13437,7 @@
                 </a:tc>
                 <a:extLst>
                   <a:ext uri="{0D108BD9-81ED-4DB2-BD59-A6C34878D82A}">
-                    <a16:rowId xmlns:a16="http://schemas.microsoft.com/office/drawing/2014/main" xmlns="" val="2107368300"/>
+                    <a16:rowId xmlns:a16="http://schemas.microsoft.com/office/drawing/2014/main" val="2107368300"/>
                   </a:ext>
                 </a:extLst>
               </a:tr>
@@ -13584,7 +13524,7 @@
                 </a:tc>
                 <a:extLst>
                   <a:ext uri="{0D108BD9-81ED-4DB2-BD59-A6C34878D82A}">
-                    <a16:rowId xmlns:a16="http://schemas.microsoft.com/office/drawing/2014/main" xmlns="" val="1259991857"/>
+                    <a16:rowId xmlns:a16="http://schemas.microsoft.com/office/drawing/2014/main" val="1259991857"/>
                   </a:ext>
                 </a:extLst>
               </a:tr>
@@ -13683,7 +13623,7 @@
                 </a:tc>
                 <a:extLst>
                   <a:ext uri="{0D108BD9-81ED-4DB2-BD59-A6C34878D82A}">
-                    <a16:rowId xmlns:a16="http://schemas.microsoft.com/office/drawing/2014/main" xmlns="" val="1705778076"/>
+                    <a16:rowId xmlns:a16="http://schemas.microsoft.com/office/drawing/2014/main" val="1705778076"/>
                   </a:ext>
                 </a:extLst>
               </a:tr>
@@ -13782,7 +13722,7 @@
                 </a:tc>
                 <a:extLst>
                   <a:ext uri="{0D108BD9-81ED-4DB2-BD59-A6C34878D82A}">
-                    <a16:rowId xmlns:a16="http://schemas.microsoft.com/office/drawing/2014/main" xmlns="" val="3593844036"/>
+                    <a16:rowId xmlns:a16="http://schemas.microsoft.com/office/drawing/2014/main" val="3593844036"/>
                   </a:ext>
                 </a:extLst>
               </a:tr>
@@ -13881,7 +13821,7 @@
                 </a:tc>
                 <a:extLst>
                   <a:ext uri="{0D108BD9-81ED-4DB2-BD59-A6C34878D82A}">
-                    <a16:rowId xmlns:a16="http://schemas.microsoft.com/office/drawing/2014/main" xmlns="" val="2725860628"/>
+                    <a16:rowId xmlns:a16="http://schemas.microsoft.com/office/drawing/2014/main" val="2725860628"/>
                   </a:ext>
                 </a:extLst>
               </a:tr>
@@ -13968,7 +13908,7 @@
                 </a:tc>
                 <a:extLst>
                   <a:ext uri="{0D108BD9-81ED-4DB2-BD59-A6C34878D82A}">
-                    <a16:rowId xmlns:a16="http://schemas.microsoft.com/office/drawing/2014/main" xmlns="" val="3598242446"/>
+                    <a16:rowId xmlns:a16="http://schemas.microsoft.com/office/drawing/2014/main" val="3598242446"/>
                   </a:ext>
                 </a:extLst>
               </a:tr>
@@ -13981,7 +13921,7 @@
           <p:cNvPr id="4" name="Slide Number Placeholder 3">
             <a:extLst>
               <a:ext uri="{FF2B5EF4-FFF2-40B4-BE49-F238E27FC236}">
-                <a16:creationId xmlns:a16="http://schemas.microsoft.com/office/drawing/2014/main" xmlns="" id="{97D82D7D-618B-4FC6-9B8D-AF076B248E3B}"/>
+                <a16:creationId xmlns:a16="http://schemas.microsoft.com/office/drawing/2014/main" id="{97D82D7D-618B-4FC6-9B8D-AF076B248E3B}"/>
               </a:ext>
             </a:extLst>
           </p:cNvPr>
@@ -14010,7 +13950,7 @@
           <p:cNvPr id="6" name="Multiplication Sign 5">
             <a:extLst>
               <a:ext uri="{FF2B5EF4-FFF2-40B4-BE49-F238E27FC236}">
-                <a16:creationId xmlns:a16="http://schemas.microsoft.com/office/drawing/2014/main" xmlns="" id="{38108A66-6254-422A-831E-1095BB8DE301}"/>
+                <a16:creationId xmlns:a16="http://schemas.microsoft.com/office/drawing/2014/main" id="{38108A66-6254-422A-831E-1095BB8DE301}"/>
               </a:ext>
             </a:extLst>
           </p:cNvPr>
@@ -14064,7 +14004,7 @@
           <p:cNvPr id="12" name="Lightning Bolt 11">
             <a:extLst>
               <a:ext uri="{FF2B5EF4-FFF2-40B4-BE49-F238E27FC236}">
-                <a16:creationId xmlns:a16="http://schemas.microsoft.com/office/drawing/2014/main" xmlns="" id="{5DDA1150-7AEA-4056-B6EE-1F4F6C5D505E}"/>
+                <a16:creationId xmlns:a16="http://schemas.microsoft.com/office/drawing/2014/main" id="{5DDA1150-7AEA-4056-B6EE-1F4F6C5D505E}"/>
               </a:ext>
             </a:extLst>
           </p:cNvPr>
@@ -14140,7 +14080,7 @@
           <p:cNvPr id="2" name="Title 1">
             <a:extLst>
               <a:ext uri="{FF2B5EF4-FFF2-40B4-BE49-F238E27FC236}">
-                <a16:creationId xmlns:a16="http://schemas.microsoft.com/office/drawing/2014/main" xmlns="" id="{EC71ED69-ECE5-4FEA-BAAC-2D3FD4AEF4CF}"/>
+                <a16:creationId xmlns:a16="http://schemas.microsoft.com/office/drawing/2014/main" id="{EC71ED69-ECE5-4FEA-BAAC-2D3FD4AEF4CF}"/>
               </a:ext>
             </a:extLst>
           </p:cNvPr>
@@ -14158,10 +14098,9 @@
           <a:p>
             <a:pPr algn="ctr"/>
             <a:r>
-              <a:rPr lang="de-DE" dirty="0" smtClean="0"/>
+              <a:rPr lang="de-DE" dirty="0"/>
               <a:t>Bewegungsmuster</a:t>
             </a:r>
-            <a:endParaRPr lang="de-DE" dirty="0"/>
           </a:p>
         </p:txBody>
       </p:sp>
@@ -14170,7 +14109,7 @@
           <p:cNvPr id="5" name="Content Placeholder 4">
             <a:extLst>
               <a:ext uri="{FF2B5EF4-FFF2-40B4-BE49-F238E27FC236}">
-                <a16:creationId xmlns:a16="http://schemas.microsoft.com/office/drawing/2014/main" xmlns="" id="{556F42A2-DCA4-4B1C-A056-51A3547A9BE0}"/>
+                <a16:creationId xmlns:a16="http://schemas.microsoft.com/office/drawing/2014/main" id="{556F42A2-DCA4-4B1C-A056-51A3547A9BE0}"/>
               </a:ext>
             </a:extLst>
           </p:cNvPr>
@@ -14195,56 +14134,56 @@
                 <a:gridCol w="563946">
                   <a:extLst>
                     <a:ext uri="{9D8B030D-6E8A-4147-A177-3AD203B41FA5}">
-                      <a16:colId xmlns:a16="http://schemas.microsoft.com/office/drawing/2014/main" xmlns="" val="3909669187"/>
+                      <a16:colId xmlns:a16="http://schemas.microsoft.com/office/drawing/2014/main" val="3909669187"/>
                     </a:ext>
                   </a:extLst>
                 </a:gridCol>
                 <a:gridCol w="563946">
                   <a:extLst>
                     <a:ext uri="{9D8B030D-6E8A-4147-A177-3AD203B41FA5}">
-                      <a16:colId xmlns:a16="http://schemas.microsoft.com/office/drawing/2014/main" xmlns="" val="2081033052"/>
+                      <a16:colId xmlns:a16="http://schemas.microsoft.com/office/drawing/2014/main" val="2081033052"/>
                     </a:ext>
                   </a:extLst>
                 </a:gridCol>
                 <a:gridCol w="563946">
                   <a:extLst>
                     <a:ext uri="{9D8B030D-6E8A-4147-A177-3AD203B41FA5}">
-                      <a16:colId xmlns:a16="http://schemas.microsoft.com/office/drawing/2014/main" xmlns="" val="2759415750"/>
+                      <a16:colId xmlns:a16="http://schemas.microsoft.com/office/drawing/2014/main" val="2759415750"/>
                     </a:ext>
                   </a:extLst>
                 </a:gridCol>
                 <a:gridCol w="563946">
                   <a:extLst>
                     <a:ext uri="{9D8B030D-6E8A-4147-A177-3AD203B41FA5}">
-                      <a16:colId xmlns:a16="http://schemas.microsoft.com/office/drawing/2014/main" xmlns="" val="1013666482"/>
+                      <a16:colId xmlns:a16="http://schemas.microsoft.com/office/drawing/2014/main" val="1013666482"/>
                     </a:ext>
                   </a:extLst>
                 </a:gridCol>
                 <a:gridCol w="563946">
                   <a:extLst>
                     <a:ext uri="{9D8B030D-6E8A-4147-A177-3AD203B41FA5}">
-                      <a16:colId xmlns:a16="http://schemas.microsoft.com/office/drawing/2014/main" xmlns="" val="4052377547"/>
+                      <a16:colId xmlns:a16="http://schemas.microsoft.com/office/drawing/2014/main" val="4052377547"/>
                     </a:ext>
                   </a:extLst>
                 </a:gridCol>
                 <a:gridCol w="563946">
                   <a:extLst>
                     <a:ext uri="{9D8B030D-6E8A-4147-A177-3AD203B41FA5}">
-                      <a16:colId xmlns:a16="http://schemas.microsoft.com/office/drawing/2014/main" xmlns="" val="86987426"/>
+                      <a16:colId xmlns:a16="http://schemas.microsoft.com/office/drawing/2014/main" val="86987426"/>
                     </a:ext>
                   </a:extLst>
                 </a:gridCol>
                 <a:gridCol w="563946">
                   <a:extLst>
                     <a:ext uri="{9D8B030D-6E8A-4147-A177-3AD203B41FA5}">
-                      <a16:colId xmlns:a16="http://schemas.microsoft.com/office/drawing/2014/main" xmlns="" val="4112314039"/>
+                      <a16:colId xmlns:a16="http://schemas.microsoft.com/office/drawing/2014/main" val="4112314039"/>
                     </a:ext>
                   </a:extLst>
                 </a:gridCol>
                 <a:gridCol w="563946">
                   <a:extLst>
                     <a:ext uri="{9D8B030D-6E8A-4147-A177-3AD203B41FA5}">
-                      <a16:colId xmlns:a16="http://schemas.microsoft.com/office/drawing/2014/main" xmlns="" val="2352200665"/>
+                      <a16:colId xmlns:a16="http://schemas.microsoft.com/office/drawing/2014/main" val="2352200665"/>
                     </a:ext>
                   </a:extLst>
                 </a:gridCol>
@@ -14332,7 +14271,7 @@
                 </a:tc>
                 <a:extLst>
                   <a:ext uri="{0D108BD9-81ED-4DB2-BD59-A6C34878D82A}">
-                    <a16:rowId xmlns:a16="http://schemas.microsoft.com/office/drawing/2014/main" xmlns="" val="3901103587"/>
+                    <a16:rowId xmlns:a16="http://schemas.microsoft.com/office/drawing/2014/main" val="3901103587"/>
                   </a:ext>
                 </a:extLst>
               </a:tr>
@@ -14419,7 +14358,7 @@
                 </a:tc>
                 <a:extLst>
                   <a:ext uri="{0D108BD9-81ED-4DB2-BD59-A6C34878D82A}">
-                    <a16:rowId xmlns:a16="http://schemas.microsoft.com/office/drawing/2014/main" xmlns="" val="810655840"/>
+                    <a16:rowId xmlns:a16="http://schemas.microsoft.com/office/drawing/2014/main" val="810655840"/>
                   </a:ext>
                 </a:extLst>
               </a:tr>
@@ -14506,7 +14445,7 @@
                 </a:tc>
                 <a:extLst>
                   <a:ext uri="{0D108BD9-81ED-4DB2-BD59-A6C34878D82A}">
-                    <a16:rowId xmlns:a16="http://schemas.microsoft.com/office/drawing/2014/main" xmlns="" val="2107368300"/>
+                    <a16:rowId xmlns:a16="http://schemas.microsoft.com/office/drawing/2014/main" val="2107368300"/>
                   </a:ext>
                 </a:extLst>
               </a:tr>
@@ -14593,7 +14532,7 @@
                 </a:tc>
                 <a:extLst>
                   <a:ext uri="{0D108BD9-81ED-4DB2-BD59-A6C34878D82A}">
-                    <a16:rowId xmlns:a16="http://schemas.microsoft.com/office/drawing/2014/main" xmlns="" val="1259991857"/>
+                    <a16:rowId xmlns:a16="http://schemas.microsoft.com/office/drawing/2014/main" val="1259991857"/>
                   </a:ext>
                 </a:extLst>
               </a:tr>
@@ -14680,7 +14619,7 @@
                 </a:tc>
                 <a:extLst>
                   <a:ext uri="{0D108BD9-81ED-4DB2-BD59-A6C34878D82A}">
-                    <a16:rowId xmlns:a16="http://schemas.microsoft.com/office/drawing/2014/main" xmlns="" val="1705778076"/>
+                    <a16:rowId xmlns:a16="http://schemas.microsoft.com/office/drawing/2014/main" val="1705778076"/>
                   </a:ext>
                 </a:extLst>
               </a:tr>
@@ -14767,7 +14706,7 @@
                 </a:tc>
                 <a:extLst>
                   <a:ext uri="{0D108BD9-81ED-4DB2-BD59-A6C34878D82A}">
-                    <a16:rowId xmlns:a16="http://schemas.microsoft.com/office/drawing/2014/main" xmlns="" val="3593844036"/>
+                    <a16:rowId xmlns:a16="http://schemas.microsoft.com/office/drawing/2014/main" val="3593844036"/>
                   </a:ext>
                 </a:extLst>
               </a:tr>
@@ -14854,7 +14793,7 @@
                 </a:tc>
                 <a:extLst>
                   <a:ext uri="{0D108BD9-81ED-4DB2-BD59-A6C34878D82A}">
-                    <a16:rowId xmlns:a16="http://schemas.microsoft.com/office/drawing/2014/main" xmlns="" val="2725860628"/>
+                    <a16:rowId xmlns:a16="http://schemas.microsoft.com/office/drawing/2014/main" val="2725860628"/>
                   </a:ext>
                 </a:extLst>
               </a:tr>
@@ -14941,7 +14880,7 @@
                 </a:tc>
                 <a:extLst>
                   <a:ext uri="{0D108BD9-81ED-4DB2-BD59-A6C34878D82A}">
-                    <a16:rowId xmlns:a16="http://schemas.microsoft.com/office/drawing/2014/main" xmlns="" val="3598242446"/>
+                    <a16:rowId xmlns:a16="http://schemas.microsoft.com/office/drawing/2014/main" val="3598242446"/>
                   </a:ext>
                 </a:extLst>
               </a:tr>
@@ -14954,7 +14893,7 @@
           <p:cNvPr id="4" name="Slide Number Placeholder 3">
             <a:extLst>
               <a:ext uri="{FF2B5EF4-FFF2-40B4-BE49-F238E27FC236}">
-                <a16:creationId xmlns:a16="http://schemas.microsoft.com/office/drawing/2014/main" xmlns="" id="{97D82D7D-618B-4FC6-9B8D-AF076B248E3B}"/>
+                <a16:creationId xmlns:a16="http://schemas.microsoft.com/office/drawing/2014/main" id="{97D82D7D-618B-4FC6-9B8D-AF076B248E3B}"/>
               </a:ext>
             </a:extLst>
           </p:cNvPr>
@@ -14983,7 +14922,7 @@
           <p:cNvPr id="6" name="Multiplication Sign 5">
             <a:extLst>
               <a:ext uri="{FF2B5EF4-FFF2-40B4-BE49-F238E27FC236}">
-                <a16:creationId xmlns:a16="http://schemas.microsoft.com/office/drawing/2014/main" xmlns="" id="{38108A66-6254-422A-831E-1095BB8DE301}"/>
+                <a16:creationId xmlns:a16="http://schemas.microsoft.com/office/drawing/2014/main" id="{38108A66-6254-422A-831E-1095BB8DE301}"/>
               </a:ext>
             </a:extLst>
           </p:cNvPr>
@@ -15037,7 +14976,7 @@
           <p:cNvPr id="7" name="TextBox 6">
             <a:extLst>
               <a:ext uri="{FF2B5EF4-FFF2-40B4-BE49-F238E27FC236}">
-                <a16:creationId xmlns:a16="http://schemas.microsoft.com/office/drawing/2014/main" xmlns="" id="{AAB138A2-4672-41FA-B1A3-1BCF77A65C1E}"/>
+                <a16:creationId xmlns:a16="http://schemas.microsoft.com/office/drawing/2014/main" id="{AAB138A2-4672-41FA-B1A3-1BCF77A65C1E}"/>
               </a:ext>
             </a:extLst>
           </p:cNvPr>
@@ -15086,7 +15025,7 @@
           <p:cNvPr id="8" name="TextBox 7">
             <a:extLst>
               <a:ext uri="{FF2B5EF4-FFF2-40B4-BE49-F238E27FC236}">
-                <a16:creationId xmlns:a16="http://schemas.microsoft.com/office/drawing/2014/main" xmlns="" id="{834ADA7A-0E97-41A2-AA02-F570FA699361}"/>
+                <a16:creationId xmlns:a16="http://schemas.microsoft.com/office/drawing/2014/main" id="{834ADA7A-0E97-41A2-AA02-F570FA699361}"/>
               </a:ext>
             </a:extLst>
           </p:cNvPr>
@@ -15135,7 +15074,7 @@
           <p:cNvPr id="9" name="Multiplication Sign 8">
             <a:extLst>
               <a:ext uri="{FF2B5EF4-FFF2-40B4-BE49-F238E27FC236}">
-                <a16:creationId xmlns:a16="http://schemas.microsoft.com/office/drawing/2014/main" xmlns="" id="{F7361447-BB27-4ADC-84D0-A4BAC0BC306E}"/>
+                <a16:creationId xmlns:a16="http://schemas.microsoft.com/office/drawing/2014/main" id="{F7361447-BB27-4ADC-84D0-A4BAC0BC306E}"/>
               </a:ext>
             </a:extLst>
           </p:cNvPr>
@@ -15189,7 +15128,7 @@
           <p:cNvPr id="10" name="TextBox 9">
             <a:extLst>
               <a:ext uri="{FF2B5EF4-FFF2-40B4-BE49-F238E27FC236}">
-                <a16:creationId xmlns:a16="http://schemas.microsoft.com/office/drawing/2014/main" xmlns="" id="{641F9E26-7091-49A7-85FD-BE26B7A11674}"/>
+                <a16:creationId xmlns:a16="http://schemas.microsoft.com/office/drawing/2014/main" id="{641F9E26-7091-49A7-85FD-BE26B7A11674}"/>
               </a:ext>
             </a:extLst>
           </p:cNvPr>
@@ -15224,7 +15163,7 @@
           <p:cNvPr id="11" name="Star: 5 Points 10">
             <a:extLst>
               <a:ext uri="{FF2B5EF4-FFF2-40B4-BE49-F238E27FC236}">
-                <a16:creationId xmlns:a16="http://schemas.microsoft.com/office/drawing/2014/main" xmlns="" id="{7A1FC458-B0D5-4718-8044-8530CD4DB6B5}"/>
+                <a16:creationId xmlns:a16="http://schemas.microsoft.com/office/drawing/2014/main" id="{7A1FC458-B0D5-4718-8044-8530CD4DB6B5}"/>
               </a:ext>
             </a:extLst>
           </p:cNvPr>
@@ -15303,7 +15242,7 @@
           <p:cNvPr id="2" name="Title 1">
             <a:extLst>
               <a:ext uri="{FF2B5EF4-FFF2-40B4-BE49-F238E27FC236}">
-                <a16:creationId xmlns:a16="http://schemas.microsoft.com/office/drawing/2014/main" xmlns="" id="{EC71ED69-ECE5-4FEA-BAAC-2D3FD4AEF4CF}"/>
+                <a16:creationId xmlns:a16="http://schemas.microsoft.com/office/drawing/2014/main" id="{EC71ED69-ECE5-4FEA-BAAC-2D3FD4AEF4CF}"/>
               </a:ext>
             </a:extLst>
           </p:cNvPr>
@@ -15321,10 +15260,9 @@
           <a:p>
             <a:pPr algn="ctr"/>
             <a:r>
-              <a:rPr lang="de-DE" dirty="0" smtClean="0"/>
+              <a:rPr lang="de-DE" dirty="0"/>
               <a:t>Bewegungsmuster</a:t>
             </a:r>
-            <a:endParaRPr lang="de-DE" dirty="0"/>
           </a:p>
         </p:txBody>
       </p:sp>
@@ -15333,7 +15271,7 @@
           <p:cNvPr id="5" name="Content Placeholder 4">
             <a:extLst>
               <a:ext uri="{FF2B5EF4-FFF2-40B4-BE49-F238E27FC236}">
-                <a16:creationId xmlns:a16="http://schemas.microsoft.com/office/drawing/2014/main" xmlns="" id="{556F42A2-DCA4-4B1C-A056-51A3547A9BE0}"/>
+                <a16:creationId xmlns:a16="http://schemas.microsoft.com/office/drawing/2014/main" id="{556F42A2-DCA4-4B1C-A056-51A3547A9BE0}"/>
               </a:ext>
             </a:extLst>
           </p:cNvPr>
@@ -15358,56 +15296,56 @@
                 <a:gridCol w="563946">
                   <a:extLst>
                     <a:ext uri="{9D8B030D-6E8A-4147-A177-3AD203B41FA5}">
-                      <a16:colId xmlns:a16="http://schemas.microsoft.com/office/drawing/2014/main" xmlns="" val="3909669187"/>
+                      <a16:colId xmlns:a16="http://schemas.microsoft.com/office/drawing/2014/main" val="3909669187"/>
                     </a:ext>
                   </a:extLst>
                 </a:gridCol>
                 <a:gridCol w="563946">
                   <a:extLst>
                     <a:ext uri="{9D8B030D-6E8A-4147-A177-3AD203B41FA5}">
-                      <a16:colId xmlns:a16="http://schemas.microsoft.com/office/drawing/2014/main" xmlns="" val="2081033052"/>
+                      <a16:colId xmlns:a16="http://schemas.microsoft.com/office/drawing/2014/main" val="2081033052"/>
                     </a:ext>
                   </a:extLst>
                 </a:gridCol>
                 <a:gridCol w="563946">
                   <a:extLst>
                     <a:ext uri="{9D8B030D-6E8A-4147-A177-3AD203B41FA5}">
-                      <a16:colId xmlns:a16="http://schemas.microsoft.com/office/drawing/2014/main" xmlns="" val="2759415750"/>
+                      <a16:colId xmlns:a16="http://schemas.microsoft.com/office/drawing/2014/main" val="2759415750"/>
                     </a:ext>
                   </a:extLst>
                 </a:gridCol>
                 <a:gridCol w="563946">
                   <a:extLst>
                     <a:ext uri="{9D8B030D-6E8A-4147-A177-3AD203B41FA5}">
-                      <a16:colId xmlns:a16="http://schemas.microsoft.com/office/drawing/2014/main" xmlns="" val="1013666482"/>
+                      <a16:colId xmlns:a16="http://schemas.microsoft.com/office/drawing/2014/main" val="1013666482"/>
                     </a:ext>
                   </a:extLst>
                 </a:gridCol>
                 <a:gridCol w="563946">
                   <a:extLst>
                     <a:ext uri="{9D8B030D-6E8A-4147-A177-3AD203B41FA5}">
-                      <a16:colId xmlns:a16="http://schemas.microsoft.com/office/drawing/2014/main" xmlns="" val="4052377547"/>
+                      <a16:colId xmlns:a16="http://schemas.microsoft.com/office/drawing/2014/main" val="4052377547"/>
                     </a:ext>
                   </a:extLst>
                 </a:gridCol>
                 <a:gridCol w="563946">
                   <a:extLst>
                     <a:ext uri="{9D8B030D-6E8A-4147-A177-3AD203B41FA5}">
-                      <a16:colId xmlns:a16="http://schemas.microsoft.com/office/drawing/2014/main" xmlns="" val="86987426"/>
+                      <a16:colId xmlns:a16="http://schemas.microsoft.com/office/drawing/2014/main" val="86987426"/>
                     </a:ext>
                   </a:extLst>
                 </a:gridCol>
                 <a:gridCol w="563946">
                   <a:extLst>
                     <a:ext uri="{9D8B030D-6E8A-4147-A177-3AD203B41FA5}">
-                      <a16:colId xmlns:a16="http://schemas.microsoft.com/office/drawing/2014/main" xmlns="" val="4112314039"/>
+                      <a16:colId xmlns:a16="http://schemas.microsoft.com/office/drawing/2014/main" val="4112314039"/>
                     </a:ext>
                   </a:extLst>
                 </a:gridCol>
                 <a:gridCol w="563946">
                   <a:extLst>
                     <a:ext uri="{9D8B030D-6E8A-4147-A177-3AD203B41FA5}">
-                      <a16:colId xmlns:a16="http://schemas.microsoft.com/office/drawing/2014/main" xmlns="" val="2352200665"/>
+                      <a16:colId xmlns:a16="http://schemas.microsoft.com/office/drawing/2014/main" val="2352200665"/>
                     </a:ext>
                   </a:extLst>
                 </a:gridCol>
@@ -15495,7 +15433,7 @@
                 </a:tc>
                 <a:extLst>
                   <a:ext uri="{0D108BD9-81ED-4DB2-BD59-A6C34878D82A}">
-                    <a16:rowId xmlns:a16="http://schemas.microsoft.com/office/drawing/2014/main" xmlns="" val="3901103587"/>
+                    <a16:rowId xmlns:a16="http://schemas.microsoft.com/office/drawing/2014/main" val="3901103587"/>
                   </a:ext>
                 </a:extLst>
               </a:tr>
@@ -15582,7 +15520,7 @@
                 </a:tc>
                 <a:extLst>
                   <a:ext uri="{0D108BD9-81ED-4DB2-BD59-A6C34878D82A}">
-                    <a16:rowId xmlns:a16="http://schemas.microsoft.com/office/drawing/2014/main" xmlns="" val="810655840"/>
+                    <a16:rowId xmlns:a16="http://schemas.microsoft.com/office/drawing/2014/main" val="810655840"/>
                   </a:ext>
                 </a:extLst>
               </a:tr>
@@ -15669,7 +15607,7 @@
                 </a:tc>
                 <a:extLst>
                   <a:ext uri="{0D108BD9-81ED-4DB2-BD59-A6C34878D82A}">
-                    <a16:rowId xmlns:a16="http://schemas.microsoft.com/office/drawing/2014/main" xmlns="" val="2107368300"/>
+                    <a16:rowId xmlns:a16="http://schemas.microsoft.com/office/drawing/2014/main" val="2107368300"/>
                   </a:ext>
                 </a:extLst>
               </a:tr>
@@ -15756,7 +15694,7 @@
                 </a:tc>
                 <a:extLst>
                   <a:ext uri="{0D108BD9-81ED-4DB2-BD59-A6C34878D82A}">
-                    <a16:rowId xmlns:a16="http://schemas.microsoft.com/office/drawing/2014/main" xmlns="" val="1259991857"/>
+                    <a16:rowId xmlns:a16="http://schemas.microsoft.com/office/drawing/2014/main" val="1259991857"/>
                   </a:ext>
                 </a:extLst>
               </a:tr>
@@ -15843,7 +15781,7 @@
                 </a:tc>
                 <a:extLst>
                   <a:ext uri="{0D108BD9-81ED-4DB2-BD59-A6C34878D82A}">
-                    <a16:rowId xmlns:a16="http://schemas.microsoft.com/office/drawing/2014/main" xmlns="" val="1705778076"/>
+                    <a16:rowId xmlns:a16="http://schemas.microsoft.com/office/drawing/2014/main" val="1705778076"/>
                   </a:ext>
                 </a:extLst>
               </a:tr>
@@ -15930,7 +15868,7 @@
                 </a:tc>
                 <a:extLst>
                   <a:ext uri="{0D108BD9-81ED-4DB2-BD59-A6C34878D82A}">
-                    <a16:rowId xmlns:a16="http://schemas.microsoft.com/office/drawing/2014/main" xmlns="" val="3593844036"/>
+                    <a16:rowId xmlns:a16="http://schemas.microsoft.com/office/drawing/2014/main" val="3593844036"/>
                   </a:ext>
                 </a:extLst>
               </a:tr>
@@ -16017,7 +15955,7 @@
                 </a:tc>
                 <a:extLst>
                   <a:ext uri="{0D108BD9-81ED-4DB2-BD59-A6C34878D82A}">
-                    <a16:rowId xmlns:a16="http://schemas.microsoft.com/office/drawing/2014/main" xmlns="" val="2725860628"/>
+                    <a16:rowId xmlns:a16="http://schemas.microsoft.com/office/drawing/2014/main" val="2725860628"/>
                   </a:ext>
                 </a:extLst>
               </a:tr>
@@ -16104,7 +16042,7 @@
                 </a:tc>
                 <a:extLst>
                   <a:ext uri="{0D108BD9-81ED-4DB2-BD59-A6C34878D82A}">
-                    <a16:rowId xmlns:a16="http://schemas.microsoft.com/office/drawing/2014/main" xmlns="" val="3598242446"/>
+                    <a16:rowId xmlns:a16="http://schemas.microsoft.com/office/drawing/2014/main" val="3598242446"/>
                   </a:ext>
                 </a:extLst>
               </a:tr>
@@ -16117,7 +16055,7 @@
           <p:cNvPr id="4" name="Slide Number Placeholder 3">
             <a:extLst>
               <a:ext uri="{FF2B5EF4-FFF2-40B4-BE49-F238E27FC236}">
-                <a16:creationId xmlns:a16="http://schemas.microsoft.com/office/drawing/2014/main" xmlns="" id="{97D82D7D-618B-4FC6-9B8D-AF076B248E3B}"/>
+                <a16:creationId xmlns:a16="http://schemas.microsoft.com/office/drawing/2014/main" id="{97D82D7D-618B-4FC6-9B8D-AF076B248E3B}"/>
               </a:ext>
             </a:extLst>
           </p:cNvPr>
@@ -16146,7 +16084,7 @@
           <p:cNvPr id="6" name="Multiplication Sign 5">
             <a:extLst>
               <a:ext uri="{FF2B5EF4-FFF2-40B4-BE49-F238E27FC236}">
-                <a16:creationId xmlns:a16="http://schemas.microsoft.com/office/drawing/2014/main" xmlns="" id="{38108A66-6254-422A-831E-1095BB8DE301}"/>
+                <a16:creationId xmlns:a16="http://schemas.microsoft.com/office/drawing/2014/main" id="{38108A66-6254-422A-831E-1095BB8DE301}"/>
               </a:ext>
             </a:extLst>
           </p:cNvPr>
@@ -16200,7 +16138,7 @@
           <p:cNvPr id="7" name="TextBox 6">
             <a:extLst>
               <a:ext uri="{FF2B5EF4-FFF2-40B4-BE49-F238E27FC236}">
-                <a16:creationId xmlns:a16="http://schemas.microsoft.com/office/drawing/2014/main" xmlns="" id="{AAB138A2-4672-41FA-B1A3-1BCF77A65C1E}"/>
+                <a16:creationId xmlns:a16="http://schemas.microsoft.com/office/drawing/2014/main" id="{AAB138A2-4672-41FA-B1A3-1BCF77A65C1E}"/>
               </a:ext>
             </a:extLst>
           </p:cNvPr>
@@ -16249,7 +16187,7 @@
           <p:cNvPr id="8" name="TextBox 7">
             <a:extLst>
               <a:ext uri="{FF2B5EF4-FFF2-40B4-BE49-F238E27FC236}">
-                <a16:creationId xmlns:a16="http://schemas.microsoft.com/office/drawing/2014/main" xmlns="" id="{834ADA7A-0E97-41A2-AA02-F570FA699361}"/>
+                <a16:creationId xmlns:a16="http://schemas.microsoft.com/office/drawing/2014/main" id="{834ADA7A-0E97-41A2-AA02-F570FA699361}"/>
               </a:ext>
             </a:extLst>
           </p:cNvPr>
@@ -16306,7 +16244,7 @@
           <p:cNvPr id="9" name="Multiplication Sign 8">
             <a:extLst>
               <a:ext uri="{FF2B5EF4-FFF2-40B4-BE49-F238E27FC236}">
-                <a16:creationId xmlns:a16="http://schemas.microsoft.com/office/drawing/2014/main" xmlns="" id="{F7361447-BB27-4ADC-84D0-A4BAC0BC306E}"/>
+                <a16:creationId xmlns:a16="http://schemas.microsoft.com/office/drawing/2014/main" id="{F7361447-BB27-4ADC-84D0-A4BAC0BC306E}"/>
               </a:ext>
             </a:extLst>
           </p:cNvPr>
@@ -16360,7 +16298,7 @@
           <p:cNvPr id="10" name="TextBox 9">
             <a:extLst>
               <a:ext uri="{FF2B5EF4-FFF2-40B4-BE49-F238E27FC236}">
-                <a16:creationId xmlns:a16="http://schemas.microsoft.com/office/drawing/2014/main" xmlns="" id="{641F9E26-7091-49A7-85FD-BE26B7A11674}"/>
+                <a16:creationId xmlns:a16="http://schemas.microsoft.com/office/drawing/2014/main" id="{641F9E26-7091-49A7-85FD-BE26B7A11674}"/>
               </a:ext>
             </a:extLst>
           </p:cNvPr>
@@ -16395,7 +16333,7 @@
           <p:cNvPr id="11" name="Star: 5 Points 10">
             <a:extLst>
               <a:ext uri="{FF2B5EF4-FFF2-40B4-BE49-F238E27FC236}">
-                <a16:creationId xmlns:a16="http://schemas.microsoft.com/office/drawing/2014/main" xmlns="" id="{7A1FC458-B0D5-4718-8044-8530CD4DB6B5}"/>
+                <a16:creationId xmlns:a16="http://schemas.microsoft.com/office/drawing/2014/main" id="{7A1FC458-B0D5-4718-8044-8530CD4DB6B5}"/>
               </a:ext>
             </a:extLst>
           </p:cNvPr>
@@ -16444,7 +16382,7 @@
           <p:cNvPr id="3" name="Arrow: Right 2">
             <a:extLst>
               <a:ext uri="{FF2B5EF4-FFF2-40B4-BE49-F238E27FC236}">
-                <a16:creationId xmlns:a16="http://schemas.microsoft.com/office/drawing/2014/main" xmlns="" id="{04D8A79F-AD5A-491B-AFE6-0B51E946E952}"/>
+                <a16:creationId xmlns:a16="http://schemas.microsoft.com/office/drawing/2014/main" id="{04D8A79F-AD5A-491B-AFE6-0B51E946E952}"/>
               </a:ext>
             </a:extLst>
           </p:cNvPr>
@@ -16493,7 +16431,7 @@
           <p:cNvPr id="12" name="Arrow: Right 11">
             <a:extLst>
               <a:ext uri="{FF2B5EF4-FFF2-40B4-BE49-F238E27FC236}">
-                <a16:creationId xmlns:a16="http://schemas.microsoft.com/office/drawing/2014/main" xmlns="" id="{0BD7E000-2FE3-4E92-92B1-C7AEDA6C0F73}"/>
+                <a16:creationId xmlns:a16="http://schemas.microsoft.com/office/drawing/2014/main" id="{0BD7E000-2FE3-4E92-92B1-C7AEDA6C0F73}"/>
               </a:ext>
             </a:extLst>
           </p:cNvPr>
@@ -16542,7 +16480,7 @@
           <p:cNvPr id="13" name="Arrow: Right 12">
             <a:extLst>
               <a:ext uri="{FF2B5EF4-FFF2-40B4-BE49-F238E27FC236}">
-                <a16:creationId xmlns:a16="http://schemas.microsoft.com/office/drawing/2014/main" xmlns="" id="{D3FB69AB-C193-404C-842E-FA84A1741A4E}"/>
+                <a16:creationId xmlns:a16="http://schemas.microsoft.com/office/drawing/2014/main" id="{D3FB69AB-C193-404C-842E-FA84A1741A4E}"/>
               </a:ext>
             </a:extLst>
           </p:cNvPr>
@@ -16888,7 +16826,7 @@
   <a:extraClrSchemeLst/>
   <a:extLst>
     <a:ext uri="{05A4C25C-085E-4340-85A3-A5531E510DB2}">
-      <thm15:themeFamily xmlns:thm15="http://schemas.microsoft.com/office/thememl/2012/main" xmlns="" name="Office Theme" id="{62F939B6-93AF-4DB8-9C6B-D6C7DFDC589F}" vid="{4A3C46E8-61CC-4603-A589-7422A47A8E4A}"/>
+      <thm15:themeFamily xmlns:thm15="http://schemas.microsoft.com/office/thememl/2012/main" name="Office Theme" id="{62F939B6-93AF-4DB8-9C6B-D6C7DFDC589F}" vid="{4A3C46E8-61CC-4603-A589-7422A47A8E4A}"/>
     </a:ext>
   </a:extLst>
 </a:theme>
@@ -17183,7 +17121,7 @@
   <a:extraClrSchemeLst/>
   <a:extLst>
     <a:ext uri="{05A4C25C-085E-4340-85A3-A5531E510DB2}">
-      <thm15:themeFamily xmlns:thm15="http://schemas.microsoft.com/office/thememl/2012/main" xmlns="" name="Office Theme" id="{62F939B6-93AF-4DB8-9C6B-D6C7DFDC589F}" vid="{4A3C46E8-61CC-4603-A589-7422A47A8E4A}"/>
+      <thm15:themeFamily xmlns:thm15="http://schemas.microsoft.com/office/thememl/2012/main" name="Office Theme" id="{62F939B6-93AF-4DB8-9C6B-D6C7DFDC589F}" vid="{4A3C46E8-61CC-4603-A589-7422A47A8E4A}"/>
     </a:ext>
   </a:extLst>
 </a:theme>

</xml_diff>